<commit_message>
working on preparing py files for use as a corpus with flair
</commit_message>
<xml_diff>
--- a/deeptyper for python.pptx
+++ b/deeptyper for python.pptx
@@ -5,18 +5,19 @@
     <p:sldMasterId id="2147483648" r:id="rId1"/>
   </p:sldMasterIdLst>
   <p:notesMasterIdLst>
-    <p:notesMasterId r:id="rId11"/>
+    <p:notesMasterId r:id="rId12"/>
   </p:notesMasterIdLst>
   <p:sldIdLst>
     <p:sldId id="256" r:id="rId2"/>
     <p:sldId id="257" r:id="rId3"/>
-    <p:sldId id="266" r:id="rId4"/>
-    <p:sldId id="260" r:id="rId5"/>
-    <p:sldId id="259" r:id="rId6"/>
-    <p:sldId id="258" r:id="rId7"/>
+    <p:sldId id="260" r:id="rId4"/>
+    <p:sldId id="259" r:id="rId5"/>
+    <p:sldId id="258" r:id="rId6"/>
+    <p:sldId id="270" r:id="rId7"/>
     <p:sldId id="267" r:id="rId8"/>
-    <p:sldId id="268" r:id="rId9"/>
-    <p:sldId id="269" r:id="rId10"/>
+    <p:sldId id="269" r:id="rId9"/>
+    <p:sldId id="272" r:id="rId10"/>
+    <p:sldId id="271" r:id="rId11"/>
   </p:sldIdLst>
   <p:sldSz cx="12192000" cy="6858000"/>
   <p:notesSz cx="6858000" cy="9144000"/>
@@ -205,7 +206,7 @@
           <a:p>
             <a:fld id="{B01E850A-3D98-4EAE-973C-AB923972F45D}" type="datetimeFigureOut">
               <a:rPr lang="en-US" smtClean="0"/>
-              <a:t>5/27/2019</a:t>
+              <a:t>5/29/2019</a:t>
             </a:fld>
             <a:endParaRPr lang="en-US"/>
           </a:p>
@@ -518,13 +519,16 @@
           <a:p>
             <a:r>
               <a:rPr lang="en-US" dirty="0"/>
-              <a:t>Type checking – compile time or run time?</a:t>
-            </a:r>
+              <a:t>Gao – To Type or Not to Type: On the Effectiveness of Static Typing for JavaScript 2017 IEEE</a:t>
+            </a:r>
+          </a:p>
+          <a:p>
+            <a:endParaRPr lang="en-US" dirty="0"/>
           </a:p>
           <a:p>
             <a:r>
               <a:rPr lang="en-US" dirty="0"/>
-              <a:t>Strongly vs weakly – how easy is it to coerce object into a different type?</a:t>
+              <a:t>How can an IDE suggest autocompletions if it doesn’t know the type? Just suggest all variables in a file?</a:t>
             </a:r>
           </a:p>
         </p:txBody>
@@ -555,7 +559,7 @@
     </p:spTree>
     <p:extLst>
       <p:ext uri="{BB962C8B-B14F-4D97-AF65-F5344CB8AC3E}">
-        <p14:creationId xmlns:p14="http://schemas.microsoft.com/office/powerpoint/2010/main" val="1368113733"/>
+        <p14:creationId xmlns:p14="http://schemas.microsoft.com/office/powerpoint/2010/main" val="4280297036"/>
       </p:ext>
     </p:extLst>
   </p:cSld>
@@ -610,18 +614,30 @@
           <a:lstStyle/>
           <a:p>
             <a:r>
-              <a:rPr lang="en-US" dirty="0"/>
-              <a:t>Gao – To Type or Not to Type: On the Effectiveness of Static Typing for JavaScript 2017 IEEE</a:t>
-            </a:r>
-          </a:p>
-          <a:p>
+              <a:rPr lang="en-US" dirty="0">
+                <a:hlinkClick r:id="rId3"/>
+              </a:rPr>
+              <a:t>https://docs.python.org/3/library/typing.html</a:t>
+            </a:r>
             <a:endParaRPr lang="en-US" dirty="0"/>
           </a:p>
           <a:p>
             <a:r>
-              <a:rPr lang="en-US" dirty="0"/>
-              <a:t>How can an IDE suggest autocompletions if it doesn’t know the type? Just suggest all variables in a file?</a:t>
-            </a:r>
+              <a:rPr lang="en-US" dirty="0">
+                <a:hlinkClick r:id="rId4"/>
+              </a:rPr>
+              <a:t>https://www.python.org/dev/peps/pep-0484/</a:t>
+            </a:r>
+            <a:endParaRPr lang="en-US" dirty="0"/>
+          </a:p>
+          <a:p>
+            <a:r>
+              <a:rPr lang="en-US" dirty="0">
+                <a:hlinkClick r:id="rId5"/>
+              </a:rPr>
+              <a:t>https://www.python.org/dev/peps/pep-0526/</a:t>
+            </a:r>
+            <a:endParaRPr lang="en-US" dirty="0"/>
           </a:p>
         </p:txBody>
       </p:sp>
@@ -651,7 +667,7 @@
     </p:spTree>
     <p:extLst>
       <p:ext uri="{BB962C8B-B14F-4D97-AF65-F5344CB8AC3E}">
-        <p14:creationId xmlns:p14="http://schemas.microsoft.com/office/powerpoint/2010/main" val="4280297036"/>
+        <p14:creationId xmlns:p14="http://schemas.microsoft.com/office/powerpoint/2010/main" val="1538921940"/>
       </p:ext>
     </p:extLst>
   </p:cSld>
@@ -706,30 +722,9 @@
           <a:lstStyle/>
           <a:p>
             <a:r>
-              <a:rPr lang="en-US" dirty="0">
-                <a:hlinkClick r:id="rId3"/>
-              </a:rPr>
-              <a:t>https://docs.python.org/3/library/typing.html</a:t>
-            </a:r>
-            <a:endParaRPr lang="en-US" dirty="0"/>
-          </a:p>
-          <a:p>
-            <a:r>
-              <a:rPr lang="en-US" dirty="0">
-                <a:hlinkClick r:id="rId4"/>
-              </a:rPr>
-              <a:t>https://www.python.org/dev/peps/pep-0484/</a:t>
-            </a:r>
-            <a:endParaRPr lang="en-US" dirty="0"/>
-          </a:p>
-          <a:p>
-            <a:r>
-              <a:rPr lang="en-US" dirty="0">
-                <a:hlinkClick r:id="rId5"/>
-              </a:rPr>
-              <a:t>https://www.python.org/dev/peps/pep-0526/</a:t>
-            </a:r>
-            <a:endParaRPr lang="en-US" dirty="0"/>
+              <a:rPr lang="en-US" dirty="0"/>
+              <a:t>Since a type alias actually gets stripped out, since it is a type annotation itself. But then, how can we predict a type annotation might have actually been an alias?</a:t>
+            </a:r>
           </a:p>
         </p:txBody>
       </p:sp>
@@ -748,9 +743,9 @@
           <a:bodyPr/>
           <a:lstStyle/>
           <a:p>
-            <a:fld id="{7CB20737-58CB-490D-8112-651B5F9AA784}" type="slidenum">
+            <a:fld id="{FB036B39-D846-4D9A-B861-143A666B138F}" type="slidenum">
               <a:rPr lang="en-US" smtClean="0"/>
-              <a:t>5</a:t>
+              <a:t>10</a:t>
             </a:fld>
             <a:endParaRPr lang="en-US"/>
           </a:p>
@@ -759,7 +754,7 @@
     </p:spTree>
     <p:extLst>
       <p:ext uri="{BB962C8B-B14F-4D97-AF65-F5344CB8AC3E}">
-        <p14:creationId xmlns:p14="http://schemas.microsoft.com/office/powerpoint/2010/main" val="1538921940"/>
+        <p14:creationId xmlns:p14="http://schemas.microsoft.com/office/powerpoint/2010/main" val="393181393"/>
       </p:ext>
     </p:extLst>
   </p:cSld>
@@ -916,7 +911,7 @@
           <a:p>
             <a:fld id="{51127A5D-138E-424B-AFE8-B86745087DB1}" type="datetimeFigureOut">
               <a:rPr lang="en-US" smtClean="0"/>
-              <a:t>5/27/2019</a:t>
+              <a:t>5/29/2019</a:t>
             </a:fld>
             <a:endParaRPr lang="en-US"/>
           </a:p>
@@ -1114,7 +1109,7 @@
           <a:p>
             <a:fld id="{51127A5D-138E-424B-AFE8-B86745087DB1}" type="datetimeFigureOut">
               <a:rPr lang="en-US" smtClean="0"/>
-              <a:t>5/27/2019</a:t>
+              <a:t>5/29/2019</a:t>
             </a:fld>
             <a:endParaRPr lang="en-US"/>
           </a:p>
@@ -1322,7 +1317,7 @@
           <a:p>
             <a:fld id="{51127A5D-138E-424B-AFE8-B86745087DB1}" type="datetimeFigureOut">
               <a:rPr lang="en-US" smtClean="0"/>
-              <a:t>5/27/2019</a:t>
+              <a:t>5/29/2019</a:t>
             </a:fld>
             <a:endParaRPr lang="en-US"/>
           </a:p>
@@ -1520,7 +1515,7 @@
           <a:p>
             <a:fld id="{51127A5D-138E-424B-AFE8-B86745087DB1}" type="datetimeFigureOut">
               <a:rPr lang="en-US" smtClean="0"/>
-              <a:t>5/27/2019</a:t>
+              <a:t>5/29/2019</a:t>
             </a:fld>
             <a:endParaRPr lang="en-US"/>
           </a:p>
@@ -1795,7 +1790,7 @@
           <a:p>
             <a:fld id="{51127A5D-138E-424B-AFE8-B86745087DB1}" type="datetimeFigureOut">
               <a:rPr lang="en-US" smtClean="0"/>
-              <a:t>5/27/2019</a:t>
+              <a:t>5/29/2019</a:t>
             </a:fld>
             <a:endParaRPr lang="en-US"/>
           </a:p>
@@ -2060,7 +2055,7 @@
           <a:p>
             <a:fld id="{51127A5D-138E-424B-AFE8-B86745087DB1}" type="datetimeFigureOut">
               <a:rPr lang="en-US" smtClean="0"/>
-              <a:t>5/27/2019</a:t>
+              <a:t>5/29/2019</a:t>
             </a:fld>
             <a:endParaRPr lang="en-US"/>
           </a:p>
@@ -2472,7 +2467,7 @@
           <a:p>
             <a:fld id="{51127A5D-138E-424B-AFE8-B86745087DB1}" type="datetimeFigureOut">
               <a:rPr lang="en-US" smtClean="0"/>
-              <a:t>5/27/2019</a:t>
+              <a:t>5/29/2019</a:t>
             </a:fld>
             <a:endParaRPr lang="en-US"/>
           </a:p>
@@ -2613,7 +2608,7 @@
           <a:p>
             <a:fld id="{51127A5D-138E-424B-AFE8-B86745087DB1}" type="datetimeFigureOut">
               <a:rPr lang="en-US" smtClean="0"/>
-              <a:t>5/27/2019</a:t>
+              <a:t>5/29/2019</a:t>
             </a:fld>
             <a:endParaRPr lang="en-US"/>
           </a:p>
@@ -2726,7 +2721,7 @@
           <a:p>
             <a:fld id="{51127A5D-138E-424B-AFE8-B86745087DB1}" type="datetimeFigureOut">
               <a:rPr lang="en-US" smtClean="0"/>
-              <a:t>5/27/2019</a:t>
+              <a:t>5/29/2019</a:t>
             </a:fld>
             <a:endParaRPr lang="en-US"/>
           </a:p>
@@ -3037,7 +3032,7 @@
           <a:p>
             <a:fld id="{51127A5D-138E-424B-AFE8-B86745087DB1}" type="datetimeFigureOut">
               <a:rPr lang="en-US" smtClean="0"/>
-              <a:t>5/27/2019</a:t>
+              <a:t>5/29/2019</a:t>
             </a:fld>
             <a:endParaRPr lang="en-US"/>
           </a:p>
@@ -3325,7 +3320,7 @@
           <a:p>
             <a:fld id="{51127A5D-138E-424B-AFE8-B86745087DB1}" type="datetimeFigureOut">
               <a:rPr lang="en-US" smtClean="0"/>
-              <a:t>5/27/2019</a:t>
+              <a:t>5/29/2019</a:t>
             </a:fld>
             <a:endParaRPr lang="en-US"/>
           </a:p>
@@ -3566,7 +3561,7 @@
           <a:p>
             <a:fld id="{51127A5D-138E-424B-AFE8-B86745087DB1}" type="datetimeFigureOut">
               <a:rPr lang="en-US" smtClean="0"/>
-              <a:t>5/27/2019</a:t>
+              <a:t>5/29/2019</a:t>
             </a:fld>
             <a:endParaRPr lang="en-US"/>
           </a:p>
@@ -4056,6 +4051,161 @@
 </p:sld>
 </file>
 
+<file path=ppt/slides/slide10.xml><?xml version="1.0" encoding="utf-8"?>
+<p:sld xmlns:a="http://schemas.openxmlformats.org/drawingml/2006/main" xmlns:r="http://schemas.openxmlformats.org/officeDocument/2006/relationships" xmlns:p="http://schemas.openxmlformats.org/presentationml/2006/main">
+  <p:cSld>
+    <p:spTree>
+      <p:nvGrpSpPr>
+        <p:cNvPr id="1" name=""/>
+        <p:cNvGrpSpPr/>
+        <p:nvPr/>
+      </p:nvGrpSpPr>
+      <p:grpSpPr>
+        <a:xfrm>
+          <a:off x="0" y="0"/>
+          <a:ext cx="0" cy="0"/>
+          <a:chOff x="0" y="0"/>
+          <a:chExt cx="0" cy="0"/>
+        </a:xfrm>
+      </p:grpSpPr>
+      <p:sp>
+        <p:nvSpPr>
+          <p:cNvPr id="2" name="Title 1">
+            <a:extLst>
+              <a:ext uri="{FF2B5EF4-FFF2-40B4-BE49-F238E27FC236}">
+                <a16:creationId xmlns:a16="http://schemas.microsoft.com/office/drawing/2014/main" id="{2CFB9743-92D3-4D76-AB9B-DB6E2C6FF9E3}"/>
+              </a:ext>
+            </a:extLst>
+          </p:cNvPr>
+          <p:cNvSpPr>
+            <a:spLocks noGrp="1"/>
+          </p:cNvSpPr>
+          <p:nvPr>
+            <p:ph type="title"/>
+          </p:nvPr>
+        </p:nvSpPr>
+        <p:spPr/>
+        <p:txBody>
+          <a:bodyPr/>
+          <a:lstStyle/>
+          <a:p>
+            <a:r>
+              <a:rPr lang="en-US" dirty="0"/>
+              <a:t>Challenges</a:t>
+            </a:r>
+          </a:p>
+        </p:txBody>
+      </p:sp>
+      <p:sp>
+        <p:nvSpPr>
+          <p:cNvPr id="3" name="Content Placeholder 2">
+            <a:extLst>
+              <a:ext uri="{FF2B5EF4-FFF2-40B4-BE49-F238E27FC236}">
+                <a16:creationId xmlns:a16="http://schemas.microsoft.com/office/drawing/2014/main" id="{DCE71FEA-AF5E-457B-82C9-12451C3162CE}"/>
+              </a:ext>
+            </a:extLst>
+          </p:cNvPr>
+          <p:cNvSpPr>
+            <a:spLocks noGrp="1"/>
+          </p:cNvSpPr>
+          <p:nvPr>
+            <p:ph idx="1"/>
+          </p:nvPr>
+        </p:nvSpPr>
+        <p:spPr/>
+        <p:txBody>
+          <a:bodyPr/>
+          <a:lstStyle/>
+          <a:p>
+            <a:r>
+              <a:rPr lang="en-US" dirty="0"/>
+              <a:t>Type aliases make it difficult to tokenize/predict accurately</a:t>
+            </a:r>
+          </a:p>
+          <a:p>
+            <a:r>
+              <a:rPr lang="en-US" dirty="0"/>
+              <a:t>Class variable annotations get completely stripped, since without the annotation it’s invalid code</a:t>
+            </a:r>
+          </a:p>
+          <a:p>
+            <a:endParaRPr lang="en-US" dirty="0"/>
+          </a:p>
+        </p:txBody>
+      </p:sp>
+      <p:pic>
+        <p:nvPicPr>
+          <p:cNvPr id="4" name="Picture 3">
+            <a:extLst>
+              <a:ext uri="{FF2B5EF4-FFF2-40B4-BE49-F238E27FC236}">
+                <a16:creationId xmlns:a16="http://schemas.microsoft.com/office/drawing/2014/main" id="{EE3475E7-6DDA-4923-BA2B-71DB909674CD}"/>
+              </a:ext>
+            </a:extLst>
+          </p:cNvPr>
+          <p:cNvPicPr>
+            <a:picLocks noChangeAspect="1"/>
+          </p:cNvPicPr>
+          <p:nvPr/>
+        </p:nvPicPr>
+        <p:blipFill>
+          <a:blip r:embed="rId3"/>
+          <a:stretch>
+            <a:fillRect/>
+          </a:stretch>
+        </p:blipFill>
+        <p:spPr>
+          <a:xfrm>
+            <a:off x="619539" y="3657598"/>
+            <a:ext cx="4823484" cy="2206487"/>
+          </a:xfrm>
+          <a:prstGeom prst="rect">
+            <a:avLst/>
+          </a:prstGeom>
+        </p:spPr>
+      </p:pic>
+      <p:pic>
+        <p:nvPicPr>
+          <p:cNvPr id="5" name="Picture 4">
+            <a:extLst>
+              <a:ext uri="{FF2B5EF4-FFF2-40B4-BE49-F238E27FC236}">
+                <a16:creationId xmlns:a16="http://schemas.microsoft.com/office/drawing/2014/main" id="{1D062820-E80D-4538-86C9-C63B37083CE5}"/>
+              </a:ext>
+            </a:extLst>
+          </p:cNvPr>
+          <p:cNvPicPr>
+            <a:picLocks noChangeAspect="1"/>
+          </p:cNvPicPr>
+          <p:nvPr/>
+        </p:nvPicPr>
+        <p:blipFill>
+          <a:blip r:embed="rId4"/>
+          <a:stretch>
+            <a:fillRect/>
+          </a:stretch>
+        </p:blipFill>
+        <p:spPr>
+          <a:xfrm>
+            <a:off x="6324982" y="3657597"/>
+            <a:ext cx="5247479" cy="2206487"/>
+          </a:xfrm>
+          <a:prstGeom prst="rect">
+            <a:avLst/>
+          </a:prstGeom>
+        </p:spPr>
+      </p:pic>
+    </p:spTree>
+    <p:extLst>
+      <p:ext uri="{BB962C8B-B14F-4D97-AF65-F5344CB8AC3E}">
+        <p14:creationId xmlns:p14="http://schemas.microsoft.com/office/powerpoint/2010/main" val="4012029054"/>
+      </p:ext>
+    </p:extLst>
+  </p:cSld>
+  <p:clrMapOvr>
+    <a:masterClrMapping/>
+  </p:clrMapOvr>
+</p:sld>
+</file>
+
 <file path=ppt/slides/slide2.xml><?xml version="1.0" encoding="utf-8"?>
 <p:sld xmlns:a="http://schemas.openxmlformats.org/drawingml/2006/main" xmlns:r="http://schemas.openxmlformats.org/officeDocument/2006/relationships" xmlns:p="http://schemas.openxmlformats.org/presentationml/2006/main">
   <p:cSld>
@@ -4089,15 +4239,21 @@
             <p:ph type="title"/>
           </p:nvPr>
         </p:nvSpPr>
-        <p:spPr/>
-        <p:txBody>
-          <a:bodyPr/>
-          <a:lstStyle/>
-          <a:p>
-            <a:r>
-              <a:rPr lang="en-US" dirty="0"/>
+        <p:spPr>
+          <a:xfrm>
+            <a:off x="838200" y="365125"/>
+            <a:ext cx="10515600" cy="1325563"/>
+          </a:xfrm>
+        </p:spPr>
+        <p:txBody>
+          <a:bodyPr/>
+          <a:lstStyle/>
+          <a:p>
+            <a:r>
+              <a:rPr lang="en-US"/>
               <a:t>Python Types</a:t>
             </a:r>
+            <a:endParaRPr lang="en-US" dirty="0"/>
           </a:p>
         </p:txBody>
       </p:sp>
@@ -4117,7 +4273,12 @@
             <p:ph idx="1"/>
           </p:nvPr>
         </p:nvSpPr>
-        <p:spPr/>
+        <p:spPr>
+          <a:xfrm>
+            <a:off x="838200" y="1825625"/>
+            <a:ext cx="10515600" cy="4351338"/>
+          </a:xfrm>
+        </p:spPr>
         <p:txBody>
           <a:bodyPr/>
           <a:lstStyle/>
@@ -4126,21 +4287,75 @@
               <a:rPr lang="en-US" dirty="0">
                 <a:hlinkClick r:id="rId2"/>
               </a:rPr>
-              <a:t>https://www.python.org/dev/peps/pep-3107/</a:t>
-            </a:r>
-            <a:endParaRPr lang="en-US" dirty="0"/>
+              <a:t>PEP 3107</a:t>
+            </a:r>
+            <a:r>
+              <a:rPr lang="en-US" dirty="0"/>
+              <a:t> – Function Annotations – Dec 2006</a:t>
+            </a:r>
           </a:p>
           <a:p>
             <a:r>
               <a:rPr lang="en-US" dirty="0">
                 <a:hlinkClick r:id="rId3"/>
               </a:rPr>
-              <a:t>https://www.python.org/dev/peps/pep-0484/</a:t>
-            </a:r>
-            <a:endParaRPr lang="en-US" dirty="0"/>
-          </a:p>
-        </p:txBody>
-      </p:sp>
+              <a:t>PEP 484</a:t>
+            </a:r>
+            <a:r>
+              <a:rPr lang="en-US" dirty="0"/>
+              <a:t> – Type Hints – Sept 2014</a:t>
+            </a:r>
+          </a:p>
+          <a:p>
+            <a:r>
+              <a:rPr lang="en-US" dirty="0">
+                <a:hlinkClick r:id="rId4"/>
+              </a:rPr>
+              <a:t>PEP 526</a:t>
+            </a:r>
+            <a:r>
+              <a:rPr lang="en-US" dirty="0"/>
+              <a:t> – Variable Annotations – Aug 2016</a:t>
+            </a:r>
+          </a:p>
+          <a:p>
+            <a:r>
+              <a:rPr lang="en-US" dirty="0"/>
+              <a:t>Typing officially supported with Python 3.6 (released Dec 23, 2016)</a:t>
+            </a:r>
+          </a:p>
+        </p:txBody>
+      </p:sp>
+      <p:pic>
+        <p:nvPicPr>
+          <p:cNvPr id="4" name="Picture 3" descr="A screenshot of a cell phone&#10;&#10;Description automatically generated">
+            <a:extLst>
+              <a:ext uri="{FF2B5EF4-FFF2-40B4-BE49-F238E27FC236}">
+                <a16:creationId xmlns:a16="http://schemas.microsoft.com/office/drawing/2014/main" id="{4AAD23C0-F5B9-4BE9-B5C6-342435DB86FC}"/>
+              </a:ext>
+            </a:extLst>
+          </p:cNvPr>
+          <p:cNvPicPr>
+            <a:picLocks noChangeAspect="1"/>
+          </p:cNvPicPr>
+          <p:nvPr/>
+        </p:nvPicPr>
+        <p:blipFill>
+          <a:blip r:embed="rId5"/>
+          <a:stretch>
+            <a:fillRect/>
+          </a:stretch>
+        </p:blipFill>
+        <p:spPr>
+          <a:xfrm>
+            <a:off x="3176738" y="4351667"/>
+            <a:ext cx="5838524" cy="1749523"/>
+          </a:xfrm>
+          <a:prstGeom prst="rect">
+            <a:avLst/>
+          </a:prstGeom>
+        </p:spPr>
+      </p:pic>
     </p:spTree>
     <p:extLst>
       <p:ext uri="{BB962C8B-B14F-4D97-AF65-F5344CB8AC3E}">
@@ -4176,7 +4391,7 @@
           <p:cNvPr id="2" name="Title 1">
             <a:extLst>
               <a:ext uri="{FF2B5EF4-FFF2-40B4-BE49-F238E27FC236}">
-                <a16:creationId xmlns:a16="http://schemas.microsoft.com/office/drawing/2014/main" id="{51CFB8BD-A28E-450D-A658-EC765F7EBB8A}"/>
+                <a16:creationId xmlns:a16="http://schemas.microsoft.com/office/drawing/2014/main" id="{F102F116-581C-4C28-B907-80A3364FBC43}"/>
               </a:ext>
             </a:extLst>
           </p:cNvPr>
@@ -4194,7 +4409,7 @@
           <a:p>
             <a:r>
               <a:rPr lang="en-US" dirty="0"/>
-              <a:t>Typing</a:t>
+              <a:t>Why Typing?</a:t>
             </a:r>
           </a:p>
         </p:txBody>
@@ -4204,7 +4419,7 @@
           <p:cNvPr id="3" name="Content Placeholder 2">
             <a:extLst>
               <a:ext uri="{FF2B5EF4-FFF2-40B4-BE49-F238E27FC236}">
-                <a16:creationId xmlns:a16="http://schemas.microsoft.com/office/drawing/2014/main" id="{8AC87A2A-F076-4BFD-99EE-675984117A64}"/>
+                <a16:creationId xmlns:a16="http://schemas.microsoft.com/office/drawing/2014/main" id="{757F795A-C700-49B6-9204-A36BD2CB908F}"/>
               </a:ext>
             </a:extLst>
           </p:cNvPr>
@@ -4215,76 +4430,49 @@
             <p:ph idx="1"/>
           </p:nvPr>
         </p:nvSpPr>
-        <p:spPr>
-          <a:xfrm>
-            <a:off x="838200" y="1825625"/>
-            <a:ext cx="4863395" cy="4351338"/>
-          </a:xfrm>
-        </p:spPr>
+        <p:spPr/>
         <p:txBody>
           <a:bodyPr/>
           <a:lstStyle/>
           <a:p>
             <a:r>
               <a:rPr lang="en-US" dirty="0"/>
-              <a:t>Type Checking: Static vs Dynamic</a:t>
+              <a:t>15% of bugs in JavaScript could be prevented by type annotations</a:t>
             </a:r>
           </a:p>
           <a:p>
             <a:r>
               <a:rPr lang="en-US" dirty="0"/>
-              <a:t>Strongly vs Weakly Typed</a:t>
+              <a:t>Lack of types:</a:t>
             </a:r>
           </a:p>
           <a:p>
             <a:pPr lvl="1"/>
             <a:r>
               <a:rPr lang="en-US" dirty="0"/>
-              <a:t>“3” + 5</a:t>
-            </a:r>
-          </a:p>
-          <a:p>
+              <a:t>Hard to understand APIs</a:t>
+            </a:r>
+          </a:p>
+          <a:p>
+            <a:pPr lvl="1"/>
             <a:r>
               <a:rPr lang="en-US" dirty="0"/>
-              <a:t>Duck Typing</a:t>
-            </a:r>
-          </a:p>
-        </p:txBody>
-      </p:sp>
-      <p:pic>
-        <p:nvPicPr>
-          <p:cNvPr id="4" name="Picture 3">
-            <a:extLst>
-              <a:ext uri="{FF2B5EF4-FFF2-40B4-BE49-F238E27FC236}">
-                <a16:creationId xmlns:a16="http://schemas.microsoft.com/office/drawing/2014/main" id="{FFD64A54-B2F7-4808-82DA-6D52AE1ABEB4}"/>
-              </a:ext>
-            </a:extLst>
-          </p:cNvPr>
-          <p:cNvPicPr>
-            <a:picLocks noChangeAspect="1"/>
-          </p:cNvPicPr>
-          <p:nvPr/>
-        </p:nvPicPr>
-        <p:blipFill>
-          <a:blip r:embed="rId3"/>
-          <a:stretch>
-            <a:fillRect/>
-          </a:stretch>
-        </p:blipFill>
-        <p:spPr>
-          <a:xfrm>
-            <a:off x="5468079" y="1595066"/>
-            <a:ext cx="6490405" cy="4812455"/>
-          </a:xfrm>
-          <a:prstGeom prst="rect">
-            <a:avLst/>
-          </a:prstGeom>
-        </p:spPr>
-      </p:pic>
+              <a:t>Difficult to read, maintain, and document</a:t>
+            </a:r>
+          </a:p>
+          <a:p>
+            <a:pPr lvl="1"/>
+            <a:r>
+              <a:rPr lang="en-US" dirty="0"/>
+              <a:t>Poor IDE support</a:t>
+            </a:r>
+          </a:p>
+        </p:txBody>
+      </p:sp>
     </p:spTree>
     <p:extLst>
       <p:ext uri="{BB962C8B-B14F-4D97-AF65-F5344CB8AC3E}">
-        <p14:creationId xmlns:p14="http://schemas.microsoft.com/office/powerpoint/2010/main" val="221157929"/>
+        <p14:creationId xmlns:p14="http://schemas.microsoft.com/office/powerpoint/2010/main" val="84338700"/>
       </p:ext>
     </p:extLst>
   </p:cSld>
@@ -4316,7 +4504,7 @@
           <p:cNvPr id="2" name="Title 1">
             <a:extLst>
               <a:ext uri="{FF2B5EF4-FFF2-40B4-BE49-F238E27FC236}">
-                <a16:creationId xmlns:a16="http://schemas.microsoft.com/office/drawing/2014/main" id="{F102F116-581C-4C28-B907-80A3364FBC43}"/>
+                <a16:creationId xmlns:a16="http://schemas.microsoft.com/office/drawing/2014/main" id="{BE500400-8EA6-49FE-B162-FB1A0BC5CEFF}"/>
               </a:ext>
             </a:extLst>
           </p:cNvPr>
@@ -4334,7 +4522,7 @@
           <a:p>
             <a:r>
               <a:rPr lang="en-US" dirty="0"/>
-              <a:t>Why Typing?</a:t>
+              <a:t>Dynamically Typed Languages</a:t>
             </a:r>
           </a:p>
         </p:txBody>
@@ -4344,7 +4532,7 @@
           <p:cNvPr id="3" name="Content Placeholder 2">
             <a:extLst>
               <a:ext uri="{FF2B5EF4-FFF2-40B4-BE49-F238E27FC236}">
-                <a16:creationId xmlns:a16="http://schemas.microsoft.com/office/drawing/2014/main" id="{757F795A-C700-49B6-9204-A36BD2CB908F}"/>
+                <a16:creationId xmlns:a16="http://schemas.microsoft.com/office/drawing/2014/main" id="{4A9853C4-2661-4C2F-985C-909B153577E9}"/>
               </a:ext>
             </a:extLst>
           </p:cNvPr>
@@ -4362,42 +4550,118 @@
           <a:p>
             <a:r>
               <a:rPr lang="en-US" dirty="0"/>
-              <a:t>15% of bugs in JavaScript could be prevented by type annotations</a:t>
+              <a:t>JavaScript -&gt; TypeScript</a:t>
             </a:r>
           </a:p>
           <a:p>
             <a:r>
               <a:rPr lang="en-US" dirty="0"/>
-              <a:t>Lack of types:</a:t>
-            </a:r>
-          </a:p>
-          <a:p>
-            <a:pPr lvl="1"/>
-            <a:r>
-              <a:rPr lang="en-US" dirty="0"/>
-              <a:t>Hard to understand APIs</a:t>
-            </a:r>
-          </a:p>
-          <a:p>
-            <a:pPr lvl="1"/>
-            <a:r>
-              <a:rPr lang="en-US" dirty="0"/>
-              <a:t>Difficult to read, maintain, and document</a:t>
-            </a:r>
-          </a:p>
-          <a:p>
-            <a:pPr lvl="1"/>
-            <a:r>
-              <a:rPr lang="en-US" dirty="0"/>
-              <a:t>Poor IDE support</a:t>
-            </a:r>
+              <a:t>Python -&gt; typing module</a:t>
+            </a:r>
+          </a:p>
+        </p:txBody>
+      </p:sp>
+      <p:pic>
+        <p:nvPicPr>
+          <p:cNvPr id="4" name="Picture 3">
+            <a:extLst>
+              <a:ext uri="{FF2B5EF4-FFF2-40B4-BE49-F238E27FC236}">
+                <a16:creationId xmlns:a16="http://schemas.microsoft.com/office/drawing/2014/main" id="{1BC04951-070E-4B93-838E-98A9548F5950}"/>
+              </a:ext>
+            </a:extLst>
+          </p:cNvPr>
+          <p:cNvPicPr>
+            <a:picLocks noChangeAspect="1"/>
+          </p:cNvPicPr>
+          <p:nvPr/>
+        </p:nvPicPr>
+        <p:blipFill>
+          <a:blip r:embed="rId3"/>
+          <a:stretch>
+            <a:fillRect/>
+          </a:stretch>
+        </p:blipFill>
+        <p:spPr>
+          <a:xfrm>
+            <a:off x="4852914" y="1376363"/>
+            <a:ext cx="6505575" cy="2524125"/>
+          </a:xfrm>
+          <a:prstGeom prst="rect">
+            <a:avLst/>
+          </a:prstGeom>
+        </p:spPr>
+      </p:pic>
+      <p:pic>
+        <p:nvPicPr>
+          <p:cNvPr id="5" name="Picture 4">
+            <a:extLst>
+              <a:ext uri="{FF2B5EF4-FFF2-40B4-BE49-F238E27FC236}">
+                <a16:creationId xmlns:a16="http://schemas.microsoft.com/office/drawing/2014/main" id="{A12BF33D-D6D5-4A59-B400-57A25CA89BE6}"/>
+              </a:ext>
+            </a:extLst>
+          </p:cNvPr>
+          <p:cNvPicPr>
+            <a:picLocks noChangeAspect="1"/>
+          </p:cNvPicPr>
+          <p:nvPr/>
+        </p:nvPicPr>
+        <p:blipFill>
+          <a:blip r:embed="rId4"/>
+          <a:stretch>
+            <a:fillRect/>
+          </a:stretch>
+        </p:blipFill>
+        <p:spPr>
+          <a:xfrm>
+            <a:off x="4852914" y="4124473"/>
+            <a:ext cx="6438900" cy="2276475"/>
+          </a:xfrm>
+          <a:prstGeom prst="rect">
+            <a:avLst/>
+          </a:prstGeom>
+        </p:spPr>
+      </p:pic>
+      <p:sp>
+        <p:nvSpPr>
+          <p:cNvPr id="6" name="Rectangle 5">
+            <a:extLst>
+              <a:ext uri="{FF2B5EF4-FFF2-40B4-BE49-F238E27FC236}">
+                <a16:creationId xmlns:a16="http://schemas.microsoft.com/office/drawing/2014/main" id="{1F1D3B31-D1F7-4A2B-A529-A6D8657ADFDD}"/>
+              </a:ext>
+            </a:extLst>
+          </p:cNvPr>
+          <p:cNvSpPr/>
+          <p:nvPr/>
+        </p:nvSpPr>
+        <p:spPr>
+          <a:xfrm>
+            <a:off x="265430" y="5807631"/>
+            <a:ext cx="5830570" cy="369332"/>
+          </a:xfrm>
+          <a:prstGeom prst="rect">
+            <a:avLst/>
+          </a:prstGeom>
+        </p:spPr>
+        <p:txBody>
+          <a:bodyPr wrap="none">
+            <a:spAutoFit/>
+          </a:bodyPr>
+          <a:lstStyle/>
+          <a:p>
+            <a:r>
+              <a:rPr lang="en-US" dirty="0">
+                <a:hlinkClick r:id="rId5"/>
+              </a:rPr>
+              <a:t>https://insights.stackoverflow.com/survey/2019#technology</a:t>
+            </a:r>
+            <a:endParaRPr lang="en-US" dirty="0"/>
           </a:p>
         </p:txBody>
       </p:sp>
     </p:spTree>
     <p:extLst>
       <p:ext uri="{BB962C8B-B14F-4D97-AF65-F5344CB8AC3E}">
-        <p14:creationId xmlns:p14="http://schemas.microsoft.com/office/powerpoint/2010/main" val="84338700"/>
+        <p14:creationId xmlns:p14="http://schemas.microsoft.com/office/powerpoint/2010/main" val="4038175418"/>
       </p:ext>
     </p:extLst>
   </p:cSld>
@@ -4429,7 +4693,7 @@
           <p:cNvPr id="2" name="Title 1">
             <a:extLst>
               <a:ext uri="{FF2B5EF4-FFF2-40B4-BE49-F238E27FC236}">
-                <a16:creationId xmlns:a16="http://schemas.microsoft.com/office/drawing/2014/main" id="{BE500400-8EA6-49FE-B162-FB1A0BC5CEFF}"/>
+                <a16:creationId xmlns:a16="http://schemas.microsoft.com/office/drawing/2014/main" id="{D0524E60-81C2-44B3-9C39-42614E12DE2C}"/>
               </a:ext>
             </a:extLst>
           </p:cNvPr>
@@ -4447,7 +4711,7 @@
           <a:p>
             <a:r>
               <a:rPr lang="en-US" dirty="0"/>
-              <a:t>Dynamically Typed Languages</a:t>
+              <a:t>Python Typing</a:t>
             </a:r>
           </a:p>
         </p:txBody>
@@ -4457,7 +4721,7 @@
           <p:cNvPr id="3" name="Content Placeholder 2">
             <a:extLst>
               <a:ext uri="{FF2B5EF4-FFF2-40B4-BE49-F238E27FC236}">
-                <a16:creationId xmlns:a16="http://schemas.microsoft.com/office/drawing/2014/main" id="{4A9853C4-2661-4C2F-985C-909B153577E9}"/>
+                <a16:creationId xmlns:a16="http://schemas.microsoft.com/office/drawing/2014/main" id="{5CEB7175-18F2-48CE-9148-E8BA6ED9627B}"/>
               </a:ext>
             </a:extLst>
           </p:cNvPr>
@@ -4475,118 +4739,31 @@
           <a:p>
             <a:r>
               <a:rPr lang="en-US" dirty="0"/>
-              <a:t>JavaScript -&gt; TypeScript</a:t>
+              <a:t>Not that popular</a:t>
             </a:r>
           </a:p>
           <a:p>
             <a:r>
               <a:rPr lang="en-US" dirty="0"/>
-              <a:t>Python -&gt; typing module</a:t>
-            </a:r>
-          </a:p>
-        </p:txBody>
-      </p:sp>
-      <p:pic>
-        <p:nvPicPr>
-          <p:cNvPr id="4" name="Picture 3">
-            <a:extLst>
-              <a:ext uri="{FF2B5EF4-FFF2-40B4-BE49-F238E27FC236}">
-                <a16:creationId xmlns:a16="http://schemas.microsoft.com/office/drawing/2014/main" id="{1BC04951-070E-4B93-838E-98A9548F5950}"/>
-              </a:ext>
-            </a:extLst>
-          </p:cNvPr>
-          <p:cNvPicPr>
-            <a:picLocks noChangeAspect="1"/>
-          </p:cNvPicPr>
-          <p:nvPr/>
-        </p:nvPicPr>
-        <p:blipFill>
-          <a:blip r:embed="rId3"/>
-          <a:stretch>
-            <a:fillRect/>
-          </a:stretch>
-        </p:blipFill>
-        <p:spPr>
-          <a:xfrm>
-            <a:off x="4852914" y="1376363"/>
-            <a:ext cx="6505575" cy="2524125"/>
-          </a:xfrm>
-          <a:prstGeom prst="rect">
-            <a:avLst/>
-          </a:prstGeom>
-        </p:spPr>
-      </p:pic>
-      <p:pic>
-        <p:nvPicPr>
-          <p:cNvPr id="5" name="Picture 4">
-            <a:extLst>
-              <a:ext uri="{FF2B5EF4-FFF2-40B4-BE49-F238E27FC236}">
-                <a16:creationId xmlns:a16="http://schemas.microsoft.com/office/drawing/2014/main" id="{A12BF33D-D6D5-4A59-B400-57A25CA89BE6}"/>
-              </a:ext>
-            </a:extLst>
-          </p:cNvPr>
-          <p:cNvPicPr>
-            <a:picLocks noChangeAspect="1"/>
-          </p:cNvPicPr>
-          <p:nvPr/>
-        </p:nvPicPr>
-        <p:blipFill>
-          <a:blip r:embed="rId4"/>
-          <a:stretch>
-            <a:fillRect/>
-          </a:stretch>
-        </p:blipFill>
-        <p:spPr>
-          <a:xfrm>
-            <a:off x="4852914" y="4124473"/>
-            <a:ext cx="6438900" cy="2276475"/>
-          </a:xfrm>
-          <a:prstGeom prst="rect">
-            <a:avLst/>
-          </a:prstGeom>
-        </p:spPr>
-      </p:pic>
-      <p:sp>
-        <p:nvSpPr>
-          <p:cNvPr id="6" name="Rectangle 5">
-            <a:extLst>
-              <a:ext uri="{FF2B5EF4-FFF2-40B4-BE49-F238E27FC236}">
-                <a16:creationId xmlns:a16="http://schemas.microsoft.com/office/drawing/2014/main" id="{1F1D3B31-D1F7-4A2B-A529-A6D8657ADFDD}"/>
-              </a:ext>
-            </a:extLst>
-          </p:cNvPr>
-          <p:cNvSpPr/>
-          <p:nvPr/>
-        </p:nvSpPr>
-        <p:spPr>
-          <a:xfrm>
-            <a:off x="265430" y="5807631"/>
-            <a:ext cx="5830570" cy="369332"/>
-          </a:xfrm>
-          <a:prstGeom prst="rect">
-            <a:avLst/>
-          </a:prstGeom>
-        </p:spPr>
-        <p:txBody>
-          <a:bodyPr wrap="none">
-            <a:spAutoFit/>
-          </a:bodyPr>
-          <a:lstStyle/>
-          <a:p>
-            <a:r>
-              <a:rPr lang="en-US" dirty="0">
-                <a:hlinkClick r:id="rId5"/>
-              </a:rPr>
-              <a:t>https://insights.stackoverflow.com/survey/2019#technology</a:t>
-            </a:r>
-            <a:endParaRPr lang="en-US" dirty="0"/>
+              <a:t>If used poorly, can decrease </a:t>
+            </a:r>
+            <a:r>
+              <a:rPr lang="en-US" b="1" dirty="0"/>
+              <a:t>readability</a:t>
+            </a:r>
+          </a:p>
+          <a:p>
+            <a:r>
+              <a:rPr lang="en-US" dirty="0"/>
+              <a:t>However, if used well….</a:t>
+            </a:r>
           </a:p>
         </p:txBody>
       </p:sp>
     </p:spTree>
     <p:extLst>
       <p:ext uri="{BB962C8B-B14F-4D97-AF65-F5344CB8AC3E}">
-        <p14:creationId xmlns:p14="http://schemas.microsoft.com/office/powerpoint/2010/main" val="4038175418"/>
+        <p14:creationId xmlns:p14="http://schemas.microsoft.com/office/powerpoint/2010/main" val="3628153788"/>
       </p:ext>
     </p:extLst>
   </p:cSld>
@@ -4618,7 +4795,7 @@
           <p:cNvPr id="2" name="Title 1">
             <a:extLst>
               <a:ext uri="{FF2B5EF4-FFF2-40B4-BE49-F238E27FC236}">
-                <a16:creationId xmlns:a16="http://schemas.microsoft.com/office/drawing/2014/main" id="{D0524E60-81C2-44B3-9C39-42614E12DE2C}"/>
+                <a16:creationId xmlns:a16="http://schemas.microsoft.com/office/drawing/2014/main" id="{47A33ADF-206C-4293-B8AB-77F9E2FBC86E}"/>
               </a:ext>
             </a:extLst>
           </p:cNvPr>
@@ -4629,56 +4806,59 @@
             <p:ph type="title"/>
           </p:nvPr>
         </p:nvSpPr>
-        <p:spPr/>
+        <p:spPr>
+          <a:xfrm>
+            <a:off x="838200" y="365125"/>
+            <a:ext cx="10515600" cy="1325563"/>
+          </a:xfrm>
+        </p:spPr>
         <p:txBody>
           <a:bodyPr/>
           <a:lstStyle/>
           <a:p>
             <a:r>
               <a:rPr lang="en-US" dirty="0"/>
-              <a:t>Python Typing</a:t>
-            </a:r>
-          </a:p>
-        </p:txBody>
-      </p:sp>
-      <p:sp>
-        <p:nvSpPr>
-          <p:cNvPr id="3" name="Content Placeholder 2">
-            <a:extLst>
-              <a:ext uri="{FF2B5EF4-FFF2-40B4-BE49-F238E27FC236}">
-                <a16:creationId xmlns:a16="http://schemas.microsoft.com/office/drawing/2014/main" id="{5CEB7175-18F2-48CE-9148-E8BA6ED9627B}"/>
-              </a:ext>
-            </a:extLst>
-          </p:cNvPr>
-          <p:cNvSpPr>
-            <a:spLocks noGrp="1"/>
-          </p:cNvSpPr>
+              <a:t>Type Aliases</a:t>
+            </a:r>
+          </a:p>
+        </p:txBody>
+      </p:sp>
+      <p:pic>
+        <p:nvPicPr>
+          <p:cNvPr id="4" name="Content Placeholder 3">
+            <a:extLst>
+              <a:ext uri="{FF2B5EF4-FFF2-40B4-BE49-F238E27FC236}">
+                <a16:creationId xmlns:a16="http://schemas.microsoft.com/office/drawing/2014/main" id="{FEB84F87-E94A-473D-A09C-72B4F99CAFCF}"/>
+              </a:ext>
+            </a:extLst>
+          </p:cNvPr>
+          <p:cNvPicPr>
+            <a:picLocks noGrp="1" noChangeAspect="1"/>
+          </p:cNvPicPr>
           <p:nvPr>
             <p:ph idx="1"/>
           </p:nvPr>
-        </p:nvSpPr>
-        <p:spPr/>
-        <p:txBody>
-          <a:bodyPr/>
-          <a:lstStyle/>
-          <a:p>
-            <a:r>
-              <a:rPr lang="en-US" dirty="0"/>
-              <a:t>Poorly adopted</a:t>
-            </a:r>
-          </a:p>
-          <a:p>
-            <a:r>
-              <a:rPr lang="en-US" dirty="0"/>
-              <a:t>Can decrease readability, one of python’s strongest benefits</a:t>
-            </a:r>
-          </a:p>
-        </p:txBody>
-      </p:sp>
+        </p:nvPicPr>
+        <p:blipFill>
+          <a:blip r:embed="rId2"/>
+          <a:stretch>
+            <a:fillRect/>
+          </a:stretch>
+        </p:blipFill>
+        <p:spPr>
+          <a:xfrm>
+            <a:off x="838200" y="1690688"/>
+            <a:ext cx="10515600" cy="4516002"/>
+          </a:xfrm>
+          <a:prstGeom prst="rect">
+            <a:avLst/>
+          </a:prstGeom>
+        </p:spPr>
+      </p:pic>
     </p:spTree>
     <p:extLst>
       <p:ext uri="{BB962C8B-B14F-4D97-AF65-F5344CB8AC3E}">
-        <p14:creationId xmlns:p14="http://schemas.microsoft.com/office/powerpoint/2010/main" val="3628153788"/>
+        <p14:creationId xmlns:p14="http://schemas.microsoft.com/office/powerpoint/2010/main" val="3767211261"/>
       </p:ext>
     </p:extLst>
   </p:cSld>
@@ -4837,7 +5017,7 @@
           <p:cNvPr id="2" name="Title 1">
             <a:extLst>
               <a:ext uri="{FF2B5EF4-FFF2-40B4-BE49-F238E27FC236}">
-                <a16:creationId xmlns:a16="http://schemas.microsoft.com/office/drawing/2014/main" id="{CD1031D0-BAAA-473D-9B16-4241BAF06A45}"/>
+                <a16:creationId xmlns:a16="http://schemas.microsoft.com/office/drawing/2014/main" id="{07F131CB-F47C-4C19-8788-AC3CFC5B1EFD}"/>
               </a:ext>
             </a:extLst>
           </p:cNvPr>
@@ -4855,7 +5035,7 @@
           <a:p>
             <a:r>
               <a:rPr lang="en-US" dirty="0"/>
-              <a:t>State of Type Hints in Python</a:t>
+              <a:t>Generated Code Corpus</a:t>
             </a:r>
           </a:p>
         </p:txBody>
@@ -4865,7 +5045,7 @@
           <p:cNvPr id="3" name="Content Placeholder 2">
             <a:extLst>
               <a:ext uri="{FF2B5EF4-FFF2-40B4-BE49-F238E27FC236}">
-                <a16:creationId xmlns:a16="http://schemas.microsoft.com/office/drawing/2014/main" id="{2B8ECC4B-B6FE-4EA3-8A2F-A17BA46FDFBB}"/>
+                <a16:creationId xmlns:a16="http://schemas.microsoft.com/office/drawing/2014/main" id="{068A9308-37F5-4979-AEA7-83662134ABE1}"/>
               </a:ext>
             </a:extLst>
           </p:cNvPr>
@@ -4882,19 +5062,37 @@
           <a:lstStyle/>
           <a:p>
             <a:r>
-              <a:rPr lang="en-US" dirty="0">
-                <a:hlinkClick r:id="rId2"/>
-              </a:rPr>
-              <a:t>https://www.bernat.tech/the-state-of-type-hints-in-python/</a:t>
-            </a:r>
+              <a:rPr lang="en-US" dirty="0"/>
+              <a:t>No existing corpus of python code using type hints</a:t>
+            </a:r>
+          </a:p>
+          <a:p>
             <a:endParaRPr lang="en-US" dirty="0"/>
+          </a:p>
+          <a:p>
+            <a:r>
+              <a:rPr lang="en-US" dirty="0"/>
+              <a:t>Mined GitHub manually</a:t>
+            </a:r>
+          </a:p>
+          <a:p>
+            <a:r>
+              <a:rPr lang="en-US" dirty="0"/>
+              <a:t>Total typed: 2064</a:t>
+            </a:r>
+          </a:p>
+          <a:p>
+            <a:r>
+              <a:rPr lang="en-US" dirty="0"/>
+              <a:t>Total typed lines of code: 1,068,993</a:t>
+            </a:r>
           </a:p>
         </p:txBody>
       </p:sp>
     </p:spTree>
     <p:extLst>
       <p:ext uri="{BB962C8B-B14F-4D97-AF65-F5344CB8AC3E}">
-        <p14:creationId xmlns:p14="http://schemas.microsoft.com/office/powerpoint/2010/main" val="56147279"/>
+        <p14:creationId xmlns:p14="http://schemas.microsoft.com/office/powerpoint/2010/main" val="1358703871"/>
       </p:ext>
     </p:extLst>
   </p:cSld>
@@ -4926,7 +5124,7 @@
           <p:cNvPr id="2" name="Title 1">
             <a:extLst>
               <a:ext uri="{FF2B5EF4-FFF2-40B4-BE49-F238E27FC236}">
-                <a16:creationId xmlns:a16="http://schemas.microsoft.com/office/drawing/2014/main" id="{07F131CB-F47C-4C19-8788-AC3CFC5B1EFD}"/>
+                <a16:creationId xmlns:a16="http://schemas.microsoft.com/office/drawing/2014/main" id="{F489BB10-3343-4C4D-9797-5A153E44CEE5}"/>
               </a:ext>
             </a:extLst>
           </p:cNvPr>
@@ -4944,64 +5142,77 @@
           <a:p>
             <a:r>
               <a:rPr lang="en-US" dirty="0"/>
-              <a:t>Generated Code Corpus</a:t>
-            </a:r>
-          </a:p>
-        </p:txBody>
-      </p:sp>
-      <p:sp>
-        <p:nvSpPr>
-          <p:cNvPr id="3" name="Content Placeholder 2">
-            <a:extLst>
-              <a:ext uri="{FF2B5EF4-FFF2-40B4-BE49-F238E27FC236}">
-                <a16:creationId xmlns:a16="http://schemas.microsoft.com/office/drawing/2014/main" id="{068A9308-37F5-4979-AEA7-83662134ABE1}"/>
-              </a:ext>
-            </a:extLst>
-          </p:cNvPr>
-          <p:cNvSpPr>
-            <a:spLocks noGrp="1"/>
-          </p:cNvSpPr>
+              <a:t>Stripped Type Hints</a:t>
+            </a:r>
+          </a:p>
+        </p:txBody>
+      </p:sp>
+      <p:pic>
+        <p:nvPicPr>
+          <p:cNvPr id="4" name="Content Placeholder 3">
+            <a:extLst>
+              <a:ext uri="{FF2B5EF4-FFF2-40B4-BE49-F238E27FC236}">
+                <a16:creationId xmlns:a16="http://schemas.microsoft.com/office/drawing/2014/main" id="{9A1A5D9A-A216-4B7F-B82F-A5C0F16BDB4D}"/>
+              </a:ext>
+            </a:extLst>
+          </p:cNvPr>
+          <p:cNvPicPr>
+            <a:picLocks noGrp="1" noChangeAspect="1"/>
+          </p:cNvPicPr>
           <p:nvPr>
             <p:ph idx="1"/>
           </p:nvPr>
-        </p:nvSpPr>
-        <p:spPr/>
-        <p:txBody>
-          <a:bodyPr/>
-          <a:lstStyle/>
-          <a:p>
-            <a:r>
-              <a:rPr lang="en-US" dirty="0"/>
-              <a:t>No existing corpus of python code using type hints</a:t>
-            </a:r>
-          </a:p>
-          <a:p>
-            <a:endParaRPr lang="en-US" dirty="0"/>
-          </a:p>
-          <a:p>
-            <a:r>
-              <a:rPr lang="en-US" dirty="0"/>
-              <a:t>Mined GitHub manually</a:t>
-            </a:r>
-          </a:p>
-          <a:p>
-            <a:r>
-              <a:rPr lang="en-US" dirty="0"/>
-              <a:t>Total typed: 2064</a:t>
-            </a:r>
-          </a:p>
-          <a:p>
-            <a:r>
-              <a:rPr lang="en-US" dirty="0"/>
-              <a:t>Total typed lines of code: 1,068,993</a:t>
-            </a:r>
-          </a:p>
-        </p:txBody>
-      </p:sp>
+        </p:nvPicPr>
+        <p:blipFill>
+          <a:blip r:embed="rId2"/>
+          <a:stretch>
+            <a:fillRect/>
+          </a:stretch>
+        </p:blipFill>
+        <p:spPr>
+          <a:xfrm>
+            <a:off x="838199" y="1889031"/>
+            <a:ext cx="9388496" cy="2189543"/>
+          </a:xfrm>
+          <a:prstGeom prst="rect">
+            <a:avLst/>
+          </a:prstGeom>
+        </p:spPr>
+      </p:pic>
+      <p:pic>
+        <p:nvPicPr>
+          <p:cNvPr id="5" name="Picture 4">
+            <a:extLst>
+              <a:ext uri="{FF2B5EF4-FFF2-40B4-BE49-F238E27FC236}">
+                <a16:creationId xmlns:a16="http://schemas.microsoft.com/office/drawing/2014/main" id="{99E8A683-2ED8-4A80-8365-8810510FABB2}"/>
+              </a:ext>
+            </a:extLst>
+          </p:cNvPr>
+          <p:cNvPicPr>
+            <a:picLocks noChangeAspect="1"/>
+          </p:cNvPicPr>
+          <p:nvPr/>
+        </p:nvPicPr>
+        <p:blipFill>
+          <a:blip r:embed="rId3"/>
+          <a:stretch>
+            <a:fillRect/>
+          </a:stretch>
+        </p:blipFill>
+        <p:spPr>
+          <a:xfrm>
+            <a:off x="838199" y="4276917"/>
+            <a:ext cx="9388496" cy="2159027"/>
+          </a:xfrm>
+          <a:prstGeom prst="rect">
+            <a:avLst/>
+          </a:prstGeom>
+        </p:spPr>
+      </p:pic>
     </p:spTree>
     <p:extLst>
       <p:ext uri="{BB962C8B-B14F-4D97-AF65-F5344CB8AC3E}">
-        <p14:creationId xmlns:p14="http://schemas.microsoft.com/office/powerpoint/2010/main" val="1358703871"/>
+        <p14:creationId xmlns:p14="http://schemas.microsoft.com/office/powerpoint/2010/main" val="2740673161"/>
       </p:ext>
     </p:extLst>
   </p:cSld>

</xml_diff>

<commit_message>
updated train, still not working. started on final paper (readme)
</commit_message>
<xml_diff>
--- a/deeptyper for python.pptx
+++ b/deeptyper for python.pptx
@@ -5,19 +5,28 @@
     <p:sldMasterId id="2147483648" r:id="rId1"/>
   </p:sldMasterIdLst>
   <p:notesMasterIdLst>
-    <p:notesMasterId r:id="rId12"/>
+    <p:notesMasterId r:id="rId21"/>
   </p:notesMasterIdLst>
   <p:sldIdLst>
     <p:sldId id="256" r:id="rId2"/>
-    <p:sldId id="257" r:id="rId3"/>
-    <p:sldId id="260" r:id="rId4"/>
-    <p:sldId id="259" r:id="rId5"/>
-    <p:sldId id="258" r:id="rId6"/>
-    <p:sldId id="270" r:id="rId7"/>
-    <p:sldId id="267" r:id="rId8"/>
-    <p:sldId id="269" r:id="rId9"/>
-    <p:sldId id="272" r:id="rId10"/>
-    <p:sldId id="271" r:id="rId11"/>
+    <p:sldId id="279" r:id="rId3"/>
+    <p:sldId id="259" r:id="rId4"/>
+    <p:sldId id="260" r:id="rId5"/>
+    <p:sldId id="257" r:id="rId6"/>
+    <p:sldId id="280" r:id="rId7"/>
+    <p:sldId id="258" r:id="rId8"/>
+    <p:sldId id="282" r:id="rId9"/>
+    <p:sldId id="277" r:id="rId10"/>
+    <p:sldId id="278" r:id="rId11"/>
+    <p:sldId id="269" r:id="rId12"/>
+    <p:sldId id="272" r:id="rId13"/>
+    <p:sldId id="273" r:id="rId14"/>
+    <p:sldId id="275" r:id="rId15"/>
+    <p:sldId id="274" r:id="rId16"/>
+    <p:sldId id="281" r:id="rId17"/>
+    <p:sldId id="271" r:id="rId18"/>
+    <p:sldId id="270" r:id="rId19"/>
+    <p:sldId id="276" r:id="rId20"/>
   </p:sldIdLst>
   <p:sldSz cx="12192000" cy="6858000"/>
   <p:notesSz cx="6858000" cy="9144000"/>
@@ -206,7 +215,7 @@
           <a:p>
             <a:fld id="{B01E850A-3D98-4EAE-973C-AB923972F45D}" type="datetimeFigureOut">
               <a:rPr lang="en-US" smtClean="0"/>
-              <a:t>5/29/2019</a:t>
+              <a:t>6/6/2019</a:t>
             </a:fld>
             <a:endParaRPr lang="en-US"/>
           </a:p>
@@ -518,18 +527,30 @@
           <a:lstStyle/>
           <a:p>
             <a:r>
-              <a:rPr lang="en-US" dirty="0"/>
-              <a:t>Gao – To Type or Not to Type: On the Effectiveness of Static Typing for JavaScript 2017 IEEE</a:t>
-            </a:r>
-          </a:p>
-          <a:p>
+              <a:rPr lang="en-US" dirty="0">
+                <a:hlinkClick r:id="rId3"/>
+              </a:rPr>
+              <a:t>https://docs.python.org/3/library/typing.html</a:t>
+            </a:r>
             <a:endParaRPr lang="en-US" dirty="0"/>
           </a:p>
           <a:p>
             <a:r>
-              <a:rPr lang="en-US" dirty="0"/>
-              <a:t>How can an IDE suggest autocompletions if it doesn’t know the type? Just suggest all variables in a file?</a:t>
-            </a:r>
+              <a:rPr lang="en-US" dirty="0">
+                <a:hlinkClick r:id="rId4"/>
+              </a:rPr>
+              <a:t>https://www.python.org/dev/peps/pep-0484/</a:t>
+            </a:r>
+            <a:endParaRPr lang="en-US" dirty="0"/>
+          </a:p>
+          <a:p>
+            <a:r>
+              <a:rPr lang="en-US" dirty="0">
+                <a:hlinkClick r:id="rId5"/>
+              </a:rPr>
+              <a:t>https://www.python.org/dev/peps/pep-0526/</a:t>
+            </a:r>
+            <a:endParaRPr lang="en-US" dirty="0"/>
           </a:p>
         </p:txBody>
       </p:sp>
@@ -559,7 +580,91 @@
     </p:spTree>
     <p:extLst>
       <p:ext uri="{BB962C8B-B14F-4D97-AF65-F5344CB8AC3E}">
-        <p14:creationId xmlns:p14="http://schemas.microsoft.com/office/powerpoint/2010/main" val="4280297036"/>
+        <p14:creationId xmlns:p14="http://schemas.microsoft.com/office/powerpoint/2010/main" val="1538921940"/>
+      </p:ext>
+    </p:extLst>
+  </p:cSld>
+  <p:clrMapOvr>
+    <a:masterClrMapping/>
+  </p:clrMapOvr>
+</p:notes>
+</file>
+
+<file path=ppt/notesSlides/notesSlide10.xml><?xml version="1.0" encoding="utf-8"?>
+<p:notes xmlns:a="http://schemas.openxmlformats.org/drawingml/2006/main" xmlns:r="http://schemas.openxmlformats.org/officeDocument/2006/relationships" xmlns:p="http://schemas.openxmlformats.org/presentationml/2006/main">
+  <p:cSld>
+    <p:spTree>
+      <p:nvGrpSpPr>
+        <p:cNvPr id="1" name=""/>
+        <p:cNvGrpSpPr/>
+        <p:nvPr/>
+      </p:nvGrpSpPr>
+      <p:grpSpPr>
+        <a:xfrm>
+          <a:off x="0" y="0"/>
+          <a:ext cx="0" cy="0"/>
+          <a:chOff x="0" y="0"/>
+          <a:chExt cx="0" cy="0"/>
+        </a:xfrm>
+      </p:grpSpPr>
+      <p:sp>
+        <p:nvSpPr>
+          <p:cNvPr id="2" name="Slide Image Placeholder 1"/>
+          <p:cNvSpPr>
+            <a:spLocks noGrp="1" noRot="1" noChangeAspect="1"/>
+          </p:cNvSpPr>
+          <p:nvPr>
+            <p:ph type="sldImg"/>
+          </p:nvPr>
+        </p:nvSpPr>
+        <p:spPr/>
+      </p:sp>
+      <p:sp>
+        <p:nvSpPr>
+          <p:cNvPr id="3" name="Notes Placeholder 2"/>
+          <p:cNvSpPr>
+            <a:spLocks noGrp="1"/>
+          </p:cNvSpPr>
+          <p:nvPr>
+            <p:ph type="body" idx="1"/>
+          </p:nvPr>
+        </p:nvSpPr>
+        <p:spPr/>
+        <p:txBody>
+          <a:bodyPr/>
+          <a:lstStyle/>
+          <a:p>
+            <a:endParaRPr lang="en-US" dirty="0"/>
+          </a:p>
+        </p:txBody>
+      </p:sp>
+      <p:sp>
+        <p:nvSpPr>
+          <p:cNvPr id="4" name="Slide Number Placeholder 3"/>
+          <p:cNvSpPr>
+            <a:spLocks noGrp="1"/>
+          </p:cNvSpPr>
+          <p:nvPr>
+            <p:ph type="sldNum" sz="quarter" idx="5"/>
+          </p:nvPr>
+        </p:nvSpPr>
+        <p:spPr/>
+        <p:txBody>
+          <a:bodyPr/>
+          <a:lstStyle/>
+          <a:p>
+            <a:fld id="{FB036B39-D846-4D9A-B861-143A666B138F}" type="slidenum">
+              <a:rPr lang="en-US" smtClean="0"/>
+              <a:t>19</a:t>
+            </a:fld>
+            <a:endParaRPr lang="en-US"/>
+          </a:p>
+        </p:txBody>
+      </p:sp>
+    </p:spTree>
+    <p:extLst>
+      <p:ext uri="{BB962C8B-B14F-4D97-AF65-F5344CB8AC3E}">
+        <p14:creationId xmlns:p14="http://schemas.microsoft.com/office/powerpoint/2010/main" val="1834410347"/>
       </p:ext>
     </p:extLst>
   </p:cSld>
@@ -614,30 +719,18 @@
           <a:lstStyle/>
           <a:p>
             <a:r>
-              <a:rPr lang="en-US" dirty="0">
-                <a:hlinkClick r:id="rId3"/>
-              </a:rPr>
-              <a:t>https://docs.python.org/3/library/typing.html</a:t>
-            </a:r>
+              <a:rPr lang="en-US" dirty="0"/>
+              <a:t>Gao – To Type or Not to Type: On the Effectiveness of Static Typing for JavaScript 2017 IEEE</a:t>
+            </a:r>
+          </a:p>
+          <a:p>
             <a:endParaRPr lang="en-US" dirty="0"/>
           </a:p>
           <a:p>
             <a:r>
-              <a:rPr lang="en-US" dirty="0">
-                <a:hlinkClick r:id="rId4"/>
-              </a:rPr>
-              <a:t>https://www.python.org/dev/peps/pep-0484/</a:t>
-            </a:r>
-            <a:endParaRPr lang="en-US" dirty="0"/>
-          </a:p>
-          <a:p>
-            <a:r>
-              <a:rPr lang="en-US" dirty="0">
-                <a:hlinkClick r:id="rId5"/>
-              </a:rPr>
-              <a:t>https://www.python.org/dev/peps/pep-0526/</a:t>
-            </a:r>
-            <a:endParaRPr lang="en-US" dirty="0"/>
+              <a:rPr lang="en-US" dirty="0"/>
+              <a:t>How can an IDE suggest autocompletions if it doesn’t know the type? Just suggest all variables in a file?</a:t>
+            </a:r>
           </a:p>
         </p:txBody>
       </p:sp>
@@ -667,7 +760,7 @@
     </p:spTree>
     <p:extLst>
       <p:ext uri="{BB962C8B-B14F-4D97-AF65-F5344CB8AC3E}">
-        <p14:creationId xmlns:p14="http://schemas.microsoft.com/office/powerpoint/2010/main" val="1538921940"/>
+        <p14:creationId xmlns:p14="http://schemas.microsoft.com/office/powerpoint/2010/main" val="4280297036"/>
       </p:ext>
     </p:extLst>
   </p:cSld>
@@ -721,9 +814,328 @@
           <a:bodyPr/>
           <a:lstStyle/>
           <a:p>
-            <a:r>
-              <a:rPr lang="en-US" dirty="0"/>
-              <a:t>Since a type alias actually gets stripped out, since it is a type annotation itself. But then, how can we predict a type annotation might have actually been an alias?</a:t>
+            <a:endParaRPr lang="en-US" dirty="0"/>
+          </a:p>
+        </p:txBody>
+      </p:sp>
+      <p:sp>
+        <p:nvSpPr>
+          <p:cNvPr id="4" name="Slide Number Placeholder 3"/>
+          <p:cNvSpPr>
+            <a:spLocks noGrp="1"/>
+          </p:cNvSpPr>
+          <p:nvPr>
+            <p:ph type="sldNum" sz="quarter" idx="5"/>
+          </p:nvPr>
+        </p:nvSpPr>
+        <p:spPr/>
+        <p:txBody>
+          <a:bodyPr/>
+          <a:lstStyle/>
+          <a:p>
+            <a:fld id="{FB036B39-D846-4D9A-B861-143A666B138F}" type="slidenum">
+              <a:rPr lang="en-US" smtClean="0"/>
+              <a:t>5</a:t>
+            </a:fld>
+            <a:endParaRPr lang="en-US"/>
+          </a:p>
+        </p:txBody>
+      </p:sp>
+    </p:spTree>
+    <p:extLst>
+      <p:ext uri="{BB962C8B-B14F-4D97-AF65-F5344CB8AC3E}">
+        <p14:creationId xmlns:p14="http://schemas.microsoft.com/office/powerpoint/2010/main" val="3935349071"/>
+      </p:ext>
+    </p:extLst>
+  </p:cSld>
+  <p:clrMapOvr>
+    <a:masterClrMapping/>
+  </p:clrMapOvr>
+</p:notes>
+</file>
+
+<file path=ppt/notesSlides/notesSlide4.xml><?xml version="1.0" encoding="utf-8"?>
+<p:notes xmlns:a="http://schemas.openxmlformats.org/drawingml/2006/main" xmlns:r="http://schemas.openxmlformats.org/officeDocument/2006/relationships" xmlns:p="http://schemas.openxmlformats.org/presentationml/2006/main">
+  <p:cSld>
+    <p:spTree>
+      <p:nvGrpSpPr>
+        <p:cNvPr id="1" name=""/>
+        <p:cNvGrpSpPr/>
+        <p:nvPr/>
+      </p:nvGrpSpPr>
+      <p:grpSpPr>
+        <a:xfrm>
+          <a:off x="0" y="0"/>
+          <a:ext cx="0" cy="0"/>
+          <a:chOff x="0" y="0"/>
+          <a:chExt cx="0" cy="0"/>
+        </a:xfrm>
+      </p:grpSpPr>
+      <p:sp>
+        <p:nvSpPr>
+          <p:cNvPr id="2" name="Slide Image Placeholder 1"/>
+          <p:cNvSpPr>
+            <a:spLocks noGrp="1" noRot="1" noChangeAspect="1"/>
+          </p:cNvSpPr>
+          <p:nvPr>
+            <p:ph type="sldImg"/>
+          </p:nvPr>
+        </p:nvSpPr>
+        <p:spPr/>
+      </p:sp>
+      <p:sp>
+        <p:nvSpPr>
+          <p:cNvPr id="3" name="Notes Placeholder 2"/>
+          <p:cNvSpPr>
+            <a:spLocks noGrp="1"/>
+          </p:cNvSpPr>
+          <p:nvPr>
+            <p:ph type="body" idx="1"/>
+          </p:nvPr>
+        </p:nvSpPr>
+        <p:spPr/>
+        <p:txBody>
+          <a:bodyPr/>
+          <a:lstStyle/>
+          <a:p>
+            <a:r>
+              <a:rPr lang="en-US" dirty="0"/>
+              <a:t>Where does the function declaration end and the function body begin?</a:t>
+            </a:r>
+            <a:br>
+              <a:rPr lang="en-US" dirty="0"/>
+            </a:br>
+            <a:br>
+              <a:rPr lang="en-US" dirty="0"/>
+            </a:br>
+            <a:r>
+              <a:rPr lang="en-US" dirty="0" err="1"/>
+              <a:t>isort</a:t>
+            </a:r>
+            <a:r>
+              <a:rPr lang="en-US" dirty="0"/>
+              <a:t> - </a:t>
+            </a:r>
+            <a:r>
+              <a:rPr lang="en-US" dirty="0">
+                <a:hlinkClick r:id="rId3"/>
+              </a:rPr>
+              <a:t>https://github.com/timothycrosley/isort</a:t>
+            </a:r>
+            <a:endParaRPr lang="en-US" dirty="0"/>
+          </a:p>
+          <a:p>
+            <a:r>
+              <a:rPr lang="en-US" dirty="0"/>
+              <a:t>Tale - </a:t>
+            </a:r>
+            <a:r>
+              <a:rPr lang="en-US" dirty="0">
+                <a:hlinkClick r:id="rId4"/>
+              </a:rPr>
+              <a:t>https://github.com/irmen/Tale</a:t>
+            </a:r>
+            <a:endParaRPr lang="en-US" dirty="0"/>
+          </a:p>
+          <a:p>
+            <a:r>
+              <a:rPr lang="en-US" dirty="0" err="1"/>
+              <a:t>FastAPI</a:t>
+            </a:r>
+            <a:r>
+              <a:rPr lang="en-US" dirty="0"/>
+              <a:t> - </a:t>
+            </a:r>
+            <a:r>
+              <a:rPr lang="en-US" dirty="0">
+                <a:hlinkClick r:id="rId5"/>
+              </a:rPr>
+              <a:t>https://github.com/tiangolo/fastapi</a:t>
+            </a:r>
+            <a:endParaRPr lang="en-US" dirty="0"/>
+          </a:p>
+          <a:p>
+            <a:endParaRPr lang="en-US" dirty="0"/>
+          </a:p>
+        </p:txBody>
+      </p:sp>
+      <p:sp>
+        <p:nvSpPr>
+          <p:cNvPr id="4" name="Slide Number Placeholder 3"/>
+          <p:cNvSpPr>
+            <a:spLocks noGrp="1"/>
+          </p:cNvSpPr>
+          <p:nvPr>
+            <p:ph type="sldNum" sz="quarter" idx="5"/>
+          </p:nvPr>
+        </p:nvSpPr>
+        <p:spPr/>
+        <p:txBody>
+          <a:bodyPr/>
+          <a:lstStyle/>
+          <a:p>
+            <a:fld id="{FB036B39-D846-4D9A-B861-143A666B138F}" type="slidenum">
+              <a:rPr lang="en-US" smtClean="0"/>
+              <a:t>7</a:t>
+            </a:fld>
+            <a:endParaRPr lang="en-US"/>
+          </a:p>
+        </p:txBody>
+      </p:sp>
+    </p:spTree>
+    <p:extLst>
+      <p:ext uri="{BB962C8B-B14F-4D97-AF65-F5344CB8AC3E}">
+        <p14:creationId xmlns:p14="http://schemas.microsoft.com/office/powerpoint/2010/main" val="2523269630"/>
+      </p:ext>
+    </p:extLst>
+  </p:cSld>
+  <p:clrMapOvr>
+    <a:masterClrMapping/>
+  </p:clrMapOvr>
+</p:notes>
+</file>
+
+<file path=ppt/notesSlides/notesSlide5.xml><?xml version="1.0" encoding="utf-8"?>
+<p:notes xmlns:a="http://schemas.openxmlformats.org/drawingml/2006/main" xmlns:r="http://schemas.openxmlformats.org/officeDocument/2006/relationships" xmlns:p="http://schemas.openxmlformats.org/presentationml/2006/main">
+  <p:cSld>
+    <p:spTree>
+      <p:nvGrpSpPr>
+        <p:cNvPr id="1" name=""/>
+        <p:cNvGrpSpPr/>
+        <p:nvPr/>
+      </p:nvGrpSpPr>
+      <p:grpSpPr>
+        <a:xfrm>
+          <a:off x="0" y="0"/>
+          <a:ext cx="0" cy="0"/>
+          <a:chOff x="0" y="0"/>
+          <a:chExt cx="0" cy="0"/>
+        </a:xfrm>
+      </p:grpSpPr>
+      <p:sp>
+        <p:nvSpPr>
+          <p:cNvPr id="2" name="Slide Image Placeholder 1"/>
+          <p:cNvSpPr>
+            <a:spLocks noGrp="1" noRot="1" noChangeAspect="1"/>
+          </p:cNvSpPr>
+          <p:nvPr>
+            <p:ph type="sldImg"/>
+          </p:nvPr>
+        </p:nvSpPr>
+        <p:spPr/>
+      </p:sp>
+      <p:sp>
+        <p:nvSpPr>
+          <p:cNvPr id="3" name="Notes Placeholder 2"/>
+          <p:cNvSpPr>
+            <a:spLocks noGrp="1"/>
+          </p:cNvSpPr>
+          <p:nvPr>
+            <p:ph type="body" idx="1"/>
+          </p:nvPr>
+        </p:nvSpPr>
+        <p:spPr/>
+        <p:txBody>
+          <a:bodyPr/>
+          <a:lstStyle/>
+          <a:p>
+            <a:r>
+              <a:rPr lang="en-US" dirty="0"/>
+              <a:t>Nobody using python type hints to train on.</a:t>
+            </a:r>
+            <a:br>
+              <a:rPr lang="en-US" dirty="0"/>
+            </a:br>
+            <a:r>
+              <a:rPr lang="en-US" dirty="0"/>
+              <a:t>Instead, they use those derived from data flow, attribute accesses, and variable names.</a:t>
+            </a:r>
+          </a:p>
+        </p:txBody>
+      </p:sp>
+      <p:sp>
+        <p:nvSpPr>
+          <p:cNvPr id="4" name="Slide Number Placeholder 3"/>
+          <p:cNvSpPr>
+            <a:spLocks noGrp="1"/>
+          </p:cNvSpPr>
+          <p:nvPr>
+            <p:ph type="sldNum" sz="quarter" idx="5"/>
+          </p:nvPr>
+        </p:nvSpPr>
+        <p:spPr/>
+        <p:txBody>
+          <a:bodyPr/>
+          <a:lstStyle/>
+          <a:p>
+            <a:fld id="{FB036B39-D846-4D9A-B861-143A666B138F}" type="slidenum">
+              <a:rPr lang="en-US" smtClean="0"/>
+              <a:t>8</a:t>
+            </a:fld>
+            <a:endParaRPr lang="en-US"/>
+          </a:p>
+        </p:txBody>
+      </p:sp>
+    </p:spTree>
+    <p:extLst>
+      <p:ext uri="{BB962C8B-B14F-4D97-AF65-F5344CB8AC3E}">
+        <p14:creationId xmlns:p14="http://schemas.microsoft.com/office/powerpoint/2010/main" val="2336405615"/>
+      </p:ext>
+    </p:extLst>
+  </p:cSld>
+  <p:clrMapOvr>
+    <a:masterClrMapping/>
+  </p:clrMapOvr>
+</p:notes>
+</file>
+
+<file path=ppt/notesSlides/notesSlide6.xml><?xml version="1.0" encoding="utf-8"?>
+<p:notes xmlns:a="http://schemas.openxmlformats.org/drawingml/2006/main" xmlns:r="http://schemas.openxmlformats.org/officeDocument/2006/relationships" xmlns:p="http://schemas.openxmlformats.org/presentationml/2006/main">
+  <p:cSld>
+    <p:spTree>
+      <p:nvGrpSpPr>
+        <p:cNvPr id="1" name=""/>
+        <p:cNvGrpSpPr/>
+        <p:nvPr/>
+      </p:nvGrpSpPr>
+      <p:grpSpPr>
+        <a:xfrm>
+          <a:off x="0" y="0"/>
+          <a:ext cx="0" cy="0"/>
+          <a:chOff x="0" y="0"/>
+          <a:chExt cx="0" cy="0"/>
+        </a:xfrm>
+      </p:grpSpPr>
+      <p:sp>
+        <p:nvSpPr>
+          <p:cNvPr id="2" name="Slide Image Placeholder 1"/>
+          <p:cNvSpPr>
+            <a:spLocks noGrp="1" noRot="1" noChangeAspect="1"/>
+          </p:cNvSpPr>
+          <p:nvPr>
+            <p:ph type="sldImg"/>
+          </p:nvPr>
+        </p:nvSpPr>
+        <p:spPr/>
+      </p:sp>
+      <p:sp>
+        <p:nvSpPr>
+          <p:cNvPr id="3" name="Notes Placeholder 2"/>
+          <p:cNvSpPr>
+            <a:spLocks noGrp="1"/>
+          </p:cNvSpPr>
+          <p:nvPr>
+            <p:ph type="body" idx="1"/>
+          </p:nvPr>
+        </p:nvSpPr>
+        <p:spPr/>
+        <p:txBody>
+          <a:bodyPr/>
+          <a:lstStyle/>
+          <a:p>
+            <a:r>
+              <a:rPr lang="en-US" dirty="0"/>
+              <a:t>Python 3.6 required since that’s when typing module was introduced</a:t>
             </a:r>
           </a:p>
         </p:txBody>
@@ -746,6 +1158,327 @@
             <a:fld id="{FB036B39-D846-4D9A-B861-143A666B138F}" type="slidenum">
               <a:rPr lang="en-US" smtClean="0"/>
               <a:t>10</a:t>
+            </a:fld>
+            <a:endParaRPr lang="en-US"/>
+          </a:p>
+        </p:txBody>
+      </p:sp>
+    </p:spTree>
+    <p:extLst>
+      <p:ext uri="{BB962C8B-B14F-4D97-AF65-F5344CB8AC3E}">
+        <p14:creationId xmlns:p14="http://schemas.microsoft.com/office/powerpoint/2010/main" val="562153632"/>
+      </p:ext>
+    </p:extLst>
+  </p:cSld>
+  <p:clrMapOvr>
+    <a:masterClrMapping/>
+  </p:clrMapOvr>
+</p:notes>
+</file>
+
+<file path=ppt/notesSlides/notesSlide7.xml><?xml version="1.0" encoding="utf-8"?>
+<p:notes xmlns:a="http://schemas.openxmlformats.org/drawingml/2006/main" xmlns:r="http://schemas.openxmlformats.org/officeDocument/2006/relationships" xmlns:p="http://schemas.openxmlformats.org/presentationml/2006/main">
+  <p:cSld>
+    <p:spTree>
+      <p:nvGrpSpPr>
+        <p:cNvPr id="1" name=""/>
+        <p:cNvGrpSpPr/>
+        <p:nvPr/>
+      </p:nvGrpSpPr>
+      <p:grpSpPr>
+        <a:xfrm>
+          <a:off x="0" y="0"/>
+          <a:ext cx="0" cy="0"/>
+          <a:chOff x="0" y="0"/>
+          <a:chExt cx="0" cy="0"/>
+        </a:xfrm>
+      </p:grpSpPr>
+      <p:sp>
+        <p:nvSpPr>
+          <p:cNvPr id="2" name="Slide Image Placeholder 1"/>
+          <p:cNvSpPr>
+            <a:spLocks noGrp="1" noRot="1" noChangeAspect="1"/>
+          </p:cNvSpPr>
+          <p:nvPr>
+            <p:ph type="sldImg"/>
+          </p:nvPr>
+        </p:nvSpPr>
+        <p:spPr/>
+      </p:sp>
+      <p:sp>
+        <p:nvSpPr>
+          <p:cNvPr id="3" name="Notes Placeholder 2"/>
+          <p:cNvSpPr>
+            <a:spLocks noGrp="1"/>
+          </p:cNvSpPr>
+          <p:nvPr>
+            <p:ph type="body" idx="1"/>
+          </p:nvPr>
+        </p:nvSpPr>
+        <p:spPr/>
+        <p:txBody>
+          <a:bodyPr/>
+          <a:lstStyle/>
+          <a:p>
+            <a:r>
+              <a:rPr lang="en-US" dirty="0"/>
+              <a:t>Spent around 8-10 hours searching on </a:t>
+            </a:r>
+            <a:r>
+              <a:rPr lang="en-US" dirty="0" err="1"/>
+              <a:t>github</a:t>
+            </a:r>
+            <a:r>
+              <a:rPr lang="en-US" dirty="0"/>
+              <a:t> and downloading repos to generate the corpus. With another 30-40 hours I think a large enough dataset could be generated to be really useful.</a:t>
+            </a:r>
+            <a:br>
+              <a:rPr lang="en-US" dirty="0"/>
+            </a:br>
+            <a:br>
+              <a:rPr lang="en-US" dirty="0"/>
+            </a:br>
+            <a:r>
+              <a:rPr lang="en-US" dirty="0"/>
+              <a:t>"from typing import" NOT "</a:t>
+            </a:r>
+            <a:r>
+              <a:rPr lang="en-US" dirty="0" err="1"/>
+              <a:t>rasa_nlu</a:t>
+            </a:r>
+            <a:r>
+              <a:rPr lang="en-US" dirty="0"/>
+              <a:t>" -</a:t>
+            </a:r>
+            <a:r>
+              <a:rPr lang="en-US" dirty="0" err="1"/>
+              <a:t>filename:ann_module.py</a:t>
+            </a:r>
+            <a:r>
+              <a:rPr lang="en-US" dirty="0"/>
+              <a:t> -</a:t>
+            </a:r>
+            <a:r>
+              <a:rPr lang="en-US" dirty="0" err="1"/>
+              <a:t>filename:basecommand.py</a:t>
+            </a:r>
+            <a:r>
+              <a:rPr lang="en-US" dirty="0"/>
+              <a:t> -</a:t>
+            </a:r>
+            <a:r>
+              <a:rPr lang="en-US" dirty="0" err="1"/>
+              <a:t>filename:typing.py</a:t>
+            </a:r>
+            <a:r>
+              <a:rPr lang="en-US" dirty="0"/>
+              <a:t> -</a:t>
+            </a:r>
+            <a:r>
+              <a:rPr lang="en-US" dirty="0" err="1"/>
+              <a:t>filename:test.py</a:t>
+            </a:r>
+            <a:r>
+              <a:rPr lang="en-US" dirty="0"/>
+              <a:t> extension:.</a:t>
+            </a:r>
+            <a:r>
+              <a:rPr lang="en-US" dirty="0" err="1"/>
+              <a:t>py</a:t>
+            </a:r>
+            <a:endParaRPr lang="en-US" dirty="0"/>
+          </a:p>
+        </p:txBody>
+      </p:sp>
+      <p:sp>
+        <p:nvSpPr>
+          <p:cNvPr id="4" name="Slide Number Placeholder 3"/>
+          <p:cNvSpPr>
+            <a:spLocks noGrp="1"/>
+          </p:cNvSpPr>
+          <p:nvPr>
+            <p:ph type="sldNum" sz="quarter" idx="5"/>
+          </p:nvPr>
+        </p:nvSpPr>
+        <p:spPr/>
+        <p:txBody>
+          <a:bodyPr/>
+          <a:lstStyle/>
+          <a:p>
+            <a:fld id="{FB036B39-D846-4D9A-B861-143A666B138F}" type="slidenum">
+              <a:rPr lang="en-US" smtClean="0"/>
+              <a:t>11</a:t>
+            </a:fld>
+            <a:endParaRPr lang="en-US"/>
+          </a:p>
+        </p:txBody>
+      </p:sp>
+    </p:spTree>
+    <p:extLst>
+      <p:ext uri="{BB962C8B-B14F-4D97-AF65-F5344CB8AC3E}">
+        <p14:creationId xmlns:p14="http://schemas.microsoft.com/office/powerpoint/2010/main" val="1194527051"/>
+      </p:ext>
+    </p:extLst>
+  </p:cSld>
+  <p:clrMapOvr>
+    <a:masterClrMapping/>
+  </p:clrMapOvr>
+</p:notes>
+</file>
+
+<file path=ppt/notesSlides/notesSlide8.xml><?xml version="1.0" encoding="utf-8"?>
+<p:notes xmlns:a="http://schemas.openxmlformats.org/drawingml/2006/main" xmlns:r="http://schemas.openxmlformats.org/officeDocument/2006/relationships" xmlns:p="http://schemas.openxmlformats.org/presentationml/2006/main">
+  <p:cSld>
+    <p:spTree>
+      <p:nvGrpSpPr>
+        <p:cNvPr id="1" name=""/>
+        <p:cNvGrpSpPr/>
+        <p:nvPr/>
+      </p:nvGrpSpPr>
+      <p:grpSpPr>
+        <a:xfrm>
+          <a:off x="0" y="0"/>
+          <a:ext cx="0" cy="0"/>
+          <a:chOff x="0" y="0"/>
+          <a:chExt cx="0" cy="0"/>
+        </a:xfrm>
+      </p:grpSpPr>
+      <p:sp>
+        <p:nvSpPr>
+          <p:cNvPr id="2" name="Slide Image Placeholder 1"/>
+          <p:cNvSpPr>
+            <a:spLocks noGrp="1" noRot="1" noChangeAspect="1"/>
+          </p:cNvSpPr>
+          <p:nvPr>
+            <p:ph type="sldImg"/>
+          </p:nvPr>
+        </p:nvSpPr>
+        <p:spPr/>
+      </p:sp>
+      <p:sp>
+        <p:nvSpPr>
+          <p:cNvPr id="3" name="Notes Placeholder 2"/>
+          <p:cNvSpPr>
+            <a:spLocks noGrp="1"/>
+          </p:cNvSpPr>
+          <p:nvPr>
+            <p:ph type="body" idx="1"/>
+          </p:nvPr>
+        </p:nvSpPr>
+        <p:spPr/>
+        <p:txBody>
+          <a:bodyPr/>
+          <a:lstStyle/>
+          <a:p>
+            <a:endParaRPr lang="en-US" dirty="0"/>
+          </a:p>
+        </p:txBody>
+      </p:sp>
+      <p:sp>
+        <p:nvSpPr>
+          <p:cNvPr id="4" name="Slide Number Placeholder 3"/>
+          <p:cNvSpPr>
+            <a:spLocks noGrp="1"/>
+          </p:cNvSpPr>
+          <p:nvPr>
+            <p:ph type="sldNum" sz="quarter" idx="5"/>
+          </p:nvPr>
+        </p:nvSpPr>
+        <p:spPr/>
+        <p:txBody>
+          <a:bodyPr/>
+          <a:lstStyle/>
+          <a:p>
+            <a:fld id="{FB036B39-D846-4D9A-B861-143A666B138F}" type="slidenum">
+              <a:rPr lang="en-US" smtClean="0"/>
+              <a:t>16</a:t>
+            </a:fld>
+            <a:endParaRPr lang="en-US"/>
+          </a:p>
+        </p:txBody>
+      </p:sp>
+    </p:spTree>
+    <p:extLst>
+      <p:ext uri="{BB962C8B-B14F-4D97-AF65-F5344CB8AC3E}">
+        <p14:creationId xmlns:p14="http://schemas.microsoft.com/office/powerpoint/2010/main" val="4278323340"/>
+      </p:ext>
+    </p:extLst>
+  </p:cSld>
+  <p:clrMapOvr>
+    <a:masterClrMapping/>
+  </p:clrMapOvr>
+</p:notes>
+</file>
+
+<file path=ppt/notesSlides/notesSlide9.xml><?xml version="1.0" encoding="utf-8"?>
+<p:notes xmlns:a="http://schemas.openxmlformats.org/drawingml/2006/main" xmlns:r="http://schemas.openxmlformats.org/officeDocument/2006/relationships" xmlns:p="http://schemas.openxmlformats.org/presentationml/2006/main">
+  <p:cSld>
+    <p:spTree>
+      <p:nvGrpSpPr>
+        <p:cNvPr id="1" name=""/>
+        <p:cNvGrpSpPr/>
+        <p:nvPr/>
+      </p:nvGrpSpPr>
+      <p:grpSpPr>
+        <a:xfrm>
+          <a:off x="0" y="0"/>
+          <a:ext cx="0" cy="0"/>
+          <a:chOff x="0" y="0"/>
+          <a:chExt cx="0" cy="0"/>
+        </a:xfrm>
+      </p:grpSpPr>
+      <p:sp>
+        <p:nvSpPr>
+          <p:cNvPr id="2" name="Slide Image Placeholder 1"/>
+          <p:cNvSpPr>
+            <a:spLocks noGrp="1" noRot="1" noChangeAspect="1"/>
+          </p:cNvSpPr>
+          <p:nvPr>
+            <p:ph type="sldImg"/>
+          </p:nvPr>
+        </p:nvSpPr>
+        <p:spPr/>
+      </p:sp>
+      <p:sp>
+        <p:nvSpPr>
+          <p:cNvPr id="3" name="Notes Placeholder 2"/>
+          <p:cNvSpPr>
+            <a:spLocks noGrp="1"/>
+          </p:cNvSpPr>
+          <p:nvPr>
+            <p:ph type="body" idx="1"/>
+          </p:nvPr>
+        </p:nvSpPr>
+        <p:spPr/>
+        <p:txBody>
+          <a:bodyPr/>
+          <a:lstStyle/>
+          <a:p>
+            <a:r>
+              <a:rPr lang="en-US" dirty="0"/>
+              <a:t>Since a type alias actually gets stripped out, since it is a type annotation itself. But then, how can we predict a type annotation might have actually been an alias?</a:t>
+            </a:r>
+          </a:p>
+        </p:txBody>
+      </p:sp>
+      <p:sp>
+        <p:nvSpPr>
+          <p:cNvPr id="4" name="Slide Number Placeholder 3"/>
+          <p:cNvSpPr>
+            <a:spLocks noGrp="1"/>
+          </p:cNvSpPr>
+          <p:nvPr>
+            <p:ph type="sldNum" sz="quarter" idx="5"/>
+          </p:nvPr>
+        </p:nvSpPr>
+        <p:spPr/>
+        <p:txBody>
+          <a:bodyPr/>
+          <a:lstStyle/>
+          <a:p>
+            <a:fld id="{FB036B39-D846-4D9A-B861-143A666B138F}" type="slidenum">
+              <a:rPr lang="en-US" smtClean="0"/>
+              <a:t>17</a:t>
             </a:fld>
             <a:endParaRPr lang="en-US"/>
           </a:p>
@@ -911,7 +1644,7 @@
           <a:p>
             <a:fld id="{51127A5D-138E-424B-AFE8-B86745087DB1}" type="datetimeFigureOut">
               <a:rPr lang="en-US" smtClean="0"/>
-              <a:t>5/29/2019</a:t>
+              <a:t>6/6/2019</a:t>
             </a:fld>
             <a:endParaRPr lang="en-US"/>
           </a:p>
@@ -1109,7 +1842,7 @@
           <a:p>
             <a:fld id="{51127A5D-138E-424B-AFE8-B86745087DB1}" type="datetimeFigureOut">
               <a:rPr lang="en-US" smtClean="0"/>
-              <a:t>5/29/2019</a:t>
+              <a:t>6/6/2019</a:t>
             </a:fld>
             <a:endParaRPr lang="en-US"/>
           </a:p>
@@ -1317,7 +2050,7 @@
           <a:p>
             <a:fld id="{51127A5D-138E-424B-AFE8-B86745087DB1}" type="datetimeFigureOut">
               <a:rPr lang="en-US" smtClean="0"/>
-              <a:t>5/29/2019</a:t>
+              <a:t>6/6/2019</a:t>
             </a:fld>
             <a:endParaRPr lang="en-US"/>
           </a:p>
@@ -1515,7 +2248,7 @@
           <a:p>
             <a:fld id="{51127A5D-138E-424B-AFE8-B86745087DB1}" type="datetimeFigureOut">
               <a:rPr lang="en-US" smtClean="0"/>
-              <a:t>5/29/2019</a:t>
+              <a:t>6/6/2019</a:t>
             </a:fld>
             <a:endParaRPr lang="en-US"/>
           </a:p>
@@ -1790,7 +2523,7 @@
           <a:p>
             <a:fld id="{51127A5D-138E-424B-AFE8-B86745087DB1}" type="datetimeFigureOut">
               <a:rPr lang="en-US" smtClean="0"/>
-              <a:t>5/29/2019</a:t>
+              <a:t>6/6/2019</a:t>
             </a:fld>
             <a:endParaRPr lang="en-US"/>
           </a:p>
@@ -2055,7 +2788,7 @@
           <a:p>
             <a:fld id="{51127A5D-138E-424B-AFE8-B86745087DB1}" type="datetimeFigureOut">
               <a:rPr lang="en-US" smtClean="0"/>
-              <a:t>5/29/2019</a:t>
+              <a:t>6/6/2019</a:t>
             </a:fld>
             <a:endParaRPr lang="en-US"/>
           </a:p>
@@ -2467,7 +3200,7 @@
           <a:p>
             <a:fld id="{51127A5D-138E-424B-AFE8-B86745087DB1}" type="datetimeFigureOut">
               <a:rPr lang="en-US" smtClean="0"/>
-              <a:t>5/29/2019</a:t>
+              <a:t>6/6/2019</a:t>
             </a:fld>
             <a:endParaRPr lang="en-US"/>
           </a:p>
@@ -2608,7 +3341,7 @@
           <a:p>
             <a:fld id="{51127A5D-138E-424B-AFE8-B86745087DB1}" type="datetimeFigureOut">
               <a:rPr lang="en-US" smtClean="0"/>
-              <a:t>5/29/2019</a:t>
+              <a:t>6/6/2019</a:t>
             </a:fld>
             <a:endParaRPr lang="en-US"/>
           </a:p>
@@ -2721,7 +3454,7 @@
           <a:p>
             <a:fld id="{51127A5D-138E-424B-AFE8-B86745087DB1}" type="datetimeFigureOut">
               <a:rPr lang="en-US" smtClean="0"/>
-              <a:t>5/29/2019</a:t>
+              <a:t>6/6/2019</a:t>
             </a:fld>
             <a:endParaRPr lang="en-US"/>
           </a:p>
@@ -3032,7 +3765,7 @@
           <a:p>
             <a:fld id="{51127A5D-138E-424B-AFE8-B86745087DB1}" type="datetimeFigureOut">
               <a:rPr lang="en-US" smtClean="0"/>
-              <a:t>5/29/2019</a:t>
+              <a:t>6/6/2019</a:t>
             </a:fld>
             <a:endParaRPr lang="en-US"/>
           </a:p>
@@ -3320,7 +4053,7 @@
           <a:p>
             <a:fld id="{51127A5D-138E-424B-AFE8-B86745087DB1}" type="datetimeFigureOut">
               <a:rPr lang="en-US" smtClean="0"/>
-              <a:t>5/29/2019</a:t>
+              <a:t>6/6/2019</a:t>
             </a:fld>
             <a:endParaRPr lang="en-US"/>
           </a:p>
@@ -3561,7 +4294,7 @@
           <a:p>
             <a:fld id="{51127A5D-138E-424B-AFE8-B86745087DB1}" type="datetimeFigureOut">
               <a:rPr lang="en-US" smtClean="0"/>
-              <a:t>5/29/2019</a:t>
+              <a:t>6/6/2019</a:t>
             </a:fld>
             <a:endParaRPr lang="en-US"/>
           </a:p>
@@ -4000,12 +4733,8 @@
           <a:lstStyle/>
           <a:p>
             <a:r>
-              <a:rPr lang="en-US" dirty="0" err="1"/>
-              <a:t>DeepTyper</a:t>
-            </a:r>
-            <a:r>
-              <a:rPr lang="en-US" dirty="0"/>
-              <a:t> for Python</a:t>
+              <a:rPr lang="en-US" dirty="0"/>
+              <a:t>Python Type Inference</a:t>
             </a:r>
           </a:p>
         </p:txBody>
@@ -4073,6 +4802,862 @@
           <p:cNvPr id="2" name="Title 1">
             <a:extLst>
               <a:ext uri="{FF2B5EF4-FFF2-40B4-BE49-F238E27FC236}">
+                <a16:creationId xmlns:a16="http://schemas.microsoft.com/office/drawing/2014/main" id="{7326B2A6-79D2-4DC4-90DB-1881B239C826}"/>
+              </a:ext>
+            </a:extLst>
+          </p:cNvPr>
+          <p:cNvSpPr>
+            <a:spLocks noGrp="1"/>
+          </p:cNvSpPr>
+          <p:nvPr>
+            <p:ph type="title"/>
+          </p:nvPr>
+        </p:nvSpPr>
+        <p:spPr/>
+        <p:txBody>
+          <a:bodyPr/>
+          <a:lstStyle/>
+          <a:p>
+            <a:r>
+              <a:rPr lang="en-US" dirty="0"/>
+              <a:t>Applications</a:t>
+            </a:r>
+          </a:p>
+        </p:txBody>
+      </p:sp>
+      <p:sp>
+        <p:nvSpPr>
+          <p:cNvPr id="3" name="Content Placeholder 2">
+            <a:extLst>
+              <a:ext uri="{FF2B5EF4-FFF2-40B4-BE49-F238E27FC236}">
+                <a16:creationId xmlns:a16="http://schemas.microsoft.com/office/drawing/2014/main" id="{58A9DDC9-418A-4966-BF15-4DBB000D9ED2}"/>
+              </a:ext>
+            </a:extLst>
+          </p:cNvPr>
+          <p:cNvSpPr>
+            <a:spLocks noGrp="1"/>
+          </p:cNvSpPr>
+          <p:nvPr>
+            <p:ph idx="1"/>
+          </p:nvPr>
+        </p:nvSpPr>
+        <p:spPr/>
+        <p:txBody>
+          <a:bodyPr/>
+          <a:lstStyle/>
+          <a:p>
+            <a:r>
+              <a:rPr lang="en-US" dirty="0"/>
+              <a:t>Standalone Tool – Mine GitHub for projects using python 3.6 or later and create PRs with type hints added.</a:t>
+            </a:r>
+            <a:br>
+              <a:rPr lang="en-US" dirty="0"/>
+            </a:br>
+            <a:endParaRPr lang="en-US" dirty="0"/>
+          </a:p>
+          <a:p>
+            <a:r>
+              <a:rPr lang="en-US" dirty="0"/>
+              <a:t>IDE Features – Suggest types, better autocomplete for function declarations, docstrings, etc.</a:t>
+            </a:r>
+          </a:p>
+          <a:p>
+            <a:pPr marL="0" indent="0">
+              <a:buNone/>
+            </a:pPr>
+            <a:endParaRPr lang="en-US" dirty="0"/>
+          </a:p>
+          <a:p>
+            <a:r>
+              <a:rPr lang="en-US" dirty="0"/>
+              <a:t>Static Analysis – Find inconsistencies between docstrings, function signatures, variable type hints, etc.</a:t>
+            </a:r>
+          </a:p>
+        </p:txBody>
+      </p:sp>
+    </p:spTree>
+    <p:extLst>
+      <p:ext uri="{BB962C8B-B14F-4D97-AF65-F5344CB8AC3E}">
+        <p14:creationId xmlns:p14="http://schemas.microsoft.com/office/powerpoint/2010/main" val="278634544"/>
+      </p:ext>
+    </p:extLst>
+  </p:cSld>
+  <p:clrMapOvr>
+    <a:masterClrMapping/>
+  </p:clrMapOvr>
+</p:sld>
+</file>
+
+<file path=ppt/slides/slide11.xml><?xml version="1.0" encoding="utf-8"?>
+<p:sld xmlns:a="http://schemas.openxmlformats.org/drawingml/2006/main" xmlns:r="http://schemas.openxmlformats.org/officeDocument/2006/relationships" xmlns:p="http://schemas.openxmlformats.org/presentationml/2006/main">
+  <p:cSld>
+    <p:spTree>
+      <p:nvGrpSpPr>
+        <p:cNvPr id="1" name=""/>
+        <p:cNvGrpSpPr/>
+        <p:nvPr/>
+      </p:nvGrpSpPr>
+      <p:grpSpPr>
+        <a:xfrm>
+          <a:off x="0" y="0"/>
+          <a:ext cx="0" cy="0"/>
+          <a:chOff x="0" y="0"/>
+          <a:chExt cx="0" cy="0"/>
+        </a:xfrm>
+      </p:grpSpPr>
+      <p:sp>
+        <p:nvSpPr>
+          <p:cNvPr id="2" name="Title 1">
+            <a:extLst>
+              <a:ext uri="{FF2B5EF4-FFF2-40B4-BE49-F238E27FC236}">
+                <a16:creationId xmlns:a16="http://schemas.microsoft.com/office/drawing/2014/main" id="{07F131CB-F47C-4C19-8788-AC3CFC5B1EFD}"/>
+              </a:ext>
+            </a:extLst>
+          </p:cNvPr>
+          <p:cNvSpPr>
+            <a:spLocks noGrp="1"/>
+          </p:cNvSpPr>
+          <p:nvPr>
+            <p:ph type="title"/>
+          </p:nvPr>
+        </p:nvSpPr>
+        <p:spPr/>
+        <p:txBody>
+          <a:bodyPr/>
+          <a:lstStyle/>
+          <a:p>
+            <a:r>
+              <a:rPr lang="en-US" dirty="0"/>
+              <a:t>Generated Code Corpus</a:t>
+            </a:r>
+          </a:p>
+        </p:txBody>
+      </p:sp>
+      <p:sp>
+        <p:nvSpPr>
+          <p:cNvPr id="3" name="Content Placeholder 2">
+            <a:extLst>
+              <a:ext uri="{FF2B5EF4-FFF2-40B4-BE49-F238E27FC236}">
+                <a16:creationId xmlns:a16="http://schemas.microsoft.com/office/drawing/2014/main" id="{068A9308-37F5-4979-AEA7-83662134ABE1}"/>
+              </a:ext>
+            </a:extLst>
+          </p:cNvPr>
+          <p:cNvSpPr>
+            <a:spLocks noGrp="1"/>
+          </p:cNvSpPr>
+          <p:nvPr>
+            <p:ph idx="1"/>
+          </p:nvPr>
+        </p:nvSpPr>
+        <p:spPr/>
+        <p:txBody>
+          <a:bodyPr/>
+          <a:lstStyle/>
+          <a:p>
+            <a:r>
+              <a:rPr lang="en-US" dirty="0"/>
+              <a:t>No existing corpus of python code using type hints</a:t>
+            </a:r>
+          </a:p>
+          <a:p>
+            <a:endParaRPr lang="en-US" dirty="0"/>
+          </a:p>
+          <a:p>
+            <a:r>
+              <a:rPr lang="en-US" dirty="0"/>
+              <a:t>Mined GitHub manually</a:t>
+            </a:r>
+          </a:p>
+          <a:p>
+            <a:r>
+              <a:rPr lang="en-US" dirty="0"/>
+              <a:t>Total typed: 2064</a:t>
+            </a:r>
+          </a:p>
+          <a:p>
+            <a:r>
+              <a:rPr lang="en-US" dirty="0"/>
+              <a:t>Total typed lines of code: 1,068,993</a:t>
+            </a:r>
+          </a:p>
+          <a:p>
+            <a:endParaRPr lang="en-US" dirty="0"/>
+          </a:p>
+          <a:p>
+            <a:r>
+              <a:rPr lang="en-US" b="1" dirty="0"/>
+              <a:t>Corpus is too small!</a:t>
+            </a:r>
+          </a:p>
+          <a:p>
+            <a:r>
+              <a:rPr lang="en-US" dirty="0"/>
+              <a:t>Flair suggests ~1 billion tokens</a:t>
+            </a:r>
+          </a:p>
+        </p:txBody>
+      </p:sp>
+    </p:spTree>
+    <p:extLst>
+      <p:ext uri="{BB962C8B-B14F-4D97-AF65-F5344CB8AC3E}">
+        <p14:creationId xmlns:p14="http://schemas.microsoft.com/office/powerpoint/2010/main" val="1358703871"/>
+      </p:ext>
+    </p:extLst>
+  </p:cSld>
+  <p:clrMapOvr>
+    <a:masterClrMapping/>
+  </p:clrMapOvr>
+</p:sld>
+</file>
+
+<file path=ppt/slides/slide12.xml><?xml version="1.0" encoding="utf-8"?>
+<p:sld xmlns:a="http://schemas.openxmlformats.org/drawingml/2006/main" xmlns:r="http://schemas.openxmlformats.org/officeDocument/2006/relationships" xmlns:p="http://schemas.openxmlformats.org/presentationml/2006/main">
+  <p:cSld>
+    <p:spTree>
+      <p:nvGrpSpPr>
+        <p:cNvPr id="1" name=""/>
+        <p:cNvGrpSpPr/>
+        <p:nvPr/>
+      </p:nvGrpSpPr>
+      <p:grpSpPr>
+        <a:xfrm>
+          <a:off x="0" y="0"/>
+          <a:ext cx="0" cy="0"/>
+          <a:chOff x="0" y="0"/>
+          <a:chExt cx="0" cy="0"/>
+        </a:xfrm>
+      </p:grpSpPr>
+      <p:sp>
+        <p:nvSpPr>
+          <p:cNvPr id="2" name="Title 1">
+            <a:extLst>
+              <a:ext uri="{FF2B5EF4-FFF2-40B4-BE49-F238E27FC236}">
+                <a16:creationId xmlns:a16="http://schemas.microsoft.com/office/drawing/2014/main" id="{F489BB10-3343-4C4D-9797-5A153E44CEE5}"/>
+              </a:ext>
+            </a:extLst>
+          </p:cNvPr>
+          <p:cNvSpPr>
+            <a:spLocks noGrp="1"/>
+          </p:cNvSpPr>
+          <p:nvPr>
+            <p:ph type="title"/>
+          </p:nvPr>
+        </p:nvSpPr>
+        <p:spPr/>
+        <p:txBody>
+          <a:bodyPr/>
+          <a:lstStyle/>
+          <a:p>
+            <a:r>
+              <a:rPr lang="en-US" dirty="0"/>
+              <a:t>Stripped Type Hints</a:t>
+            </a:r>
+          </a:p>
+        </p:txBody>
+      </p:sp>
+      <p:pic>
+        <p:nvPicPr>
+          <p:cNvPr id="4" name="Content Placeholder 3">
+            <a:extLst>
+              <a:ext uri="{FF2B5EF4-FFF2-40B4-BE49-F238E27FC236}">
+                <a16:creationId xmlns:a16="http://schemas.microsoft.com/office/drawing/2014/main" id="{9A1A5D9A-A216-4B7F-B82F-A5C0F16BDB4D}"/>
+              </a:ext>
+            </a:extLst>
+          </p:cNvPr>
+          <p:cNvPicPr>
+            <a:picLocks noGrp="1" noChangeAspect="1"/>
+          </p:cNvPicPr>
+          <p:nvPr>
+            <p:ph idx="1"/>
+          </p:nvPr>
+        </p:nvPicPr>
+        <p:blipFill>
+          <a:blip r:embed="rId2"/>
+          <a:stretch>
+            <a:fillRect/>
+          </a:stretch>
+        </p:blipFill>
+        <p:spPr>
+          <a:xfrm>
+            <a:off x="838199" y="1663482"/>
+            <a:ext cx="9388496" cy="2189543"/>
+          </a:xfrm>
+          <a:prstGeom prst="rect">
+            <a:avLst/>
+          </a:prstGeom>
+        </p:spPr>
+      </p:pic>
+      <p:pic>
+        <p:nvPicPr>
+          <p:cNvPr id="5" name="Picture 4">
+            <a:extLst>
+              <a:ext uri="{FF2B5EF4-FFF2-40B4-BE49-F238E27FC236}">
+                <a16:creationId xmlns:a16="http://schemas.microsoft.com/office/drawing/2014/main" id="{99E8A683-2ED8-4A80-8365-8810510FABB2}"/>
+              </a:ext>
+            </a:extLst>
+          </p:cNvPr>
+          <p:cNvPicPr>
+            <a:picLocks noChangeAspect="1"/>
+          </p:cNvPicPr>
+          <p:nvPr/>
+        </p:nvPicPr>
+        <p:blipFill>
+          <a:blip r:embed="rId3"/>
+          <a:stretch>
+            <a:fillRect/>
+          </a:stretch>
+        </p:blipFill>
+        <p:spPr>
+          <a:xfrm>
+            <a:off x="838199" y="4276917"/>
+            <a:ext cx="9388496" cy="2159027"/>
+          </a:xfrm>
+          <a:prstGeom prst="rect">
+            <a:avLst/>
+          </a:prstGeom>
+        </p:spPr>
+      </p:pic>
+    </p:spTree>
+    <p:extLst>
+      <p:ext uri="{BB962C8B-B14F-4D97-AF65-F5344CB8AC3E}">
+        <p14:creationId xmlns:p14="http://schemas.microsoft.com/office/powerpoint/2010/main" val="2740673161"/>
+      </p:ext>
+    </p:extLst>
+  </p:cSld>
+  <p:clrMapOvr>
+    <a:masterClrMapping/>
+  </p:clrMapOvr>
+</p:sld>
+</file>
+
+<file path=ppt/slides/slide13.xml><?xml version="1.0" encoding="utf-8"?>
+<p:sld xmlns:a="http://schemas.openxmlformats.org/drawingml/2006/main" xmlns:r="http://schemas.openxmlformats.org/officeDocument/2006/relationships" xmlns:p="http://schemas.openxmlformats.org/presentationml/2006/main">
+  <p:cSld>
+    <p:spTree>
+      <p:nvGrpSpPr>
+        <p:cNvPr id="1" name=""/>
+        <p:cNvGrpSpPr/>
+        <p:nvPr/>
+      </p:nvGrpSpPr>
+      <p:grpSpPr>
+        <a:xfrm>
+          <a:off x="0" y="0"/>
+          <a:ext cx="0" cy="0"/>
+          <a:chOff x="0" y="0"/>
+          <a:chExt cx="0" cy="0"/>
+        </a:xfrm>
+      </p:grpSpPr>
+      <p:sp>
+        <p:nvSpPr>
+          <p:cNvPr id="2" name="Title 1">
+            <a:extLst>
+              <a:ext uri="{FF2B5EF4-FFF2-40B4-BE49-F238E27FC236}">
+                <a16:creationId xmlns:a16="http://schemas.microsoft.com/office/drawing/2014/main" id="{F73DCF4A-6EB1-4AEB-8CA1-81D4E293EA1C}"/>
+              </a:ext>
+            </a:extLst>
+          </p:cNvPr>
+          <p:cNvSpPr>
+            <a:spLocks noGrp="1"/>
+          </p:cNvSpPr>
+          <p:nvPr>
+            <p:ph type="title"/>
+          </p:nvPr>
+        </p:nvSpPr>
+        <p:spPr>
+          <a:xfrm>
+            <a:off x="838200" y="365125"/>
+            <a:ext cx="10515600" cy="1325563"/>
+          </a:xfrm>
+        </p:spPr>
+        <p:txBody>
+          <a:bodyPr/>
+          <a:lstStyle/>
+          <a:p>
+            <a:r>
+              <a:rPr lang="en-US"/>
+              <a:t>Tokenized</a:t>
+            </a:r>
+            <a:endParaRPr lang="en-US" dirty="0"/>
+          </a:p>
+        </p:txBody>
+      </p:sp>
+      <p:pic>
+        <p:nvPicPr>
+          <p:cNvPr id="4" name="Content Placeholder 3">
+            <a:extLst>
+              <a:ext uri="{FF2B5EF4-FFF2-40B4-BE49-F238E27FC236}">
+                <a16:creationId xmlns:a16="http://schemas.microsoft.com/office/drawing/2014/main" id="{D00657C7-D8C2-4457-8A9A-6519E5E2A3AB}"/>
+              </a:ext>
+            </a:extLst>
+          </p:cNvPr>
+          <p:cNvPicPr>
+            <a:picLocks noGrp="1" noChangeAspect="1"/>
+          </p:cNvPicPr>
+          <p:nvPr>
+            <p:ph idx="1"/>
+          </p:nvPr>
+        </p:nvPicPr>
+        <p:blipFill>
+          <a:blip r:embed="rId2"/>
+          <a:stretch>
+            <a:fillRect/>
+          </a:stretch>
+        </p:blipFill>
+        <p:spPr>
+          <a:xfrm>
+            <a:off x="838199" y="1690688"/>
+            <a:ext cx="5592581" cy="1151414"/>
+          </a:xfrm>
+          <a:prstGeom prst="rect">
+            <a:avLst/>
+          </a:prstGeom>
+        </p:spPr>
+      </p:pic>
+      <p:pic>
+        <p:nvPicPr>
+          <p:cNvPr id="5" name="Picture 4">
+            <a:extLst>
+              <a:ext uri="{FF2B5EF4-FFF2-40B4-BE49-F238E27FC236}">
+                <a16:creationId xmlns:a16="http://schemas.microsoft.com/office/drawing/2014/main" id="{9325134C-0C2A-4AE1-8087-8A2D72ACBD4B}"/>
+              </a:ext>
+            </a:extLst>
+          </p:cNvPr>
+          <p:cNvPicPr>
+            <a:picLocks noChangeAspect="1"/>
+          </p:cNvPicPr>
+          <p:nvPr/>
+        </p:nvPicPr>
+        <p:blipFill>
+          <a:blip r:embed="rId3"/>
+          <a:stretch>
+            <a:fillRect/>
+          </a:stretch>
+        </p:blipFill>
+        <p:spPr>
+          <a:xfrm>
+            <a:off x="838199" y="3200400"/>
+            <a:ext cx="5592581" cy="3152182"/>
+          </a:xfrm>
+          <a:prstGeom prst="rect">
+            <a:avLst/>
+          </a:prstGeom>
+        </p:spPr>
+      </p:pic>
+    </p:spTree>
+    <p:extLst>
+      <p:ext uri="{BB962C8B-B14F-4D97-AF65-F5344CB8AC3E}">
+        <p14:creationId xmlns:p14="http://schemas.microsoft.com/office/powerpoint/2010/main" val="3389573755"/>
+      </p:ext>
+    </p:extLst>
+  </p:cSld>
+  <p:clrMapOvr>
+    <a:masterClrMapping/>
+  </p:clrMapOvr>
+</p:sld>
+</file>
+
+<file path=ppt/slides/slide14.xml><?xml version="1.0" encoding="utf-8"?>
+<p:sld xmlns:a="http://schemas.openxmlformats.org/drawingml/2006/main" xmlns:r="http://schemas.openxmlformats.org/officeDocument/2006/relationships" xmlns:p="http://schemas.openxmlformats.org/presentationml/2006/main">
+  <p:cSld>
+    <p:spTree>
+      <p:nvGrpSpPr>
+        <p:cNvPr id="1" name=""/>
+        <p:cNvGrpSpPr/>
+        <p:nvPr/>
+      </p:nvGrpSpPr>
+      <p:grpSpPr>
+        <a:xfrm>
+          <a:off x="0" y="0"/>
+          <a:ext cx="0" cy="0"/>
+          <a:chOff x="0" y="0"/>
+          <a:chExt cx="0" cy="0"/>
+        </a:xfrm>
+      </p:grpSpPr>
+      <p:sp>
+        <p:nvSpPr>
+          <p:cNvPr id="2" name="Title 1">
+            <a:extLst>
+              <a:ext uri="{FF2B5EF4-FFF2-40B4-BE49-F238E27FC236}">
+                <a16:creationId xmlns:a16="http://schemas.microsoft.com/office/drawing/2014/main" id="{4722FF71-727E-4A94-8D82-54D17819D260}"/>
+              </a:ext>
+            </a:extLst>
+          </p:cNvPr>
+          <p:cNvSpPr>
+            <a:spLocks noGrp="1"/>
+          </p:cNvSpPr>
+          <p:nvPr>
+            <p:ph type="title"/>
+          </p:nvPr>
+        </p:nvSpPr>
+        <p:spPr/>
+        <p:txBody>
+          <a:bodyPr/>
+          <a:lstStyle/>
+          <a:p>
+            <a:r>
+              <a:rPr lang="en-US" dirty="0"/>
+              <a:t>Flair</a:t>
+            </a:r>
+          </a:p>
+        </p:txBody>
+      </p:sp>
+      <p:sp>
+        <p:nvSpPr>
+          <p:cNvPr id="3" name="Content Placeholder 2">
+            <a:extLst>
+              <a:ext uri="{FF2B5EF4-FFF2-40B4-BE49-F238E27FC236}">
+                <a16:creationId xmlns:a16="http://schemas.microsoft.com/office/drawing/2014/main" id="{1DD212E9-ACE4-4F2C-9CAA-113AFAA089DB}"/>
+              </a:ext>
+            </a:extLst>
+          </p:cNvPr>
+          <p:cNvSpPr>
+            <a:spLocks noGrp="1"/>
+          </p:cNvSpPr>
+          <p:nvPr>
+            <p:ph idx="1"/>
+          </p:nvPr>
+        </p:nvSpPr>
+        <p:spPr/>
+        <p:txBody>
+          <a:bodyPr/>
+          <a:lstStyle/>
+          <a:p>
+            <a:r>
+              <a:rPr lang="en-US" dirty="0"/>
+              <a:t>A very simple framework for </a:t>
+            </a:r>
+            <a:r>
+              <a:rPr lang="en-US" b="1" dirty="0"/>
+              <a:t>state-of-the-art NLP</a:t>
+            </a:r>
+            <a:r>
+              <a:rPr lang="en-US" dirty="0"/>
+              <a:t>. Developed by </a:t>
+            </a:r>
+            <a:r>
+              <a:rPr lang="en-US" dirty="0" err="1">
+                <a:hlinkClick r:id="rId2"/>
+              </a:rPr>
+              <a:t>Zalando</a:t>
+            </a:r>
+            <a:r>
+              <a:rPr lang="en-US" dirty="0">
+                <a:hlinkClick r:id="rId2"/>
+              </a:rPr>
+              <a:t> Research</a:t>
+            </a:r>
+            <a:r>
+              <a:rPr lang="en-US" dirty="0"/>
+              <a:t>.</a:t>
+            </a:r>
+          </a:p>
+          <a:p>
+            <a:r>
+              <a:rPr lang="en-US" dirty="0"/>
+              <a:t>Built directly on </a:t>
+            </a:r>
+            <a:r>
+              <a:rPr lang="en-US" dirty="0" err="1"/>
+              <a:t>PyTorch</a:t>
+            </a:r>
+            <a:endParaRPr lang="en-US" dirty="0"/>
+          </a:p>
+          <a:p>
+            <a:r>
+              <a:rPr lang="en-US" dirty="0">
+                <a:hlinkClick r:id="rId3"/>
+              </a:rPr>
+              <a:t>https://github.com/zalandoresearch/flair</a:t>
+            </a:r>
+            <a:endParaRPr lang="en-US" dirty="0"/>
+          </a:p>
+          <a:p>
+            <a:endParaRPr lang="en-US" dirty="0"/>
+          </a:p>
+        </p:txBody>
+      </p:sp>
+    </p:spTree>
+    <p:extLst>
+      <p:ext uri="{BB962C8B-B14F-4D97-AF65-F5344CB8AC3E}">
+        <p14:creationId xmlns:p14="http://schemas.microsoft.com/office/powerpoint/2010/main" val="3083860739"/>
+      </p:ext>
+    </p:extLst>
+  </p:cSld>
+  <p:clrMapOvr>
+    <a:masterClrMapping/>
+  </p:clrMapOvr>
+</p:sld>
+</file>
+
+<file path=ppt/slides/slide15.xml><?xml version="1.0" encoding="utf-8"?>
+<p:sld xmlns:a="http://schemas.openxmlformats.org/drawingml/2006/main" xmlns:r="http://schemas.openxmlformats.org/officeDocument/2006/relationships" xmlns:p="http://schemas.openxmlformats.org/presentationml/2006/main">
+  <p:cSld>
+    <p:spTree>
+      <p:nvGrpSpPr>
+        <p:cNvPr id="1" name=""/>
+        <p:cNvGrpSpPr/>
+        <p:nvPr/>
+      </p:nvGrpSpPr>
+      <p:grpSpPr>
+        <a:xfrm>
+          <a:off x="0" y="0"/>
+          <a:ext cx="0" cy="0"/>
+          <a:chOff x="0" y="0"/>
+          <a:chExt cx="0" cy="0"/>
+        </a:xfrm>
+      </p:grpSpPr>
+      <p:sp>
+        <p:nvSpPr>
+          <p:cNvPr id="2" name="Title 1">
+            <a:extLst>
+              <a:ext uri="{FF2B5EF4-FFF2-40B4-BE49-F238E27FC236}">
+                <a16:creationId xmlns:a16="http://schemas.microsoft.com/office/drawing/2014/main" id="{77FE23DC-5B4C-43C4-B44E-E594F5DF7662}"/>
+              </a:ext>
+            </a:extLst>
+          </p:cNvPr>
+          <p:cNvSpPr>
+            <a:spLocks noGrp="1"/>
+          </p:cNvSpPr>
+          <p:nvPr>
+            <p:ph type="title"/>
+          </p:nvPr>
+        </p:nvSpPr>
+        <p:spPr/>
+        <p:txBody>
+          <a:bodyPr/>
+          <a:lstStyle/>
+          <a:p>
+            <a:r>
+              <a:rPr lang="en-US" dirty="0"/>
+              <a:t>Load Custom Corpus</a:t>
+            </a:r>
+          </a:p>
+        </p:txBody>
+      </p:sp>
+      <p:pic>
+        <p:nvPicPr>
+          <p:cNvPr id="4" name="Content Placeholder 3">
+            <a:extLst>
+              <a:ext uri="{FF2B5EF4-FFF2-40B4-BE49-F238E27FC236}">
+                <a16:creationId xmlns:a16="http://schemas.microsoft.com/office/drawing/2014/main" id="{AB2C2705-9CDA-451C-A842-F815F75DD2F0}"/>
+              </a:ext>
+            </a:extLst>
+          </p:cNvPr>
+          <p:cNvPicPr>
+            <a:picLocks noGrp="1" noChangeAspect="1"/>
+          </p:cNvPicPr>
+          <p:nvPr>
+            <p:ph idx="1"/>
+          </p:nvPr>
+        </p:nvPicPr>
+        <p:blipFill>
+          <a:blip r:embed="rId2"/>
+          <a:stretch>
+            <a:fillRect/>
+          </a:stretch>
+        </p:blipFill>
+        <p:spPr>
+          <a:xfrm>
+            <a:off x="838199" y="1690688"/>
+            <a:ext cx="10515599" cy="4894228"/>
+          </a:xfrm>
+          <a:prstGeom prst="rect">
+            <a:avLst/>
+          </a:prstGeom>
+        </p:spPr>
+      </p:pic>
+    </p:spTree>
+    <p:extLst>
+      <p:ext uri="{BB962C8B-B14F-4D97-AF65-F5344CB8AC3E}">
+        <p14:creationId xmlns:p14="http://schemas.microsoft.com/office/powerpoint/2010/main" val="2524533551"/>
+      </p:ext>
+    </p:extLst>
+  </p:cSld>
+  <p:clrMapOvr>
+    <a:masterClrMapping/>
+  </p:clrMapOvr>
+</p:sld>
+</file>
+
+<file path=ppt/slides/slide16.xml><?xml version="1.0" encoding="utf-8"?>
+<p:sld xmlns:a="http://schemas.openxmlformats.org/drawingml/2006/main" xmlns:r="http://schemas.openxmlformats.org/officeDocument/2006/relationships" xmlns:p="http://schemas.openxmlformats.org/presentationml/2006/main">
+  <p:cSld>
+    <p:spTree>
+      <p:nvGrpSpPr>
+        <p:cNvPr id="1" name=""/>
+        <p:cNvGrpSpPr/>
+        <p:nvPr/>
+      </p:nvGrpSpPr>
+      <p:grpSpPr>
+        <a:xfrm>
+          <a:off x="0" y="0"/>
+          <a:ext cx="0" cy="0"/>
+          <a:chOff x="0" y="0"/>
+          <a:chExt cx="0" cy="0"/>
+        </a:xfrm>
+      </p:grpSpPr>
+      <p:sp>
+        <p:nvSpPr>
+          <p:cNvPr id="2" name="Title 1">
+            <a:extLst>
+              <a:ext uri="{FF2B5EF4-FFF2-40B4-BE49-F238E27FC236}">
+                <a16:creationId xmlns:a16="http://schemas.microsoft.com/office/drawing/2014/main" id="{23A7F42F-662E-4E7B-B152-8FB7478AB04E}"/>
+              </a:ext>
+            </a:extLst>
+          </p:cNvPr>
+          <p:cNvSpPr>
+            <a:spLocks noGrp="1"/>
+          </p:cNvSpPr>
+          <p:nvPr>
+            <p:ph type="title"/>
+          </p:nvPr>
+        </p:nvSpPr>
+        <p:spPr/>
+        <p:txBody>
+          <a:bodyPr/>
+          <a:lstStyle/>
+          <a:p>
+            <a:r>
+              <a:rPr lang="en-US" dirty="0"/>
+              <a:t>Train Model</a:t>
+            </a:r>
+          </a:p>
+        </p:txBody>
+      </p:sp>
+      <p:pic>
+        <p:nvPicPr>
+          <p:cNvPr id="4" name="Content Placeholder 3">
+            <a:extLst>
+              <a:ext uri="{FF2B5EF4-FFF2-40B4-BE49-F238E27FC236}">
+                <a16:creationId xmlns:a16="http://schemas.microsoft.com/office/drawing/2014/main" id="{D1D71AB0-0504-41B3-BA01-6D83DD579660}"/>
+              </a:ext>
+            </a:extLst>
+          </p:cNvPr>
+          <p:cNvPicPr>
+            <a:picLocks noGrp="1" noChangeAspect="1"/>
+          </p:cNvPicPr>
+          <p:nvPr>
+            <p:ph idx="1"/>
+          </p:nvPr>
+        </p:nvPicPr>
+        <p:blipFill>
+          <a:blip r:embed="rId3"/>
+          <a:stretch>
+            <a:fillRect/>
+          </a:stretch>
+        </p:blipFill>
+        <p:spPr>
+          <a:xfrm>
+            <a:off x="4812700" y="1690688"/>
+            <a:ext cx="6869634" cy="4622319"/>
+          </a:xfrm>
+          <a:prstGeom prst="rect">
+            <a:avLst/>
+          </a:prstGeom>
+        </p:spPr>
+      </p:pic>
+      <p:sp>
+        <p:nvSpPr>
+          <p:cNvPr id="5" name="TextBox 4">
+            <a:extLst>
+              <a:ext uri="{FF2B5EF4-FFF2-40B4-BE49-F238E27FC236}">
+                <a16:creationId xmlns:a16="http://schemas.microsoft.com/office/drawing/2014/main" id="{95542852-1724-44F0-B1CD-2765F4FD88F2}"/>
+              </a:ext>
+            </a:extLst>
+          </p:cNvPr>
+          <p:cNvSpPr txBox="1"/>
+          <p:nvPr/>
+        </p:nvSpPr>
+        <p:spPr>
+          <a:xfrm>
+            <a:off x="509666" y="1690688"/>
+            <a:ext cx="3974500" cy="2800767"/>
+          </a:xfrm>
+          <a:prstGeom prst="rect">
+            <a:avLst/>
+          </a:prstGeom>
+          <a:noFill/>
+        </p:spPr>
+        <p:txBody>
+          <a:bodyPr wrap="square" rtlCol="0">
+            <a:spAutoFit/>
+          </a:bodyPr>
+          <a:lstStyle/>
+          <a:p>
+            <a:pPr marL="342900" indent="-342900">
+              <a:buFont typeface="Arial" panose="020B0604020202020204" pitchFamily="34" charset="0"/>
+              <a:buChar char="•"/>
+            </a:pPr>
+            <a:r>
+              <a:rPr lang="en-US" sz="2200" dirty="0"/>
+              <a:t>On hold until I get GPU access</a:t>
+            </a:r>
+            <a:br>
+              <a:rPr lang="en-US" sz="2200" dirty="0"/>
+            </a:br>
+            <a:endParaRPr lang="en-US" sz="2200" dirty="0"/>
+          </a:p>
+          <a:p>
+            <a:pPr marL="342900" indent="-342900">
+              <a:buFont typeface="Arial" panose="020B0604020202020204" pitchFamily="34" charset="0"/>
+              <a:buChar char="•"/>
+            </a:pPr>
+            <a:r>
+              <a:rPr lang="en-US" sz="2200" dirty="0"/>
+              <a:t>Ran out of Google Cloud credits</a:t>
+            </a:r>
+            <a:br>
+              <a:rPr lang="en-US" sz="2200" dirty="0"/>
+            </a:br>
+            <a:endParaRPr lang="en-US" sz="2200" dirty="0"/>
+          </a:p>
+          <a:p>
+            <a:pPr marL="342900" indent="-342900">
+              <a:buFont typeface="Arial" panose="020B0604020202020204" pitchFamily="34" charset="0"/>
+              <a:buChar char="•"/>
+            </a:pPr>
+            <a:r>
+              <a:rPr lang="en-US" sz="2200" dirty="0"/>
+              <a:t>Requested access to LLNLs supercomputing resources, waiting on approvals</a:t>
+            </a:r>
+          </a:p>
+        </p:txBody>
+      </p:sp>
+    </p:spTree>
+    <p:extLst>
+      <p:ext uri="{BB962C8B-B14F-4D97-AF65-F5344CB8AC3E}">
+        <p14:creationId xmlns:p14="http://schemas.microsoft.com/office/powerpoint/2010/main" val="2573624081"/>
+      </p:ext>
+    </p:extLst>
+  </p:cSld>
+  <p:clrMapOvr>
+    <a:masterClrMapping/>
+  </p:clrMapOvr>
+</p:sld>
+</file>
+
+<file path=ppt/slides/slide17.xml><?xml version="1.0" encoding="utf-8"?>
+<p:sld xmlns:a="http://schemas.openxmlformats.org/drawingml/2006/main" xmlns:r="http://schemas.openxmlformats.org/officeDocument/2006/relationships" xmlns:p="http://schemas.openxmlformats.org/presentationml/2006/main">
+  <p:cSld>
+    <p:spTree>
+      <p:nvGrpSpPr>
+        <p:cNvPr id="1" name=""/>
+        <p:cNvGrpSpPr/>
+        <p:nvPr/>
+      </p:nvGrpSpPr>
+      <p:grpSpPr>
+        <a:xfrm>
+          <a:off x="0" y="0"/>
+          <a:ext cx="0" cy="0"/>
+          <a:chOff x="0" y="0"/>
+          <a:chExt cx="0" cy="0"/>
+        </a:xfrm>
+      </p:grpSpPr>
+      <p:sp>
+        <p:nvSpPr>
+          <p:cNvPr id="2" name="Title 1">
+            <a:extLst>
+              <a:ext uri="{FF2B5EF4-FFF2-40B4-BE49-F238E27FC236}">
                 <a16:creationId xmlns:a16="http://schemas.microsoft.com/office/drawing/2014/main" id="{2CFB9743-92D3-4D76-AB9B-DB6E2C6FF9E3}"/>
               </a:ext>
             </a:extLst>
@@ -4112,16 +5697,15 @@
             <p:ph idx="1"/>
           </p:nvPr>
         </p:nvSpPr>
-        <p:spPr/>
-        <p:txBody>
-          <a:bodyPr/>
-          <a:lstStyle/>
-          <a:p>
-            <a:r>
-              <a:rPr lang="en-US" dirty="0"/>
-              <a:t>Type aliases make it difficult to tokenize/predict accurately</a:t>
-            </a:r>
-          </a:p>
+        <p:spPr>
+          <a:xfrm>
+            <a:off x="838200" y="1687487"/>
+            <a:ext cx="10515600" cy="1509714"/>
+          </a:xfrm>
+        </p:spPr>
+        <p:txBody>
+          <a:bodyPr/>
+          <a:lstStyle/>
           <a:p>
             <a:r>
               <a:rPr lang="en-US" dirty="0"/>
@@ -4206,6 +5790,296 @@
 </p:sld>
 </file>
 
+<file path=ppt/slides/slide18.xml><?xml version="1.0" encoding="utf-8"?>
+<p:sld xmlns:a="http://schemas.openxmlformats.org/drawingml/2006/main" xmlns:r="http://schemas.openxmlformats.org/officeDocument/2006/relationships" xmlns:p="http://schemas.openxmlformats.org/presentationml/2006/main">
+  <p:cSld>
+    <p:spTree>
+      <p:nvGrpSpPr>
+        <p:cNvPr id="1" name=""/>
+        <p:cNvGrpSpPr/>
+        <p:nvPr/>
+      </p:nvGrpSpPr>
+      <p:grpSpPr>
+        <a:xfrm>
+          <a:off x="0" y="0"/>
+          <a:ext cx="0" cy="0"/>
+          <a:chOff x="0" y="0"/>
+          <a:chExt cx="0" cy="0"/>
+        </a:xfrm>
+      </p:grpSpPr>
+      <p:sp>
+        <p:nvSpPr>
+          <p:cNvPr id="2" name="Title 1">
+            <a:extLst>
+              <a:ext uri="{FF2B5EF4-FFF2-40B4-BE49-F238E27FC236}">
+                <a16:creationId xmlns:a16="http://schemas.microsoft.com/office/drawing/2014/main" id="{47A33ADF-206C-4293-B8AB-77F9E2FBC86E}"/>
+              </a:ext>
+            </a:extLst>
+          </p:cNvPr>
+          <p:cNvSpPr>
+            <a:spLocks noGrp="1"/>
+          </p:cNvSpPr>
+          <p:nvPr>
+            <p:ph type="title"/>
+          </p:nvPr>
+        </p:nvSpPr>
+        <p:spPr>
+          <a:xfrm>
+            <a:off x="838200" y="365125"/>
+            <a:ext cx="10515600" cy="1325563"/>
+          </a:xfrm>
+        </p:spPr>
+        <p:txBody>
+          <a:bodyPr/>
+          <a:lstStyle/>
+          <a:p>
+            <a:r>
+              <a:rPr lang="en-US" dirty="0"/>
+              <a:t>Challenges</a:t>
+            </a:r>
+          </a:p>
+        </p:txBody>
+      </p:sp>
+      <p:pic>
+        <p:nvPicPr>
+          <p:cNvPr id="4" name="Content Placeholder 3">
+            <a:extLst>
+              <a:ext uri="{FF2B5EF4-FFF2-40B4-BE49-F238E27FC236}">
+                <a16:creationId xmlns:a16="http://schemas.microsoft.com/office/drawing/2014/main" id="{FEB84F87-E94A-473D-A09C-72B4F99CAFCF}"/>
+              </a:ext>
+            </a:extLst>
+          </p:cNvPr>
+          <p:cNvPicPr>
+            <a:picLocks noGrp="1" noChangeAspect="1"/>
+          </p:cNvPicPr>
+          <p:nvPr>
+            <p:ph idx="1"/>
+          </p:nvPr>
+        </p:nvPicPr>
+        <p:blipFill>
+          <a:blip r:embed="rId2"/>
+          <a:stretch>
+            <a:fillRect/>
+          </a:stretch>
+        </p:blipFill>
+        <p:spPr>
+          <a:xfrm>
+            <a:off x="2203554" y="2563234"/>
+            <a:ext cx="9150246" cy="3929641"/>
+          </a:xfrm>
+          <a:prstGeom prst="rect">
+            <a:avLst/>
+          </a:prstGeom>
+        </p:spPr>
+      </p:pic>
+      <p:sp>
+        <p:nvSpPr>
+          <p:cNvPr id="3" name="Rectangle 2">
+            <a:extLst>
+              <a:ext uri="{FF2B5EF4-FFF2-40B4-BE49-F238E27FC236}">
+                <a16:creationId xmlns:a16="http://schemas.microsoft.com/office/drawing/2014/main" id="{A350DCE8-DA7E-4B3E-B1D7-598AF6B195D4}"/>
+              </a:ext>
+            </a:extLst>
+          </p:cNvPr>
+          <p:cNvSpPr/>
+          <p:nvPr/>
+        </p:nvSpPr>
+        <p:spPr>
+          <a:xfrm>
+            <a:off x="838200" y="1690688"/>
+            <a:ext cx="9040873" cy="523220"/>
+          </a:xfrm>
+          <a:prstGeom prst="rect">
+            <a:avLst/>
+          </a:prstGeom>
+        </p:spPr>
+        <p:txBody>
+          <a:bodyPr wrap="none">
+            <a:spAutoFit/>
+          </a:bodyPr>
+          <a:lstStyle/>
+          <a:p>
+            <a:pPr marL="342900" indent="-342900">
+              <a:buFont typeface="Arial" panose="020B0604020202020204" pitchFamily="34" charset="0"/>
+              <a:buChar char="•"/>
+            </a:pPr>
+            <a:r>
+              <a:rPr lang="en-US" sz="2800" dirty="0"/>
+              <a:t>Type aliases make it difficult to tokenize/predict accurately</a:t>
+            </a:r>
+          </a:p>
+        </p:txBody>
+      </p:sp>
+    </p:spTree>
+    <p:extLst>
+      <p:ext uri="{BB962C8B-B14F-4D97-AF65-F5344CB8AC3E}">
+        <p14:creationId xmlns:p14="http://schemas.microsoft.com/office/powerpoint/2010/main" val="3767211261"/>
+      </p:ext>
+    </p:extLst>
+  </p:cSld>
+  <p:clrMapOvr>
+    <a:masterClrMapping/>
+  </p:clrMapOvr>
+</p:sld>
+</file>
+
+<file path=ppt/slides/slide19.xml><?xml version="1.0" encoding="utf-8"?>
+<p:sld xmlns:a="http://schemas.openxmlformats.org/drawingml/2006/main" xmlns:r="http://schemas.openxmlformats.org/officeDocument/2006/relationships" xmlns:p="http://schemas.openxmlformats.org/presentationml/2006/main">
+  <p:cSld>
+    <p:spTree>
+      <p:nvGrpSpPr>
+        <p:cNvPr id="1" name=""/>
+        <p:cNvGrpSpPr/>
+        <p:nvPr/>
+      </p:nvGrpSpPr>
+      <p:grpSpPr>
+        <a:xfrm>
+          <a:off x="0" y="0"/>
+          <a:ext cx="0" cy="0"/>
+          <a:chOff x="0" y="0"/>
+          <a:chExt cx="0" cy="0"/>
+        </a:xfrm>
+      </p:grpSpPr>
+      <p:sp>
+        <p:nvSpPr>
+          <p:cNvPr id="2" name="Title 1">
+            <a:extLst>
+              <a:ext uri="{FF2B5EF4-FFF2-40B4-BE49-F238E27FC236}">
+                <a16:creationId xmlns:a16="http://schemas.microsoft.com/office/drawing/2014/main" id="{E6B23100-516B-463B-916D-FD87C68464F8}"/>
+              </a:ext>
+            </a:extLst>
+          </p:cNvPr>
+          <p:cNvSpPr>
+            <a:spLocks noGrp="1"/>
+          </p:cNvSpPr>
+          <p:nvPr>
+            <p:ph type="title"/>
+          </p:nvPr>
+        </p:nvSpPr>
+        <p:spPr/>
+        <p:txBody>
+          <a:bodyPr/>
+          <a:lstStyle/>
+          <a:p>
+            <a:r>
+              <a:rPr lang="en-US" dirty="0"/>
+              <a:t>References</a:t>
+            </a:r>
+          </a:p>
+        </p:txBody>
+      </p:sp>
+      <p:sp>
+        <p:nvSpPr>
+          <p:cNvPr id="3" name="Content Placeholder 2">
+            <a:extLst>
+              <a:ext uri="{FF2B5EF4-FFF2-40B4-BE49-F238E27FC236}">
+                <a16:creationId xmlns:a16="http://schemas.microsoft.com/office/drawing/2014/main" id="{73485932-C31E-49B8-8B21-605283298FD6}"/>
+              </a:ext>
+            </a:extLst>
+          </p:cNvPr>
+          <p:cNvSpPr>
+            <a:spLocks noGrp="1"/>
+          </p:cNvSpPr>
+          <p:nvPr>
+            <p:ph idx="1"/>
+          </p:nvPr>
+        </p:nvSpPr>
+        <p:spPr>
+          <a:xfrm>
+            <a:off x="838200" y="1855605"/>
+            <a:ext cx="10515600" cy="4351338"/>
+          </a:xfrm>
+        </p:spPr>
+        <p:txBody>
+          <a:bodyPr/>
+          <a:lstStyle/>
+          <a:p>
+            <a:r>
+              <a:rPr lang="en-US" dirty="0"/>
+              <a:t>Survey Data </a:t>
+            </a:r>
+            <a:r>
+              <a:rPr lang="en-US" dirty="0">
+                <a:hlinkClick r:id="rId3"/>
+              </a:rPr>
+              <a:t>https://insights.stackoverflow.com/survey/2019#technology</a:t>
+            </a:r>
+            <a:br>
+              <a:rPr lang="en-US" dirty="0"/>
+            </a:br>
+            <a:endParaRPr lang="en-US" dirty="0"/>
+          </a:p>
+          <a:p>
+            <a:r>
+              <a:rPr lang="en-US" dirty="0" err="1"/>
+              <a:t>DeepTyper</a:t>
+            </a:r>
+            <a:br>
+              <a:rPr lang="en-US" dirty="0"/>
+            </a:br>
+            <a:r>
+              <a:rPr lang="en-US" dirty="0">
+                <a:hlinkClick r:id="rId4"/>
+              </a:rPr>
+              <a:t>http://vhellendoorn.github.io/PDF/fse2018-j2t.pdf</a:t>
+            </a:r>
+            <a:br>
+              <a:rPr lang="en-US" dirty="0"/>
+            </a:br>
+            <a:r>
+              <a:rPr lang="en-US" dirty="0">
+                <a:hlinkClick r:id="rId5"/>
+              </a:rPr>
+              <a:t>https://github.com/DeepTyper/DeepTyper</a:t>
+            </a:r>
+            <a:br>
+              <a:rPr lang="en-US" dirty="0"/>
+            </a:br>
+            <a:endParaRPr lang="en-US" dirty="0"/>
+          </a:p>
+          <a:p>
+            <a:r>
+              <a:rPr lang="en-US" dirty="0"/>
+              <a:t>Flair</a:t>
+            </a:r>
+            <a:br>
+              <a:rPr lang="en-US" dirty="0"/>
+            </a:br>
+            <a:r>
+              <a:rPr lang="en-US" dirty="0">
+                <a:hlinkClick r:id="rId6"/>
+              </a:rPr>
+              <a:t>http://alanakbik.github.io/papers/coling2018.pdf</a:t>
+            </a:r>
+            <a:br>
+              <a:rPr lang="en-US" dirty="0"/>
+            </a:br>
+            <a:r>
+              <a:rPr lang="en-US" dirty="0">
+                <a:hlinkClick r:id="rId7"/>
+              </a:rPr>
+              <a:t>https://github.com/zalandoresearch/flair</a:t>
+            </a:r>
+            <a:endParaRPr lang="en-US" dirty="0"/>
+          </a:p>
+          <a:p>
+            <a:endParaRPr lang="en-US" dirty="0"/>
+          </a:p>
+        </p:txBody>
+      </p:sp>
+    </p:spTree>
+    <p:extLst>
+      <p:ext uri="{BB962C8B-B14F-4D97-AF65-F5344CB8AC3E}">
+        <p14:creationId xmlns:p14="http://schemas.microsoft.com/office/powerpoint/2010/main" val="2267114226"/>
+      </p:ext>
+    </p:extLst>
+  </p:cSld>
+  <p:clrMapOvr>
+    <a:masterClrMapping/>
+  </p:clrMapOvr>
+</p:sld>
+</file>
+
 <file path=ppt/slides/slide2.xml><?xml version="1.0" encoding="utf-8"?>
 <p:sld xmlns:a="http://schemas.openxmlformats.org/drawingml/2006/main" xmlns:r="http://schemas.openxmlformats.org/officeDocument/2006/relationships" xmlns:p="http://schemas.openxmlformats.org/presentationml/2006/main">
   <p:cSld>
@@ -4228,7 +6102,7 @@
           <p:cNvPr id="2" name="Title 1">
             <a:extLst>
               <a:ext uri="{FF2B5EF4-FFF2-40B4-BE49-F238E27FC236}">
-                <a16:creationId xmlns:a16="http://schemas.microsoft.com/office/drawing/2014/main" id="{80EEF33D-69CF-45CC-879A-61B7B4DF05AB}"/>
+                <a16:creationId xmlns:a16="http://schemas.microsoft.com/office/drawing/2014/main" id="{CE166308-5588-474A-9412-57DD66666A6D}"/>
               </a:ext>
             </a:extLst>
           </p:cNvPr>
@@ -4239,127 +6113,103 @@
             <p:ph type="title"/>
           </p:nvPr>
         </p:nvSpPr>
-        <p:spPr>
-          <a:xfrm>
-            <a:off x="838200" y="365125"/>
-            <a:ext cx="10515600" cy="1325563"/>
-          </a:xfrm>
-        </p:spPr>
-        <p:txBody>
-          <a:bodyPr/>
-          <a:lstStyle/>
-          <a:p>
-            <a:r>
-              <a:rPr lang="en-US"/>
-              <a:t>Python Types</a:t>
-            </a:r>
+        <p:spPr/>
+        <p:txBody>
+          <a:bodyPr/>
+          <a:lstStyle/>
+          <a:p>
+            <a:r>
+              <a:rPr lang="en-US" dirty="0"/>
+              <a:t>Overview</a:t>
+            </a:r>
+          </a:p>
+        </p:txBody>
+      </p:sp>
+      <p:sp>
+        <p:nvSpPr>
+          <p:cNvPr id="3" name="Content Placeholder 2">
+            <a:extLst>
+              <a:ext uri="{FF2B5EF4-FFF2-40B4-BE49-F238E27FC236}">
+                <a16:creationId xmlns:a16="http://schemas.microsoft.com/office/drawing/2014/main" id="{CF1305AA-4C47-411F-B640-08B6DC8ABDEA}"/>
+              </a:ext>
+            </a:extLst>
+          </p:cNvPr>
+          <p:cNvSpPr>
+            <a:spLocks noGrp="1"/>
+          </p:cNvSpPr>
+          <p:nvPr>
+            <p:ph idx="1"/>
+          </p:nvPr>
+        </p:nvSpPr>
+        <p:spPr/>
+        <p:txBody>
+          <a:bodyPr/>
+          <a:lstStyle/>
+          <a:p>
+            <a:r>
+              <a:rPr lang="en-US" dirty="0"/>
+              <a:t>Python Typing</a:t>
+            </a:r>
+          </a:p>
+          <a:p>
+            <a:pPr lvl="1"/>
+            <a:r>
+              <a:rPr lang="en-US" dirty="0"/>
+              <a:t>Introduction</a:t>
+            </a:r>
+          </a:p>
+          <a:p>
+            <a:pPr lvl="1"/>
+            <a:r>
+              <a:rPr lang="en-US" dirty="0"/>
+              <a:t>Pros/Cons</a:t>
+            </a:r>
+          </a:p>
+          <a:p>
+            <a:r>
+              <a:rPr lang="en-US" dirty="0"/>
+              <a:t>Prior Work</a:t>
+            </a:r>
+          </a:p>
+          <a:p>
+            <a:r>
+              <a:rPr lang="en-US" dirty="0"/>
+              <a:t>Goals</a:t>
+            </a:r>
+          </a:p>
+          <a:p>
+            <a:r>
+              <a:rPr lang="en-US" dirty="0"/>
+              <a:t>Applications</a:t>
+            </a:r>
+          </a:p>
+          <a:p>
+            <a:r>
+              <a:rPr lang="en-US" dirty="0"/>
+              <a:t>Current Work</a:t>
+            </a:r>
+          </a:p>
+          <a:p>
+            <a:r>
+              <a:rPr lang="en-US" dirty="0"/>
+              <a:t>Future Work</a:t>
+            </a:r>
+          </a:p>
+          <a:p>
+            <a:r>
+              <a:rPr lang="en-US" dirty="0"/>
+              <a:t>Challenges</a:t>
+            </a:r>
+          </a:p>
+          <a:p>
             <a:endParaRPr lang="en-US" dirty="0"/>
           </a:p>
         </p:txBody>
       </p:sp>
-      <p:sp>
-        <p:nvSpPr>
-          <p:cNvPr id="3" name="Content Placeholder 2">
-            <a:extLst>
-              <a:ext uri="{FF2B5EF4-FFF2-40B4-BE49-F238E27FC236}">
-                <a16:creationId xmlns:a16="http://schemas.microsoft.com/office/drawing/2014/main" id="{03ECCE98-64A8-4ABB-80A6-2C658A91ADCB}"/>
-              </a:ext>
-            </a:extLst>
-          </p:cNvPr>
-          <p:cNvSpPr>
-            <a:spLocks noGrp="1"/>
-          </p:cNvSpPr>
-          <p:nvPr>
-            <p:ph idx="1"/>
-          </p:nvPr>
-        </p:nvSpPr>
-        <p:spPr>
-          <a:xfrm>
-            <a:off x="838200" y="1825625"/>
-            <a:ext cx="10515600" cy="4351338"/>
-          </a:xfrm>
-        </p:spPr>
-        <p:txBody>
-          <a:bodyPr/>
-          <a:lstStyle/>
-          <a:p>
-            <a:r>
-              <a:rPr lang="en-US" dirty="0">
-                <a:hlinkClick r:id="rId2"/>
-              </a:rPr>
-              <a:t>PEP 3107</a:t>
-            </a:r>
-            <a:r>
-              <a:rPr lang="en-US" dirty="0"/>
-              <a:t> – Function Annotations – Dec 2006</a:t>
-            </a:r>
-          </a:p>
-          <a:p>
-            <a:r>
-              <a:rPr lang="en-US" dirty="0">
-                <a:hlinkClick r:id="rId3"/>
-              </a:rPr>
-              <a:t>PEP 484</a:t>
-            </a:r>
-            <a:r>
-              <a:rPr lang="en-US" dirty="0"/>
-              <a:t> – Type Hints – Sept 2014</a:t>
-            </a:r>
-          </a:p>
-          <a:p>
-            <a:r>
-              <a:rPr lang="en-US" dirty="0">
-                <a:hlinkClick r:id="rId4"/>
-              </a:rPr>
-              <a:t>PEP 526</a:t>
-            </a:r>
-            <a:r>
-              <a:rPr lang="en-US" dirty="0"/>
-              <a:t> – Variable Annotations – Aug 2016</a:t>
-            </a:r>
-          </a:p>
-          <a:p>
-            <a:r>
-              <a:rPr lang="en-US" dirty="0"/>
-              <a:t>Typing officially supported with Python 3.6 (released Dec 23, 2016)</a:t>
-            </a:r>
-          </a:p>
-        </p:txBody>
-      </p:sp>
-      <p:pic>
-        <p:nvPicPr>
-          <p:cNvPr id="4" name="Picture 3" descr="A screenshot of a cell phone&#10;&#10;Description automatically generated">
-            <a:extLst>
-              <a:ext uri="{FF2B5EF4-FFF2-40B4-BE49-F238E27FC236}">
-                <a16:creationId xmlns:a16="http://schemas.microsoft.com/office/drawing/2014/main" id="{4AAD23C0-F5B9-4BE9-B5C6-342435DB86FC}"/>
-              </a:ext>
-            </a:extLst>
-          </p:cNvPr>
-          <p:cNvPicPr>
-            <a:picLocks noChangeAspect="1"/>
-          </p:cNvPicPr>
-          <p:nvPr/>
-        </p:nvPicPr>
-        <p:blipFill>
-          <a:blip r:embed="rId5"/>
-          <a:stretch>
-            <a:fillRect/>
-          </a:stretch>
-        </p:blipFill>
-        <p:spPr>
-          <a:xfrm>
-            <a:off x="3176738" y="4351667"/>
-            <a:ext cx="5838524" cy="1749523"/>
-          </a:xfrm>
-          <a:prstGeom prst="rect">
-            <a:avLst/>
-          </a:prstGeom>
-        </p:spPr>
-      </p:pic>
     </p:spTree>
     <p:extLst>
       <p:ext uri="{BB962C8B-B14F-4D97-AF65-F5344CB8AC3E}">
-        <p14:creationId xmlns:p14="http://schemas.microsoft.com/office/powerpoint/2010/main" val="2251587020"/>
+        <p14:creationId xmlns:p14="http://schemas.microsoft.com/office/powerpoint/2010/main" val="3058943662"/>
       </p:ext>
     </p:extLst>
   </p:cSld>
@@ -4391,7 +6241,7 @@
           <p:cNvPr id="2" name="Title 1">
             <a:extLst>
               <a:ext uri="{FF2B5EF4-FFF2-40B4-BE49-F238E27FC236}">
-                <a16:creationId xmlns:a16="http://schemas.microsoft.com/office/drawing/2014/main" id="{F102F116-581C-4C28-B907-80A3364FBC43}"/>
+                <a16:creationId xmlns:a16="http://schemas.microsoft.com/office/drawing/2014/main" id="{BE500400-8EA6-49FE-B162-FB1A0BC5CEFF}"/>
               </a:ext>
             </a:extLst>
           </p:cNvPr>
@@ -4409,7 +6259,7 @@
           <a:p>
             <a:r>
               <a:rPr lang="en-US" dirty="0"/>
-              <a:t>Why Typing?</a:t>
+              <a:t>Dynamically Typed Languages</a:t>
             </a:r>
           </a:p>
         </p:txBody>
@@ -4419,7 +6269,7 @@
           <p:cNvPr id="3" name="Content Placeholder 2">
             <a:extLst>
               <a:ext uri="{FF2B5EF4-FFF2-40B4-BE49-F238E27FC236}">
-                <a16:creationId xmlns:a16="http://schemas.microsoft.com/office/drawing/2014/main" id="{757F795A-C700-49B6-9204-A36BD2CB908F}"/>
+                <a16:creationId xmlns:a16="http://schemas.microsoft.com/office/drawing/2014/main" id="{4A9853C4-2661-4C2F-985C-909B153577E9}"/>
               </a:ext>
             </a:extLst>
           </p:cNvPr>
@@ -4437,42 +6287,118 @@
           <a:p>
             <a:r>
               <a:rPr lang="en-US" dirty="0"/>
-              <a:t>15% of bugs in JavaScript could be prevented by type annotations</a:t>
-            </a:r>
-          </a:p>
-          <a:p>
-            <a:r>
-              <a:rPr lang="en-US" dirty="0"/>
-              <a:t>Lack of types:</a:t>
-            </a:r>
-          </a:p>
-          <a:p>
-            <a:pPr lvl="1"/>
-            <a:r>
-              <a:rPr lang="en-US" dirty="0"/>
-              <a:t>Hard to understand APIs</a:t>
-            </a:r>
-          </a:p>
-          <a:p>
-            <a:pPr lvl="1"/>
-            <a:r>
-              <a:rPr lang="en-US" dirty="0"/>
-              <a:t>Difficult to read, maintain, and document</a:t>
-            </a:r>
-          </a:p>
-          <a:p>
-            <a:pPr lvl="1"/>
-            <a:r>
-              <a:rPr lang="en-US" dirty="0"/>
-              <a:t>Poor IDE support</a:t>
-            </a:r>
+              <a:t>JavaScript -&gt; TypeScript</a:t>
+            </a:r>
+          </a:p>
+          <a:p>
+            <a:r>
+              <a:rPr lang="en-US" dirty="0"/>
+              <a:t>Python -&gt; typing module</a:t>
+            </a:r>
+          </a:p>
+        </p:txBody>
+      </p:sp>
+      <p:pic>
+        <p:nvPicPr>
+          <p:cNvPr id="4" name="Picture 3">
+            <a:extLst>
+              <a:ext uri="{FF2B5EF4-FFF2-40B4-BE49-F238E27FC236}">
+                <a16:creationId xmlns:a16="http://schemas.microsoft.com/office/drawing/2014/main" id="{1BC04951-070E-4B93-838E-98A9548F5950}"/>
+              </a:ext>
+            </a:extLst>
+          </p:cNvPr>
+          <p:cNvPicPr>
+            <a:picLocks noChangeAspect="1"/>
+          </p:cNvPicPr>
+          <p:nvPr/>
+        </p:nvPicPr>
+        <p:blipFill>
+          <a:blip r:embed="rId3"/>
+          <a:stretch>
+            <a:fillRect/>
+          </a:stretch>
+        </p:blipFill>
+        <p:spPr>
+          <a:xfrm>
+            <a:off x="4852914" y="1376363"/>
+            <a:ext cx="6505575" cy="2524125"/>
+          </a:xfrm>
+          <a:prstGeom prst="rect">
+            <a:avLst/>
+          </a:prstGeom>
+        </p:spPr>
+      </p:pic>
+      <p:pic>
+        <p:nvPicPr>
+          <p:cNvPr id="5" name="Picture 4">
+            <a:extLst>
+              <a:ext uri="{FF2B5EF4-FFF2-40B4-BE49-F238E27FC236}">
+                <a16:creationId xmlns:a16="http://schemas.microsoft.com/office/drawing/2014/main" id="{A12BF33D-D6D5-4A59-B400-57A25CA89BE6}"/>
+              </a:ext>
+            </a:extLst>
+          </p:cNvPr>
+          <p:cNvPicPr>
+            <a:picLocks noChangeAspect="1"/>
+          </p:cNvPicPr>
+          <p:nvPr/>
+        </p:nvPicPr>
+        <p:blipFill>
+          <a:blip r:embed="rId4"/>
+          <a:stretch>
+            <a:fillRect/>
+          </a:stretch>
+        </p:blipFill>
+        <p:spPr>
+          <a:xfrm>
+            <a:off x="4852914" y="4124473"/>
+            <a:ext cx="6438900" cy="2276475"/>
+          </a:xfrm>
+          <a:prstGeom prst="rect">
+            <a:avLst/>
+          </a:prstGeom>
+        </p:spPr>
+      </p:pic>
+      <p:sp>
+        <p:nvSpPr>
+          <p:cNvPr id="6" name="Rectangle 5">
+            <a:extLst>
+              <a:ext uri="{FF2B5EF4-FFF2-40B4-BE49-F238E27FC236}">
+                <a16:creationId xmlns:a16="http://schemas.microsoft.com/office/drawing/2014/main" id="{1F1D3B31-D1F7-4A2B-A529-A6D8657ADFDD}"/>
+              </a:ext>
+            </a:extLst>
+          </p:cNvPr>
+          <p:cNvSpPr/>
+          <p:nvPr/>
+        </p:nvSpPr>
+        <p:spPr>
+          <a:xfrm>
+            <a:off x="265430" y="5807631"/>
+            <a:ext cx="5830570" cy="369332"/>
+          </a:xfrm>
+          <a:prstGeom prst="rect">
+            <a:avLst/>
+          </a:prstGeom>
+        </p:spPr>
+        <p:txBody>
+          <a:bodyPr wrap="none">
+            <a:spAutoFit/>
+          </a:bodyPr>
+          <a:lstStyle/>
+          <a:p>
+            <a:r>
+              <a:rPr lang="en-US" dirty="0">
+                <a:hlinkClick r:id="rId5"/>
+              </a:rPr>
+              <a:t>https://insights.stackoverflow.com/survey/2019#technology</a:t>
+            </a:r>
+            <a:endParaRPr lang="en-US" dirty="0"/>
           </a:p>
         </p:txBody>
       </p:sp>
     </p:spTree>
     <p:extLst>
       <p:ext uri="{BB962C8B-B14F-4D97-AF65-F5344CB8AC3E}">
-        <p14:creationId xmlns:p14="http://schemas.microsoft.com/office/powerpoint/2010/main" val="84338700"/>
+        <p14:creationId xmlns:p14="http://schemas.microsoft.com/office/powerpoint/2010/main" val="4038175418"/>
       </p:ext>
     </p:extLst>
   </p:cSld>
@@ -4504,7 +6430,7 @@
           <p:cNvPr id="2" name="Title 1">
             <a:extLst>
               <a:ext uri="{FF2B5EF4-FFF2-40B4-BE49-F238E27FC236}">
-                <a16:creationId xmlns:a16="http://schemas.microsoft.com/office/drawing/2014/main" id="{BE500400-8EA6-49FE-B162-FB1A0BC5CEFF}"/>
+                <a16:creationId xmlns:a16="http://schemas.microsoft.com/office/drawing/2014/main" id="{F102F116-581C-4C28-B907-80A3364FBC43}"/>
               </a:ext>
             </a:extLst>
           </p:cNvPr>
@@ -4522,7 +6448,7 @@
           <a:p>
             <a:r>
               <a:rPr lang="en-US" dirty="0"/>
-              <a:t>Dynamically Typed Languages</a:t>
+              <a:t>Why Typing?</a:t>
             </a:r>
           </a:p>
         </p:txBody>
@@ -4532,7 +6458,7 @@
           <p:cNvPr id="3" name="Content Placeholder 2">
             <a:extLst>
               <a:ext uri="{FF2B5EF4-FFF2-40B4-BE49-F238E27FC236}">
-                <a16:creationId xmlns:a16="http://schemas.microsoft.com/office/drawing/2014/main" id="{4A9853C4-2661-4C2F-985C-909B153577E9}"/>
+                <a16:creationId xmlns:a16="http://schemas.microsoft.com/office/drawing/2014/main" id="{757F795A-C700-49B6-9204-A36BD2CB908F}"/>
               </a:ext>
             </a:extLst>
           </p:cNvPr>
@@ -4550,118 +6476,42 @@
           <a:p>
             <a:r>
               <a:rPr lang="en-US" dirty="0"/>
-              <a:t>JavaScript -&gt; TypeScript</a:t>
-            </a:r>
-          </a:p>
-          <a:p>
-            <a:r>
-              <a:rPr lang="en-US" dirty="0"/>
-              <a:t>Python -&gt; typing module</a:t>
-            </a:r>
-          </a:p>
-        </p:txBody>
-      </p:sp>
-      <p:pic>
-        <p:nvPicPr>
-          <p:cNvPr id="4" name="Picture 3">
-            <a:extLst>
-              <a:ext uri="{FF2B5EF4-FFF2-40B4-BE49-F238E27FC236}">
-                <a16:creationId xmlns:a16="http://schemas.microsoft.com/office/drawing/2014/main" id="{1BC04951-070E-4B93-838E-98A9548F5950}"/>
-              </a:ext>
-            </a:extLst>
-          </p:cNvPr>
-          <p:cNvPicPr>
-            <a:picLocks noChangeAspect="1"/>
-          </p:cNvPicPr>
-          <p:nvPr/>
-        </p:nvPicPr>
-        <p:blipFill>
-          <a:blip r:embed="rId3"/>
-          <a:stretch>
-            <a:fillRect/>
-          </a:stretch>
-        </p:blipFill>
-        <p:spPr>
-          <a:xfrm>
-            <a:off x="4852914" y="1376363"/>
-            <a:ext cx="6505575" cy="2524125"/>
-          </a:xfrm>
-          <a:prstGeom prst="rect">
-            <a:avLst/>
-          </a:prstGeom>
-        </p:spPr>
-      </p:pic>
-      <p:pic>
-        <p:nvPicPr>
-          <p:cNvPr id="5" name="Picture 4">
-            <a:extLst>
-              <a:ext uri="{FF2B5EF4-FFF2-40B4-BE49-F238E27FC236}">
-                <a16:creationId xmlns:a16="http://schemas.microsoft.com/office/drawing/2014/main" id="{A12BF33D-D6D5-4A59-B400-57A25CA89BE6}"/>
-              </a:ext>
-            </a:extLst>
-          </p:cNvPr>
-          <p:cNvPicPr>
-            <a:picLocks noChangeAspect="1"/>
-          </p:cNvPicPr>
-          <p:nvPr/>
-        </p:nvPicPr>
-        <p:blipFill>
-          <a:blip r:embed="rId4"/>
-          <a:stretch>
-            <a:fillRect/>
-          </a:stretch>
-        </p:blipFill>
-        <p:spPr>
-          <a:xfrm>
-            <a:off x="4852914" y="4124473"/>
-            <a:ext cx="6438900" cy="2276475"/>
-          </a:xfrm>
-          <a:prstGeom prst="rect">
-            <a:avLst/>
-          </a:prstGeom>
-        </p:spPr>
-      </p:pic>
-      <p:sp>
-        <p:nvSpPr>
-          <p:cNvPr id="6" name="Rectangle 5">
-            <a:extLst>
-              <a:ext uri="{FF2B5EF4-FFF2-40B4-BE49-F238E27FC236}">
-                <a16:creationId xmlns:a16="http://schemas.microsoft.com/office/drawing/2014/main" id="{1F1D3B31-D1F7-4A2B-A529-A6D8657ADFDD}"/>
-              </a:ext>
-            </a:extLst>
-          </p:cNvPr>
-          <p:cNvSpPr/>
-          <p:nvPr/>
-        </p:nvSpPr>
-        <p:spPr>
-          <a:xfrm>
-            <a:off x="265430" y="5807631"/>
-            <a:ext cx="5830570" cy="369332"/>
-          </a:xfrm>
-          <a:prstGeom prst="rect">
-            <a:avLst/>
-          </a:prstGeom>
-        </p:spPr>
-        <p:txBody>
-          <a:bodyPr wrap="none">
-            <a:spAutoFit/>
-          </a:bodyPr>
-          <a:lstStyle/>
-          <a:p>
-            <a:r>
-              <a:rPr lang="en-US" dirty="0">
-                <a:hlinkClick r:id="rId5"/>
-              </a:rPr>
-              <a:t>https://insights.stackoverflow.com/survey/2019#technology</a:t>
-            </a:r>
-            <a:endParaRPr lang="en-US" dirty="0"/>
+              <a:t>15% of bugs in JavaScript could be prevented by type annotations</a:t>
+            </a:r>
+          </a:p>
+          <a:p>
+            <a:r>
+              <a:rPr lang="en-US" dirty="0"/>
+              <a:t>Lack of types:</a:t>
+            </a:r>
+          </a:p>
+          <a:p>
+            <a:pPr lvl="1"/>
+            <a:r>
+              <a:rPr lang="en-US" dirty="0"/>
+              <a:t>Hard to understand APIs</a:t>
+            </a:r>
+          </a:p>
+          <a:p>
+            <a:pPr lvl="1"/>
+            <a:r>
+              <a:rPr lang="en-US" dirty="0"/>
+              <a:t>Difficult to read, maintain, and document</a:t>
+            </a:r>
+          </a:p>
+          <a:p>
+            <a:pPr lvl="1"/>
+            <a:r>
+              <a:rPr lang="en-US" dirty="0"/>
+              <a:t>Poor IDE support</a:t>
+            </a:r>
           </a:p>
         </p:txBody>
       </p:sp>
     </p:spTree>
     <p:extLst>
       <p:ext uri="{BB962C8B-B14F-4D97-AF65-F5344CB8AC3E}">
-        <p14:creationId xmlns:p14="http://schemas.microsoft.com/office/powerpoint/2010/main" val="4038175418"/>
+        <p14:creationId xmlns:p14="http://schemas.microsoft.com/office/powerpoint/2010/main" val="84338700"/>
       </p:ext>
     </p:extLst>
   </p:cSld>
@@ -4693,7 +6543,7 @@
           <p:cNvPr id="2" name="Title 1">
             <a:extLst>
               <a:ext uri="{FF2B5EF4-FFF2-40B4-BE49-F238E27FC236}">
-                <a16:creationId xmlns:a16="http://schemas.microsoft.com/office/drawing/2014/main" id="{D0524E60-81C2-44B3-9C39-42614E12DE2C}"/>
+                <a16:creationId xmlns:a16="http://schemas.microsoft.com/office/drawing/2014/main" id="{80EEF33D-69CF-45CC-879A-61B7B4DF05AB}"/>
               </a:ext>
             </a:extLst>
           </p:cNvPr>
@@ -4704,7 +6554,12 @@
             <p:ph type="title"/>
           </p:nvPr>
         </p:nvSpPr>
-        <p:spPr/>
+        <p:spPr>
+          <a:xfrm>
+            <a:off x="838200" y="365125"/>
+            <a:ext cx="10515600" cy="1325563"/>
+          </a:xfrm>
+        </p:spPr>
         <p:txBody>
           <a:bodyPr/>
           <a:lstStyle/>
@@ -4721,7 +6576,7 @@
           <p:cNvPr id="3" name="Content Placeholder 2">
             <a:extLst>
               <a:ext uri="{FF2B5EF4-FFF2-40B4-BE49-F238E27FC236}">
-                <a16:creationId xmlns:a16="http://schemas.microsoft.com/office/drawing/2014/main" id="{5CEB7175-18F2-48CE-9148-E8BA6ED9627B}"/>
+                <a16:creationId xmlns:a16="http://schemas.microsoft.com/office/drawing/2014/main" id="{03ECCE98-64A8-4ABB-80A6-2C658A91ADCB}"/>
               </a:ext>
             </a:extLst>
           </p:cNvPr>
@@ -4732,38 +6587,123 @@
             <p:ph idx="1"/>
           </p:nvPr>
         </p:nvSpPr>
-        <p:spPr/>
-        <p:txBody>
-          <a:bodyPr/>
-          <a:lstStyle/>
-          <a:p>
-            <a:r>
-              <a:rPr lang="en-US" dirty="0"/>
-              <a:t>Not that popular</a:t>
-            </a:r>
-          </a:p>
-          <a:p>
-            <a:r>
-              <a:rPr lang="en-US" dirty="0"/>
-              <a:t>If used poorly, can decrease </a:t>
-            </a:r>
-            <a:r>
-              <a:rPr lang="en-US" b="1" dirty="0"/>
-              <a:t>readability</a:t>
-            </a:r>
-          </a:p>
-          <a:p>
-            <a:r>
-              <a:rPr lang="en-US" dirty="0"/>
-              <a:t>However, if used well….</a:t>
-            </a:r>
-          </a:p>
-        </p:txBody>
-      </p:sp>
+        <p:spPr>
+          <a:xfrm>
+            <a:off x="838200" y="1825625"/>
+            <a:ext cx="10515600" cy="4351338"/>
+          </a:xfrm>
+        </p:spPr>
+        <p:txBody>
+          <a:bodyPr/>
+          <a:lstStyle/>
+          <a:p>
+            <a:r>
+              <a:rPr lang="en-US" dirty="0">
+                <a:hlinkClick r:id="rId3"/>
+              </a:rPr>
+              <a:t>PEP 3107</a:t>
+            </a:r>
+            <a:r>
+              <a:rPr lang="en-US" dirty="0"/>
+              <a:t> – Function Annotations – Dec 2006</a:t>
+            </a:r>
+          </a:p>
+          <a:p>
+            <a:r>
+              <a:rPr lang="en-US" dirty="0">
+                <a:hlinkClick r:id="rId4"/>
+              </a:rPr>
+              <a:t>PEP 484</a:t>
+            </a:r>
+            <a:r>
+              <a:rPr lang="en-US" dirty="0"/>
+              <a:t> – Type Hints – Sept 2014</a:t>
+            </a:r>
+          </a:p>
+          <a:p>
+            <a:r>
+              <a:rPr lang="en-US" dirty="0">
+                <a:hlinkClick r:id="rId5"/>
+              </a:rPr>
+              <a:t>PEP 526</a:t>
+            </a:r>
+            <a:r>
+              <a:rPr lang="en-US" dirty="0"/>
+              <a:t> – Variable Annotations – Aug 2016</a:t>
+            </a:r>
+          </a:p>
+          <a:p>
+            <a:r>
+              <a:rPr lang="en-US" dirty="0"/>
+              <a:t>Typing officially supported with Python 3.6 (released Dec 23, 2016)</a:t>
+            </a:r>
+          </a:p>
+        </p:txBody>
+      </p:sp>
+      <p:pic>
+        <p:nvPicPr>
+          <p:cNvPr id="4" name="Picture 3" descr="A screenshot of a cell phone&#10;&#10;Description automatically generated">
+            <a:extLst>
+              <a:ext uri="{FF2B5EF4-FFF2-40B4-BE49-F238E27FC236}">
+                <a16:creationId xmlns:a16="http://schemas.microsoft.com/office/drawing/2014/main" id="{4AAD23C0-F5B9-4BE9-B5C6-342435DB86FC}"/>
+              </a:ext>
+            </a:extLst>
+          </p:cNvPr>
+          <p:cNvPicPr>
+            <a:picLocks noChangeAspect="1"/>
+          </p:cNvPicPr>
+          <p:nvPr/>
+        </p:nvPicPr>
+        <p:blipFill>
+          <a:blip r:embed="rId6"/>
+          <a:stretch>
+            <a:fillRect/>
+          </a:stretch>
+        </p:blipFill>
+        <p:spPr>
+          <a:xfrm>
+            <a:off x="440223" y="4001293"/>
+            <a:ext cx="4856062" cy="1455127"/>
+          </a:xfrm>
+          <a:prstGeom prst="rect">
+            <a:avLst/>
+          </a:prstGeom>
+        </p:spPr>
+      </p:pic>
+      <p:pic>
+        <p:nvPicPr>
+          <p:cNvPr id="5" name="Picture 4">
+            <a:extLst>
+              <a:ext uri="{FF2B5EF4-FFF2-40B4-BE49-F238E27FC236}">
+                <a16:creationId xmlns:a16="http://schemas.microsoft.com/office/drawing/2014/main" id="{0D719514-858F-49E3-82D9-74A63975CCD0}"/>
+              </a:ext>
+            </a:extLst>
+          </p:cNvPr>
+          <p:cNvPicPr>
+            <a:picLocks noChangeAspect="1"/>
+          </p:cNvPicPr>
+          <p:nvPr/>
+        </p:nvPicPr>
+        <p:blipFill>
+          <a:blip r:embed="rId7"/>
+          <a:stretch>
+            <a:fillRect/>
+          </a:stretch>
+        </p:blipFill>
+        <p:spPr>
+          <a:xfrm>
+            <a:off x="6096000" y="4001293"/>
+            <a:ext cx="5655777" cy="1455127"/>
+          </a:xfrm>
+          <a:prstGeom prst="rect">
+            <a:avLst/>
+          </a:prstGeom>
+        </p:spPr>
+      </p:pic>
     </p:spTree>
     <p:extLst>
       <p:ext uri="{BB962C8B-B14F-4D97-AF65-F5344CB8AC3E}">
-        <p14:creationId xmlns:p14="http://schemas.microsoft.com/office/powerpoint/2010/main" val="3628153788"/>
+        <p14:creationId xmlns:p14="http://schemas.microsoft.com/office/powerpoint/2010/main" val="2251587020"/>
       </p:ext>
     </p:extLst>
   </p:cSld>
@@ -4795,7 +6735,7 @@
           <p:cNvPr id="2" name="Title 1">
             <a:extLst>
               <a:ext uri="{FF2B5EF4-FFF2-40B4-BE49-F238E27FC236}">
-                <a16:creationId xmlns:a16="http://schemas.microsoft.com/office/drawing/2014/main" id="{47A33ADF-206C-4293-B8AB-77F9E2FBC86E}"/>
+                <a16:creationId xmlns:a16="http://schemas.microsoft.com/office/drawing/2014/main" id="{4502F936-2928-44D0-8751-B459FBB3DCF9}"/>
               </a:ext>
             </a:extLst>
           </p:cNvPr>
@@ -4806,19 +6746,14 @@
             <p:ph type="title"/>
           </p:nvPr>
         </p:nvSpPr>
-        <p:spPr>
-          <a:xfrm>
-            <a:off x="838200" y="365125"/>
-            <a:ext cx="10515600" cy="1325563"/>
-          </a:xfrm>
-        </p:spPr>
-        <p:txBody>
-          <a:bodyPr/>
-          <a:lstStyle/>
-          <a:p>
-            <a:r>
-              <a:rPr lang="en-US" dirty="0"/>
-              <a:t>Type Aliases</a:t>
+        <p:spPr/>
+        <p:txBody>
+          <a:bodyPr/>
+          <a:lstStyle/>
+          <a:p>
+            <a:r>
+              <a:rPr lang="en-US" dirty="0"/>
+              <a:t>Pros</a:t>
             </a:r>
           </a:p>
         </p:txBody>
@@ -4828,7 +6763,7 @@
           <p:cNvPr id="4" name="Content Placeholder 3">
             <a:extLst>
               <a:ext uri="{FF2B5EF4-FFF2-40B4-BE49-F238E27FC236}">
-                <a16:creationId xmlns:a16="http://schemas.microsoft.com/office/drawing/2014/main" id="{FEB84F87-E94A-473D-A09C-72B4F99CAFCF}"/>
+                <a16:creationId xmlns:a16="http://schemas.microsoft.com/office/drawing/2014/main" id="{4F9C9F8E-FE89-4440-8B54-1ACCD384BD57}"/>
               </a:ext>
             </a:extLst>
           </p:cNvPr>
@@ -4847,8 +6782,257 @@
         </p:blipFill>
         <p:spPr>
           <a:xfrm>
-            <a:off x="838200" y="1690688"/>
-            <a:ext cx="10515600" cy="4516002"/>
+            <a:off x="5002194" y="365125"/>
+            <a:ext cx="6525242" cy="4354770"/>
+          </a:xfrm>
+          <a:prstGeom prst="rect">
+            <a:avLst/>
+          </a:prstGeom>
+        </p:spPr>
+      </p:pic>
+      <p:sp>
+        <p:nvSpPr>
+          <p:cNvPr id="6" name="Content Placeholder 2">
+            <a:extLst>
+              <a:ext uri="{FF2B5EF4-FFF2-40B4-BE49-F238E27FC236}">
+                <a16:creationId xmlns:a16="http://schemas.microsoft.com/office/drawing/2014/main" id="{AE256CB4-8C9B-4AF7-A814-087443ACB1FE}"/>
+              </a:ext>
+            </a:extLst>
+          </p:cNvPr>
+          <p:cNvSpPr txBox="1">
+            <a:spLocks/>
+          </p:cNvSpPr>
+          <p:nvPr/>
+        </p:nvSpPr>
+        <p:spPr>
+          <a:xfrm>
+            <a:off x="317592" y="1690688"/>
+            <a:ext cx="3688830" cy="4351338"/>
+          </a:xfrm>
+          <a:prstGeom prst="rect">
+            <a:avLst/>
+          </a:prstGeom>
+        </p:spPr>
+        <p:txBody>
+          <a:bodyPr vert="horz" lIns="91440" tIns="45720" rIns="91440" bIns="45720" rtlCol="0">
+            <a:normAutofit/>
+          </a:bodyPr>
+          <a:lstStyle>
+            <a:lvl1pPr marL="228600" indent="-228600" algn="l" defTabSz="914400" rtl="0" eaLnBrk="1" latinLnBrk="0" hangingPunct="1">
+              <a:lnSpc>
+                <a:spcPct val="90000"/>
+              </a:lnSpc>
+              <a:spcBef>
+                <a:spcPts val="1000"/>
+              </a:spcBef>
+              <a:buFont typeface="Arial" panose="020B0604020202020204" pitchFamily="34" charset="0"/>
+              <a:buChar char="•"/>
+              <a:defRPr sz="2800" kern="1200">
+                <a:solidFill>
+                  <a:schemeClr val="tx1"/>
+                </a:solidFill>
+                <a:latin typeface="+mn-lt"/>
+                <a:ea typeface="+mn-ea"/>
+                <a:cs typeface="+mn-cs"/>
+              </a:defRPr>
+            </a:lvl1pPr>
+            <a:lvl2pPr marL="685800" indent="-228600" algn="l" defTabSz="914400" rtl="0" eaLnBrk="1" latinLnBrk="0" hangingPunct="1">
+              <a:lnSpc>
+                <a:spcPct val="90000"/>
+              </a:lnSpc>
+              <a:spcBef>
+                <a:spcPts val="500"/>
+              </a:spcBef>
+              <a:buFont typeface="Arial" panose="020B0604020202020204" pitchFamily="34" charset="0"/>
+              <a:buChar char="•"/>
+              <a:defRPr sz="2400" kern="1200">
+                <a:solidFill>
+                  <a:schemeClr val="tx1"/>
+                </a:solidFill>
+                <a:latin typeface="+mn-lt"/>
+                <a:ea typeface="+mn-ea"/>
+                <a:cs typeface="+mn-cs"/>
+              </a:defRPr>
+            </a:lvl2pPr>
+            <a:lvl3pPr marL="1143000" indent="-228600" algn="l" defTabSz="914400" rtl="0" eaLnBrk="1" latinLnBrk="0" hangingPunct="1">
+              <a:lnSpc>
+                <a:spcPct val="90000"/>
+              </a:lnSpc>
+              <a:spcBef>
+                <a:spcPts val="500"/>
+              </a:spcBef>
+              <a:buFont typeface="Arial" panose="020B0604020202020204" pitchFamily="34" charset="0"/>
+              <a:buChar char="•"/>
+              <a:defRPr sz="2000" kern="1200">
+                <a:solidFill>
+                  <a:schemeClr val="tx1"/>
+                </a:solidFill>
+                <a:latin typeface="+mn-lt"/>
+                <a:ea typeface="+mn-ea"/>
+                <a:cs typeface="+mn-cs"/>
+              </a:defRPr>
+            </a:lvl3pPr>
+            <a:lvl4pPr marL="1600200" indent="-228600" algn="l" defTabSz="914400" rtl="0" eaLnBrk="1" latinLnBrk="0" hangingPunct="1">
+              <a:lnSpc>
+                <a:spcPct val="90000"/>
+              </a:lnSpc>
+              <a:spcBef>
+                <a:spcPts val="500"/>
+              </a:spcBef>
+              <a:buFont typeface="Arial" panose="020B0604020202020204" pitchFamily="34" charset="0"/>
+              <a:buChar char="•"/>
+              <a:defRPr sz="1800" kern="1200">
+                <a:solidFill>
+                  <a:schemeClr val="tx1"/>
+                </a:solidFill>
+                <a:latin typeface="+mn-lt"/>
+                <a:ea typeface="+mn-ea"/>
+                <a:cs typeface="+mn-cs"/>
+              </a:defRPr>
+            </a:lvl4pPr>
+            <a:lvl5pPr marL="2057400" indent="-228600" algn="l" defTabSz="914400" rtl="0" eaLnBrk="1" latinLnBrk="0" hangingPunct="1">
+              <a:lnSpc>
+                <a:spcPct val="90000"/>
+              </a:lnSpc>
+              <a:spcBef>
+                <a:spcPts val="500"/>
+              </a:spcBef>
+              <a:buFont typeface="Arial" panose="020B0604020202020204" pitchFamily="34" charset="0"/>
+              <a:buChar char="•"/>
+              <a:defRPr sz="1800" kern="1200">
+                <a:solidFill>
+                  <a:schemeClr val="tx1"/>
+                </a:solidFill>
+                <a:latin typeface="+mn-lt"/>
+                <a:ea typeface="+mn-ea"/>
+                <a:cs typeface="+mn-cs"/>
+              </a:defRPr>
+            </a:lvl5pPr>
+            <a:lvl6pPr marL="2514600" indent="-228600" algn="l" defTabSz="914400" rtl="0" eaLnBrk="1" latinLnBrk="0" hangingPunct="1">
+              <a:lnSpc>
+                <a:spcPct val="90000"/>
+              </a:lnSpc>
+              <a:spcBef>
+                <a:spcPts val="500"/>
+              </a:spcBef>
+              <a:buFont typeface="Arial" panose="020B0604020202020204" pitchFamily="34" charset="0"/>
+              <a:buChar char="•"/>
+              <a:defRPr sz="1800" kern="1200">
+                <a:solidFill>
+                  <a:schemeClr val="tx1"/>
+                </a:solidFill>
+                <a:latin typeface="+mn-lt"/>
+                <a:ea typeface="+mn-ea"/>
+                <a:cs typeface="+mn-cs"/>
+              </a:defRPr>
+            </a:lvl6pPr>
+            <a:lvl7pPr marL="2971800" indent="-228600" algn="l" defTabSz="914400" rtl="0" eaLnBrk="1" latinLnBrk="0" hangingPunct="1">
+              <a:lnSpc>
+                <a:spcPct val="90000"/>
+              </a:lnSpc>
+              <a:spcBef>
+                <a:spcPts val="500"/>
+              </a:spcBef>
+              <a:buFont typeface="Arial" panose="020B0604020202020204" pitchFamily="34" charset="0"/>
+              <a:buChar char="•"/>
+              <a:defRPr sz="1800" kern="1200">
+                <a:solidFill>
+                  <a:schemeClr val="tx1"/>
+                </a:solidFill>
+                <a:latin typeface="+mn-lt"/>
+                <a:ea typeface="+mn-ea"/>
+                <a:cs typeface="+mn-cs"/>
+              </a:defRPr>
+            </a:lvl7pPr>
+            <a:lvl8pPr marL="3429000" indent="-228600" algn="l" defTabSz="914400" rtl="0" eaLnBrk="1" latinLnBrk="0" hangingPunct="1">
+              <a:lnSpc>
+                <a:spcPct val="90000"/>
+              </a:lnSpc>
+              <a:spcBef>
+                <a:spcPts val="500"/>
+              </a:spcBef>
+              <a:buFont typeface="Arial" panose="020B0604020202020204" pitchFamily="34" charset="0"/>
+              <a:buChar char="•"/>
+              <a:defRPr sz="1800" kern="1200">
+                <a:solidFill>
+                  <a:schemeClr val="tx1"/>
+                </a:solidFill>
+                <a:latin typeface="+mn-lt"/>
+                <a:ea typeface="+mn-ea"/>
+                <a:cs typeface="+mn-cs"/>
+              </a:defRPr>
+            </a:lvl8pPr>
+            <a:lvl9pPr marL="3886200" indent="-228600" algn="l" defTabSz="914400" rtl="0" eaLnBrk="1" latinLnBrk="0" hangingPunct="1">
+              <a:lnSpc>
+                <a:spcPct val="90000"/>
+              </a:lnSpc>
+              <a:spcBef>
+                <a:spcPts val="500"/>
+              </a:spcBef>
+              <a:buFont typeface="Arial" panose="020B0604020202020204" pitchFamily="34" charset="0"/>
+              <a:buChar char="•"/>
+              <a:defRPr sz="1800" kern="1200">
+                <a:solidFill>
+                  <a:schemeClr val="tx1"/>
+                </a:solidFill>
+                <a:latin typeface="+mn-lt"/>
+                <a:ea typeface="+mn-ea"/>
+                <a:cs typeface="+mn-cs"/>
+              </a:defRPr>
+            </a:lvl9pPr>
+          </a:lstStyle>
+          <a:p>
+            <a:r>
+              <a:rPr lang="en-US" dirty="0"/>
+              <a:t>Can you see the bug?</a:t>
+            </a:r>
+          </a:p>
+          <a:p>
+            <a:r>
+              <a:rPr lang="en-US" dirty="0"/>
+              <a:t>Without types, </a:t>
+            </a:r>
+            <a:r>
+              <a:rPr lang="en-US" dirty="0" err="1"/>
+              <a:t>get_first_name</a:t>
+            </a:r>
+            <a:r>
+              <a:rPr lang="en-US" dirty="0"/>
+              <a:t>() only errors at runtime</a:t>
+            </a:r>
+          </a:p>
+          <a:p>
+            <a:r>
+              <a:rPr lang="en-US" dirty="0"/>
+              <a:t>If type annotations are added, static analysis catches this bug</a:t>
+            </a:r>
+          </a:p>
+        </p:txBody>
+      </p:sp>
+      <p:pic>
+        <p:nvPicPr>
+          <p:cNvPr id="7" name="Picture 6">
+            <a:extLst>
+              <a:ext uri="{FF2B5EF4-FFF2-40B4-BE49-F238E27FC236}">
+                <a16:creationId xmlns:a16="http://schemas.microsoft.com/office/drawing/2014/main" id="{7518BF1B-3495-445F-BAE5-466B2BE9473D}"/>
+              </a:ext>
+            </a:extLst>
+          </p:cNvPr>
+          <p:cNvPicPr>
+            <a:picLocks noChangeAspect="1"/>
+          </p:cNvPicPr>
+          <p:nvPr/>
+        </p:nvPicPr>
+        <p:blipFill>
+          <a:blip r:embed="rId3"/>
+          <a:stretch>
+            <a:fillRect/>
+          </a:stretch>
+        </p:blipFill>
+        <p:spPr>
+          <a:xfrm>
+            <a:off x="1219877" y="5167312"/>
+            <a:ext cx="9752246" cy="887936"/>
           </a:xfrm>
           <a:prstGeom prst="rect">
             <a:avLst/>
@@ -4858,13 +7042,88 @@
     </p:spTree>
     <p:extLst>
       <p:ext uri="{BB962C8B-B14F-4D97-AF65-F5344CB8AC3E}">
-        <p14:creationId xmlns:p14="http://schemas.microsoft.com/office/powerpoint/2010/main" val="3767211261"/>
+        <p14:creationId xmlns:p14="http://schemas.microsoft.com/office/powerpoint/2010/main" val="3234668304"/>
       </p:ext>
     </p:extLst>
   </p:cSld>
   <p:clrMapOvr>
     <a:masterClrMapping/>
   </p:clrMapOvr>
+  <p:timing>
+    <p:tnLst>
+      <p:par>
+        <p:cTn id="1" dur="indefinite" restart="never" nodeType="tmRoot">
+          <p:childTnLst>
+            <p:seq concurrent="1" nextAc="seek">
+              <p:cTn id="2" dur="indefinite" nodeType="mainSeq">
+                <p:childTnLst>
+                  <p:par>
+                    <p:cTn id="3" fill="hold">
+                      <p:stCondLst>
+                        <p:cond delay="indefinite"/>
+                      </p:stCondLst>
+                      <p:childTnLst>
+                        <p:par>
+                          <p:cTn id="4" fill="hold">
+                            <p:stCondLst>
+                              <p:cond delay="0"/>
+                            </p:stCondLst>
+                            <p:childTnLst>
+                              <p:par>
+                                <p:cTn id="5" presetID="1" presetClass="entr" presetSubtype="0" fill="hold" nodeType="clickEffect">
+                                  <p:stCondLst>
+                                    <p:cond delay="0"/>
+                                  </p:stCondLst>
+                                  <p:childTnLst>
+                                    <p:set>
+                                      <p:cBhvr>
+                                        <p:cTn id="6" dur="1" fill="hold">
+                                          <p:stCondLst>
+                                            <p:cond delay="0"/>
+                                          </p:stCondLst>
+                                        </p:cTn>
+                                        <p:tgtEl>
+                                          <p:spTgt spid="7"/>
+                                        </p:tgtEl>
+                                        <p:attrNameLst>
+                                          <p:attrName>style.visibility</p:attrName>
+                                        </p:attrNameLst>
+                                      </p:cBhvr>
+                                      <p:to>
+                                        <p:strVal val="visible"/>
+                                      </p:to>
+                                    </p:set>
+                                  </p:childTnLst>
+                                </p:cTn>
+                              </p:par>
+                            </p:childTnLst>
+                          </p:cTn>
+                        </p:par>
+                      </p:childTnLst>
+                    </p:cTn>
+                  </p:par>
+                </p:childTnLst>
+              </p:cTn>
+              <p:prevCondLst>
+                <p:cond evt="onPrev" delay="0">
+                  <p:tgtEl>
+                    <p:sldTgt/>
+                  </p:tgtEl>
+                </p:cond>
+              </p:prevCondLst>
+              <p:nextCondLst>
+                <p:cond evt="onNext" delay="0">
+                  <p:tgtEl>
+                    <p:sldTgt/>
+                  </p:tgtEl>
+                </p:cond>
+              </p:nextCondLst>
+            </p:seq>
+          </p:childTnLst>
+        </p:cTn>
+      </p:par>
+    </p:tnLst>
+  </p:timing>
 </p:sld>
 </file>
 
@@ -4890,7 +7149,7 @@
           <p:cNvPr id="2" name="Title 1">
             <a:extLst>
               <a:ext uri="{FF2B5EF4-FFF2-40B4-BE49-F238E27FC236}">
-                <a16:creationId xmlns:a16="http://schemas.microsoft.com/office/drawing/2014/main" id="{CD50801E-7F0D-4C50-BA02-F46B826A3B57}"/>
+                <a16:creationId xmlns:a16="http://schemas.microsoft.com/office/drawing/2014/main" id="{D0524E60-81C2-44B3-9C39-42614E12DE2C}"/>
               </a:ext>
             </a:extLst>
           </p:cNvPr>
@@ -4908,7 +7167,7 @@
           <a:p>
             <a:r>
               <a:rPr lang="en-US" dirty="0"/>
-              <a:t>Typing Examples</a:t>
+              <a:t>Cons</a:t>
             </a:r>
           </a:p>
         </p:txBody>
@@ -4918,7 +7177,7 @@
           <p:cNvPr id="3" name="Content Placeholder 2">
             <a:extLst>
               <a:ext uri="{FF2B5EF4-FFF2-40B4-BE49-F238E27FC236}">
-                <a16:creationId xmlns:a16="http://schemas.microsoft.com/office/drawing/2014/main" id="{3954294D-1F9B-434F-8E92-961A72DAD8D8}"/>
+                <a16:creationId xmlns:a16="http://schemas.microsoft.com/office/drawing/2014/main" id="{5CEB7175-18F2-48CE-9148-E8BA6ED9627B}"/>
               </a:ext>
             </a:extLst>
           </p:cNvPr>
@@ -4929,63 +7188,89 @@
             <p:ph idx="1"/>
           </p:nvPr>
         </p:nvSpPr>
-        <p:spPr/>
-        <p:txBody>
-          <a:bodyPr/>
-          <a:lstStyle/>
-          <a:p>
-            <a:r>
-              <a:rPr lang="en-US" dirty="0" err="1"/>
-              <a:t>isort</a:t>
-            </a:r>
-            <a:r>
-              <a:rPr lang="en-US" dirty="0"/>
-              <a:t> - </a:t>
-            </a:r>
-            <a:r>
-              <a:rPr lang="en-US" dirty="0">
-                <a:hlinkClick r:id="rId2"/>
-              </a:rPr>
-              <a:t>https://github.com/timothycrosley/isort</a:t>
-            </a:r>
-            <a:endParaRPr lang="en-US" dirty="0"/>
-          </a:p>
-          <a:p>
-            <a:r>
-              <a:rPr lang="en-US" dirty="0"/>
-              <a:t>Tale - </a:t>
-            </a:r>
-            <a:r>
-              <a:rPr lang="en-US" dirty="0">
-                <a:hlinkClick r:id="rId3"/>
-              </a:rPr>
-              <a:t>https://github.com/irmen/Tale</a:t>
-            </a:r>
-            <a:endParaRPr lang="en-US" dirty="0"/>
-          </a:p>
-          <a:p>
-            <a:r>
-              <a:rPr lang="en-US" dirty="0" err="1"/>
-              <a:t>FastAPI</a:t>
-            </a:r>
-            <a:r>
-              <a:rPr lang="en-US" dirty="0"/>
-              <a:t> - </a:t>
-            </a:r>
-            <a:r>
-              <a:rPr lang="en-US" dirty="0">
-                <a:hlinkClick r:id="rId4"/>
-              </a:rPr>
-              <a:t>https://github.com/tiangolo/fastapi</a:t>
-            </a:r>
-            <a:endParaRPr lang="en-US" dirty="0"/>
-          </a:p>
-        </p:txBody>
-      </p:sp>
+        <p:spPr>
+          <a:xfrm>
+            <a:off x="838200" y="1825625"/>
+            <a:ext cx="3688830" cy="4351338"/>
+          </a:xfrm>
+        </p:spPr>
+        <p:txBody>
+          <a:bodyPr>
+            <a:normAutofit lnSpcReduction="10000"/>
+          </a:bodyPr>
+          <a:lstStyle/>
+          <a:p>
+            <a:r>
+              <a:rPr lang="en-US" dirty="0"/>
+              <a:t>Not that popular</a:t>
+            </a:r>
+          </a:p>
+          <a:p>
+            <a:r>
+              <a:rPr lang="en-US" dirty="0"/>
+              <a:t>If used poorly, can decrease </a:t>
+            </a:r>
+            <a:r>
+              <a:rPr lang="en-US" b="1" dirty="0"/>
+              <a:t>readability</a:t>
+            </a:r>
+            <a:br>
+              <a:rPr lang="en-US" b="1" dirty="0"/>
+            </a:br>
+            <a:br>
+              <a:rPr lang="en-US" b="1" dirty="0"/>
+            </a:br>
+            <a:br>
+              <a:rPr lang="en-US" b="1" dirty="0"/>
+            </a:br>
+            <a:endParaRPr lang="en-US" b="1" dirty="0"/>
+          </a:p>
+          <a:p>
+            <a:r>
+              <a:rPr lang="en-US" dirty="0"/>
+              <a:t>Where does the function declaration end and the function body begin?</a:t>
+            </a:r>
+            <a:br>
+              <a:rPr lang="en-US" dirty="0"/>
+            </a:br>
+            <a:endParaRPr lang="en-US" b="1" dirty="0"/>
+          </a:p>
+        </p:txBody>
+      </p:sp>
+      <p:pic>
+        <p:nvPicPr>
+          <p:cNvPr id="4" name="Picture 3">
+            <a:extLst>
+              <a:ext uri="{FF2B5EF4-FFF2-40B4-BE49-F238E27FC236}">
+                <a16:creationId xmlns:a16="http://schemas.microsoft.com/office/drawing/2014/main" id="{4E7F910C-3945-49D8-9A04-C855DD17558D}"/>
+              </a:ext>
+            </a:extLst>
+          </p:cNvPr>
+          <p:cNvPicPr>
+            <a:picLocks noChangeAspect="1"/>
+          </p:cNvPicPr>
+          <p:nvPr/>
+        </p:nvPicPr>
+        <p:blipFill>
+          <a:blip r:embed="rId3"/>
+          <a:stretch>
+            <a:fillRect/>
+          </a:stretch>
+        </p:blipFill>
+        <p:spPr>
+          <a:xfrm>
+            <a:off x="4631962" y="1029693"/>
+            <a:ext cx="7176618" cy="5395714"/>
+          </a:xfrm>
+          <a:prstGeom prst="rect">
+            <a:avLst/>
+          </a:prstGeom>
+        </p:spPr>
+      </p:pic>
     </p:spTree>
     <p:extLst>
       <p:ext uri="{BB962C8B-B14F-4D97-AF65-F5344CB8AC3E}">
-        <p14:creationId xmlns:p14="http://schemas.microsoft.com/office/powerpoint/2010/main" val="3639909856"/>
+        <p14:creationId xmlns:p14="http://schemas.microsoft.com/office/powerpoint/2010/main" val="3628153788"/>
       </p:ext>
     </p:extLst>
   </p:cSld>
@@ -5017,7 +7302,7 @@
           <p:cNvPr id="2" name="Title 1">
             <a:extLst>
               <a:ext uri="{FF2B5EF4-FFF2-40B4-BE49-F238E27FC236}">
-                <a16:creationId xmlns:a16="http://schemas.microsoft.com/office/drawing/2014/main" id="{07F131CB-F47C-4C19-8788-AC3CFC5B1EFD}"/>
+                <a16:creationId xmlns:a16="http://schemas.microsoft.com/office/drawing/2014/main" id="{EA55C76A-7542-4926-A638-498638B31969}"/>
               </a:ext>
             </a:extLst>
           </p:cNvPr>
@@ -5035,7 +7320,7 @@
           <a:p>
             <a:r>
               <a:rPr lang="en-US" dirty="0"/>
-              <a:t>Generated Code Corpus</a:t>
+              <a:t>Prior Work</a:t>
             </a:r>
           </a:p>
         </p:txBody>
@@ -5045,7 +7330,7 @@
           <p:cNvPr id="3" name="Content Placeholder 2">
             <a:extLst>
               <a:ext uri="{FF2B5EF4-FFF2-40B4-BE49-F238E27FC236}">
-                <a16:creationId xmlns:a16="http://schemas.microsoft.com/office/drawing/2014/main" id="{068A9308-37F5-4979-AEA7-83662134ABE1}"/>
+                <a16:creationId xmlns:a16="http://schemas.microsoft.com/office/drawing/2014/main" id="{40AD65EC-7244-4C11-BB1B-9DDFBFD7A9CE}"/>
               </a:ext>
             </a:extLst>
           </p:cNvPr>
@@ -5063,36 +7348,71 @@
           <a:p>
             <a:r>
               <a:rPr lang="en-US" dirty="0"/>
-              <a:t>No existing corpus of python code using type hints</a:t>
-            </a:r>
-          </a:p>
-          <a:p>
+              <a:t>NLP Type Inference</a:t>
+            </a:r>
+          </a:p>
+          <a:p>
+            <a:pPr lvl="1"/>
+            <a:r>
+              <a:rPr lang="en-US" dirty="0" err="1"/>
+              <a:t>DeepTyper</a:t>
+            </a:r>
+            <a:r>
+              <a:rPr lang="en-US" dirty="0"/>
+              <a:t> – JavaScript/TypeScript</a:t>
+            </a:r>
+          </a:p>
+          <a:p>
+            <a:pPr lvl="1"/>
+            <a:r>
+              <a:rPr lang="en-US" dirty="0" err="1"/>
+              <a:t>JSNice</a:t>
+            </a:r>
+            <a:r>
+              <a:rPr lang="en-US" dirty="0"/>
+              <a:t> – JavaScript</a:t>
+            </a:r>
+          </a:p>
+          <a:p>
+            <a:pPr lvl="1"/>
+            <a:r>
+              <a:rPr lang="en-US" dirty="0"/>
+              <a:t>NL2Type – JavaScript</a:t>
+            </a:r>
+          </a:p>
+          <a:p>
+            <a:r>
+              <a:rPr lang="en-US" dirty="0"/>
+              <a:t>Static Type Inference</a:t>
+            </a:r>
+          </a:p>
+          <a:p>
+            <a:pPr lvl="1"/>
+            <a:r>
+              <a:rPr lang="en-US" dirty="0" err="1"/>
+              <a:t>Typpete</a:t>
+            </a:r>
+            <a:r>
+              <a:rPr lang="en-US" dirty="0"/>
+              <a:t> – Python – Z3 SMT Solver</a:t>
+            </a:r>
+          </a:p>
+          <a:p>
+            <a:pPr lvl="1"/>
+            <a:r>
+              <a:rPr lang="en-US" dirty="0">
+                <a:hlinkClick r:id="rId3"/>
+              </a:rPr>
+              <a:t>Python Probabilistic Type Inference</a:t>
+            </a:r>
             <a:endParaRPr lang="en-US" dirty="0"/>
-          </a:p>
-          <a:p>
-            <a:r>
-              <a:rPr lang="en-US" dirty="0"/>
-              <a:t>Mined GitHub manually</a:t>
-            </a:r>
-          </a:p>
-          <a:p>
-            <a:r>
-              <a:rPr lang="en-US" dirty="0"/>
-              <a:t>Total typed: 2064</a:t>
-            </a:r>
-          </a:p>
-          <a:p>
-            <a:r>
-              <a:rPr lang="en-US" dirty="0"/>
-              <a:t>Total typed lines of code: 1,068,993</a:t>
-            </a:r>
           </a:p>
         </p:txBody>
       </p:sp>
     </p:spTree>
     <p:extLst>
       <p:ext uri="{BB962C8B-B14F-4D97-AF65-F5344CB8AC3E}">
-        <p14:creationId xmlns:p14="http://schemas.microsoft.com/office/powerpoint/2010/main" val="1358703871"/>
+        <p14:creationId xmlns:p14="http://schemas.microsoft.com/office/powerpoint/2010/main" val="2139105183"/>
       </p:ext>
     </p:extLst>
   </p:cSld>
@@ -5124,7 +7444,7 @@
           <p:cNvPr id="2" name="Title 1">
             <a:extLst>
               <a:ext uri="{FF2B5EF4-FFF2-40B4-BE49-F238E27FC236}">
-                <a16:creationId xmlns:a16="http://schemas.microsoft.com/office/drawing/2014/main" id="{F489BB10-3343-4C4D-9797-5A153E44CEE5}"/>
+                <a16:creationId xmlns:a16="http://schemas.microsoft.com/office/drawing/2014/main" id="{BE50473A-B3B4-4077-AA66-8C3F7C22CDEC}"/>
               </a:ext>
             </a:extLst>
           </p:cNvPr>
@@ -5142,77 +7462,92 @@
           <a:p>
             <a:r>
               <a:rPr lang="en-US" dirty="0"/>
-              <a:t>Stripped Type Hints</a:t>
-            </a:r>
-          </a:p>
-        </p:txBody>
-      </p:sp>
-      <p:pic>
-        <p:nvPicPr>
-          <p:cNvPr id="4" name="Content Placeholder 3">
-            <a:extLst>
-              <a:ext uri="{FF2B5EF4-FFF2-40B4-BE49-F238E27FC236}">
-                <a16:creationId xmlns:a16="http://schemas.microsoft.com/office/drawing/2014/main" id="{9A1A5D9A-A216-4B7F-B82F-A5C0F16BDB4D}"/>
-              </a:ext>
-            </a:extLst>
-          </p:cNvPr>
-          <p:cNvPicPr>
-            <a:picLocks noGrp="1" noChangeAspect="1"/>
-          </p:cNvPicPr>
+              <a:t>Goals</a:t>
+            </a:r>
+          </a:p>
+        </p:txBody>
+      </p:sp>
+      <p:sp>
+        <p:nvSpPr>
+          <p:cNvPr id="3" name="Content Placeholder 2">
+            <a:extLst>
+              <a:ext uri="{FF2B5EF4-FFF2-40B4-BE49-F238E27FC236}">
+                <a16:creationId xmlns:a16="http://schemas.microsoft.com/office/drawing/2014/main" id="{4EAB683A-A28B-414B-AA08-42B60C502E65}"/>
+              </a:ext>
+            </a:extLst>
+          </p:cNvPr>
+          <p:cNvSpPr>
+            <a:spLocks noGrp="1"/>
+          </p:cNvSpPr>
           <p:nvPr>
             <p:ph idx="1"/>
           </p:nvPr>
-        </p:nvPicPr>
-        <p:blipFill>
-          <a:blip r:embed="rId2"/>
-          <a:stretch>
-            <a:fillRect/>
-          </a:stretch>
-        </p:blipFill>
-        <p:spPr>
-          <a:xfrm>
-            <a:off x="838199" y="1889031"/>
-            <a:ext cx="9388496" cy="2189543"/>
-          </a:xfrm>
-          <a:prstGeom prst="rect">
-            <a:avLst/>
-          </a:prstGeom>
-        </p:spPr>
-      </p:pic>
-      <p:pic>
-        <p:nvPicPr>
-          <p:cNvPr id="5" name="Picture 4">
-            <a:extLst>
-              <a:ext uri="{FF2B5EF4-FFF2-40B4-BE49-F238E27FC236}">
-                <a16:creationId xmlns:a16="http://schemas.microsoft.com/office/drawing/2014/main" id="{99E8A683-2ED8-4A80-8365-8810510FABB2}"/>
-              </a:ext>
-            </a:extLst>
-          </p:cNvPr>
-          <p:cNvPicPr>
-            <a:picLocks noChangeAspect="1"/>
-          </p:cNvPicPr>
-          <p:nvPr/>
-        </p:nvPicPr>
-        <p:blipFill>
-          <a:blip r:embed="rId3"/>
-          <a:stretch>
-            <a:fillRect/>
-          </a:stretch>
-        </p:blipFill>
-        <p:spPr>
-          <a:xfrm>
-            <a:off x="838199" y="4276917"/>
-            <a:ext cx="9388496" cy="2159027"/>
-          </a:xfrm>
-          <a:prstGeom prst="rect">
-            <a:avLst/>
-          </a:prstGeom>
-        </p:spPr>
-      </p:pic>
+        </p:nvSpPr>
+        <p:spPr/>
+        <p:txBody>
+          <a:bodyPr/>
+          <a:lstStyle/>
+          <a:p>
+            <a:r>
+              <a:rPr lang="en-US" dirty="0"/>
+              <a:t>Increase popularity of typing in python</a:t>
+            </a:r>
+          </a:p>
+          <a:p>
+            <a:pPr lvl="1"/>
+            <a:r>
+              <a:rPr lang="en-US" dirty="0"/>
+              <a:t>Mine GitHub for dataset of python files using the typing module</a:t>
+            </a:r>
+          </a:p>
+          <a:p>
+            <a:pPr lvl="1"/>
+            <a:r>
+              <a:rPr lang="en-US" dirty="0"/>
+              <a:t>Parse/Tokenize dataset</a:t>
+            </a:r>
+          </a:p>
+          <a:p>
+            <a:pPr lvl="1"/>
+            <a:r>
+              <a:rPr lang="en-US" dirty="0"/>
+              <a:t>Train on dataset to </a:t>
+            </a:r>
+            <a:r>
+              <a:rPr lang="en-US" b="1" dirty="0"/>
+              <a:t>produce a model</a:t>
+            </a:r>
+            <a:r>
+              <a:rPr lang="en-US" dirty="0"/>
+              <a:t> that can predict types in a python file</a:t>
+            </a:r>
+          </a:p>
+          <a:p>
+            <a:pPr lvl="1"/>
+            <a:r>
+              <a:rPr lang="en-US" dirty="0"/>
+              <a:t>Mine GitHub for repos using python 3.6+</a:t>
+            </a:r>
+          </a:p>
+          <a:p>
+            <a:pPr lvl="1"/>
+            <a:r>
+              <a:rPr lang="en-US" dirty="0"/>
+              <a:t>Generate PRs to these repos to add type hints</a:t>
+            </a:r>
+          </a:p>
+          <a:p>
+            <a:r>
+              <a:rPr lang="en-US" dirty="0"/>
+              <a:t>Ease burden of adding type hints</a:t>
+            </a:r>
+          </a:p>
+        </p:txBody>
+      </p:sp>
     </p:spTree>
     <p:extLst>
       <p:ext uri="{BB962C8B-B14F-4D97-AF65-F5344CB8AC3E}">
-        <p14:creationId xmlns:p14="http://schemas.microsoft.com/office/powerpoint/2010/main" val="2740673161"/>
+        <p14:creationId xmlns:p14="http://schemas.microsoft.com/office/powerpoint/2010/main" val="1866398050"/>
       </p:ext>
     </p:extLst>
   </p:cSld>

</xml_diff>